<commit_message>
updated jupyter_lab & ppt
</commit_message>
<xml_diff>
--- a/ECONOMIC STIMULUS IMPACTS.pptx
+++ b/ECONOMIC STIMULUS IMPACTS.pptx
@@ -1,21 +1,23 @@
 
 <file path=ppt/presentation.xml><?xml version="1.0" encoding="utf-8"?>
-<p:presentation xmlns:a="http://schemas.openxmlformats.org/drawingml/2006/main" xmlns:r="http://schemas.openxmlformats.org/officeDocument/2006/relationships" xmlns:mc="http://schemas.openxmlformats.org/markup-compatibility/2006" xmlns:mv="urn:schemas-microsoft-com:mac:vml" xmlns:p="http://schemas.openxmlformats.org/presentationml/2006/main" xmlns:c="http://schemas.openxmlformats.org/drawingml/2006/chart" xmlns:dgm="http://schemas.openxmlformats.org/drawingml/2006/diagram" xmlns:o="urn:schemas-microsoft-com:office:office" xmlns:v="urn:schemas-microsoft-com:vml" xmlns:pvml="urn:schemas-microsoft-com:office:powerpoint" xmlns:com="http://schemas.openxmlformats.org/drawingml/2006/compatibility" xmlns:p14="http://schemas.microsoft.com/office/powerpoint/2010/main" xmlns:p15="http://schemas.microsoft.com/office/powerpoint/2012/main" autoCompressPictures="0" strictFirstAndLastChars="0" saveSubsetFonts="1">
+<p:presentation xmlns:a="http://schemas.openxmlformats.org/drawingml/2006/main" xmlns:r="http://schemas.openxmlformats.org/officeDocument/2006/relationships" xmlns:p="http://schemas.openxmlformats.org/presentationml/2006/main" strictFirstAndLastChars="0" saveSubsetFonts="1" autoCompressPictures="0">
   <p:sldMasterIdLst>
-    <p:sldMasterId id="2147483659" r:id="rId4"/>
+    <p:sldMasterId id="2147483659" r:id="rId1"/>
   </p:sldMasterIdLst>
   <p:notesMasterIdLst>
-    <p:notesMasterId r:id="rId5"/>
+    <p:notesMasterId r:id="rId7"/>
   </p:notesMasterIdLst>
   <p:sldIdLst>
-    <p:sldId id="256" r:id="rId6"/>
-    <p:sldId id="257" r:id="rId7"/>
-    <p:sldId id="258" r:id="rId8"/>
+    <p:sldId id="256" r:id="rId2"/>
+    <p:sldId id="257" r:id="rId3"/>
+    <p:sldId id="258" r:id="rId4"/>
+    <p:sldId id="260" r:id="rId5"/>
+    <p:sldId id="261" r:id="rId6"/>
   </p:sldIdLst>
-  <p:sldSz cy="5143500" cx="9144000"/>
+  <p:sldSz cx="9144000" cy="5143500" type="screen16x9"/>
   <p:notesSz cx="6858000" cy="9144000"/>
   <p:defaultTextStyle>
-    <a:defPPr lvl="0" marR="0" rtl="0" algn="l">
+    <a:defPPr marR="0" lvl="0" algn="l" rtl="0">
       <a:lnSpc>
         <a:spcPct val="100000"/>
       </a:lnSpc>
@@ -26,7 +28,7 @@
         <a:spcPts val="0"/>
       </a:spcAft>
     </a:defPPr>
-    <a:lvl1pPr lvl="0" marR="0" rtl="0" algn="l">
+    <a:lvl1pPr marR="0" lvl="0" algn="l" rtl="0">
       <a:lnSpc>
         <a:spcPct val="100000"/>
       </a:lnSpc>
@@ -40,7 +42,7 @@
         <a:srgbClr val="000000"/>
       </a:buClr>
       <a:buFont typeface="Arial"/>
-      <a:defRPr b="0" i="0" sz="1400" u="none" cap="none" strike="noStrike">
+      <a:defRPr sz="1400" b="0" i="0" u="none" strike="noStrike" cap="none">
         <a:solidFill>
           <a:srgbClr val="000000"/>
         </a:solidFill>
@@ -50,7 +52,7 @@
         <a:sym typeface="Arial"/>
       </a:defRPr>
     </a:lvl1pPr>
-    <a:lvl2pPr lvl="1" marR="0" rtl="0" algn="l">
+    <a:lvl2pPr marR="0" lvl="1" algn="l" rtl="0">
       <a:lnSpc>
         <a:spcPct val="100000"/>
       </a:lnSpc>
@@ -64,7 +66,7 @@
         <a:srgbClr val="000000"/>
       </a:buClr>
       <a:buFont typeface="Arial"/>
-      <a:defRPr b="0" i="0" sz="1400" u="none" cap="none" strike="noStrike">
+      <a:defRPr sz="1400" b="0" i="0" u="none" strike="noStrike" cap="none">
         <a:solidFill>
           <a:srgbClr val="000000"/>
         </a:solidFill>
@@ -74,7 +76,7 @@
         <a:sym typeface="Arial"/>
       </a:defRPr>
     </a:lvl2pPr>
-    <a:lvl3pPr lvl="2" marR="0" rtl="0" algn="l">
+    <a:lvl3pPr marR="0" lvl="2" algn="l" rtl="0">
       <a:lnSpc>
         <a:spcPct val="100000"/>
       </a:lnSpc>
@@ -88,7 +90,7 @@
         <a:srgbClr val="000000"/>
       </a:buClr>
       <a:buFont typeface="Arial"/>
-      <a:defRPr b="0" i="0" sz="1400" u="none" cap="none" strike="noStrike">
+      <a:defRPr sz="1400" b="0" i="0" u="none" strike="noStrike" cap="none">
         <a:solidFill>
           <a:srgbClr val="000000"/>
         </a:solidFill>
@@ -98,7 +100,7 @@
         <a:sym typeface="Arial"/>
       </a:defRPr>
     </a:lvl3pPr>
-    <a:lvl4pPr lvl="3" marR="0" rtl="0" algn="l">
+    <a:lvl4pPr marR="0" lvl="3" algn="l" rtl="0">
       <a:lnSpc>
         <a:spcPct val="100000"/>
       </a:lnSpc>
@@ -112,7 +114,7 @@
         <a:srgbClr val="000000"/>
       </a:buClr>
       <a:buFont typeface="Arial"/>
-      <a:defRPr b="0" i="0" sz="1400" u="none" cap="none" strike="noStrike">
+      <a:defRPr sz="1400" b="0" i="0" u="none" strike="noStrike" cap="none">
         <a:solidFill>
           <a:srgbClr val="000000"/>
         </a:solidFill>
@@ -122,7 +124,7 @@
         <a:sym typeface="Arial"/>
       </a:defRPr>
     </a:lvl4pPr>
-    <a:lvl5pPr lvl="4" marR="0" rtl="0" algn="l">
+    <a:lvl5pPr marR="0" lvl="4" algn="l" rtl="0">
       <a:lnSpc>
         <a:spcPct val="100000"/>
       </a:lnSpc>
@@ -136,7 +138,7 @@
         <a:srgbClr val="000000"/>
       </a:buClr>
       <a:buFont typeface="Arial"/>
-      <a:defRPr b="0" i="0" sz="1400" u="none" cap="none" strike="noStrike">
+      <a:defRPr sz="1400" b="0" i="0" u="none" strike="noStrike" cap="none">
         <a:solidFill>
           <a:srgbClr val="000000"/>
         </a:solidFill>
@@ -146,7 +148,7 @@
         <a:sym typeface="Arial"/>
       </a:defRPr>
     </a:lvl5pPr>
-    <a:lvl6pPr lvl="5" marR="0" rtl="0" algn="l">
+    <a:lvl6pPr marR="0" lvl="5" algn="l" rtl="0">
       <a:lnSpc>
         <a:spcPct val="100000"/>
       </a:lnSpc>
@@ -160,7 +162,7 @@
         <a:srgbClr val="000000"/>
       </a:buClr>
       <a:buFont typeface="Arial"/>
-      <a:defRPr b="0" i="0" sz="1400" u="none" cap="none" strike="noStrike">
+      <a:defRPr sz="1400" b="0" i="0" u="none" strike="noStrike" cap="none">
         <a:solidFill>
           <a:srgbClr val="000000"/>
         </a:solidFill>
@@ -170,7 +172,7 @@
         <a:sym typeface="Arial"/>
       </a:defRPr>
     </a:lvl6pPr>
-    <a:lvl7pPr lvl="6" marR="0" rtl="0" algn="l">
+    <a:lvl7pPr marR="0" lvl="6" algn="l" rtl="0">
       <a:lnSpc>
         <a:spcPct val="100000"/>
       </a:lnSpc>
@@ -184,7 +186,7 @@
         <a:srgbClr val="000000"/>
       </a:buClr>
       <a:buFont typeface="Arial"/>
-      <a:defRPr b="0" i="0" sz="1400" u="none" cap="none" strike="noStrike">
+      <a:defRPr sz="1400" b="0" i="0" u="none" strike="noStrike" cap="none">
         <a:solidFill>
           <a:srgbClr val="000000"/>
         </a:solidFill>
@@ -194,7 +196,7 @@
         <a:sym typeface="Arial"/>
       </a:defRPr>
     </a:lvl7pPr>
-    <a:lvl8pPr lvl="7" marR="0" rtl="0" algn="l">
+    <a:lvl8pPr marR="0" lvl="7" algn="l" rtl="0">
       <a:lnSpc>
         <a:spcPct val="100000"/>
       </a:lnSpc>
@@ -208,7 +210,7 @@
         <a:srgbClr val="000000"/>
       </a:buClr>
       <a:buFont typeface="Arial"/>
-      <a:defRPr b="0" i="0" sz="1400" u="none" cap="none" strike="noStrike">
+      <a:defRPr sz="1400" b="0" i="0" u="none" strike="noStrike" cap="none">
         <a:solidFill>
           <a:srgbClr val="000000"/>
         </a:solidFill>
@@ -218,7 +220,7 @@
         <a:sym typeface="Arial"/>
       </a:defRPr>
     </a:lvl8pPr>
-    <a:lvl9pPr lvl="8" marR="0" rtl="0" algn="l">
+    <a:lvl9pPr marR="0" lvl="8" algn="l" rtl="0">
       <a:lnSpc>
         <a:spcPct val="100000"/>
       </a:lnSpc>
@@ -232,7 +234,7 @@
         <a:srgbClr val="000000"/>
       </a:buClr>
       <a:buFont typeface="Arial"/>
-      <a:defRPr b="0" i="0" sz="1400" u="none" cap="none" strike="noStrike">
+      <a:defRPr sz="1400" b="0" i="0" u="none" strike="noStrike" cap="none">
         <a:solidFill>
           <a:srgbClr val="000000"/>
         </a:solidFill>
@@ -245,7 +247,7 @@
   </p:defaultTextStyle>
   <p:extLst>
     <p:ext uri="{EFAFB233-063F-42B5-8137-9DF3F51BA10A}">
-      <p15:sldGuideLst>
+      <p15:sldGuideLst xmlns:p15="http://schemas.microsoft.com/office/powerpoint/2012/main">
         <p15:guide id="1" orient="horz" pos="1620">
           <p15:clr>
             <a:srgbClr val="A4A3A4"/>
@@ -263,11 +265,16 @@
 </file>
 
 <file path=ppt/notesMasters/notesMaster1.xml><?xml version="1.0" encoding="utf-8"?>
-<p:notesMaster xmlns:a="http://schemas.openxmlformats.org/drawingml/2006/main" xmlns:r="http://schemas.openxmlformats.org/officeDocument/2006/relationships" xmlns:mc="http://schemas.openxmlformats.org/markup-compatibility/2006" xmlns:mv="urn:schemas-microsoft-com:mac:vml" xmlns:p="http://schemas.openxmlformats.org/presentationml/2006/main" xmlns:c="http://schemas.openxmlformats.org/drawingml/2006/chart" xmlns:dgm="http://schemas.openxmlformats.org/drawingml/2006/diagram" xmlns:o="urn:schemas-microsoft-com:office:office" xmlns:v="urn:schemas-microsoft-com:vml" xmlns:pvml="urn:schemas-microsoft-com:office:powerpoint" xmlns:com="http://schemas.openxmlformats.org/drawingml/2006/compatibility" xmlns:p14="http://schemas.microsoft.com/office/powerpoint/2010/main" xmlns:p15="http://schemas.microsoft.com/office/powerpoint/2012/main">
+<p:notesMaster xmlns:a="http://schemas.openxmlformats.org/drawingml/2006/main" xmlns:r="http://schemas.openxmlformats.org/officeDocument/2006/relationships" xmlns:p="http://schemas.openxmlformats.org/presentationml/2006/main">
   <p:cSld>
+    <p:bg>
+      <p:bgRef idx="1001">
+        <a:schemeClr val="bg1"/>
+      </p:bgRef>
+    </p:bg>
     <p:spTree>
       <p:nvGrpSpPr>
-        <p:cNvPr id="2" name="Shape 2"/>
+        <p:cNvPr id="1" name="Shape 2"/>
         <p:cNvGrpSpPr/>
         <p:nvPr/>
       </p:nvGrpSpPr>
@@ -282,9 +289,11 @@
       <p:sp>
         <p:nvSpPr>
           <p:cNvPr id="3" name="Google Shape;3;n"/>
-          <p:cNvSpPr/>
+          <p:cNvSpPr>
+            <a:spLocks noGrp="1" noRot="1" noChangeAspect="1"/>
+          </p:cNvSpPr>
           <p:nvPr>
-            <p:ph idx="2" type="sldImg"/>
+            <p:ph type="sldImg" idx="2"/>
           </p:nvPr>
         </p:nvSpPr>
         <p:spPr>
@@ -293,9 +302,13 @@
             <a:ext cx="6096075" cy="3429000"/>
           </a:xfrm>
           <a:custGeom>
-            <a:rect b="b" l="l" r="r" t="t"/>
+            <a:avLst/>
+            <a:gdLst/>
+            <a:ahLst/>
+            <a:cxnLst/>
+            <a:rect l="l" t="t" r="r" b="b"/>
             <a:pathLst>
-              <a:path extrusionOk="0" h="120000" w="120000">
+              <a:path w="120000" h="120000" extrusionOk="0">
                 <a:moveTo>
                   <a:pt x="0" y="0"/>
                 </a:moveTo>
@@ -313,23 +326,25 @@
             </a:pathLst>
           </a:custGeom>
           <a:noFill/>
-          <a:ln cap="flat" cmpd="sng" w="9525">
+          <a:ln w="9525" cap="flat" cmpd="sng">
             <a:solidFill>
               <a:srgbClr val="000000"/>
             </a:solidFill>
             <a:prstDash val="solid"/>
             <a:round/>
-            <a:headEnd len="sm" w="sm" type="none"/>
-            <a:tailEnd len="sm" w="sm" type="none"/>
+            <a:headEnd type="none" w="sm" len="sm"/>
+            <a:tailEnd type="none" w="sm" len="sm"/>
           </a:ln>
         </p:spPr>
       </p:sp>
       <p:sp>
         <p:nvSpPr>
           <p:cNvPr id="4" name="Google Shape;4;n"/>
-          <p:cNvSpPr txBox="1"/>
+          <p:cNvSpPr txBox="1">
+            <a:spLocks noGrp="1"/>
+          </p:cNvSpPr>
           <p:nvPr>
-            <p:ph idx="1" type="body"/>
+            <p:ph type="body" idx="1"/>
           </p:nvPr>
         </p:nvSpPr>
         <p:spPr>
@@ -346,11 +361,11 @@
           </a:ln>
         </p:spPr>
         <p:txBody>
-          <a:bodyPr anchorCtr="0" anchor="t" bIns="91425" lIns="91425" spcFirstLastPara="1" rIns="91425" wrap="square" tIns="91425">
+          <a:bodyPr spcFirstLastPara="1" wrap="square" lIns="91425" tIns="91425" rIns="91425" bIns="91425" anchor="t" anchorCtr="0">
             <a:noAutofit/>
           </a:bodyPr>
           <a:lstStyle>
-            <a:lvl1pPr indent="-298450" lvl="0" marL="457200">
+            <a:lvl1pPr marL="457200" lvl="0" indent="-298450">
               <a:spcBef>
                 <a:spcPts val="0"/>
               </a:spcBef>
@@ -361,7 +376,7 @@
               <a:buChar char="●"/>
               <a:defRPr sz="1100"/>
             </a:lvl1pPr>
-            <a:lvl2pPr indent="-298450" lvl="1" marL="914400">
+            <a:lvl2pPr marL="914400" lvl="1" indent="-298450">
               <a:spcBef>
                 <a:spcPts val="0"/>
               </a:spcBef>
@@ -372,7 +387,7 @@
               <a:buChar char="○"/>
               <a:defRPr sz="1100"/>
             </a:lvl2pPr>
-            <a:lvl3pPr indent="-298450" lvl="2" marL="1371600">
+            <a:lvl3pPr marL="1371600" lvl="2" indent="-298450">
               <a:spcBef>
                 <a:spcPts val="0"/>
               </a:spcBef>
@@ -383,7 +398,7 @@
               <a:buChar char="■"/>
               <a:defRPr sz="1100"/>
             </a:lvl3pPr>
-            <a:lvl4pPr indent="-298450" lvl="3" marL="1828800">
+            <a:lvl4pPr marL="1828800" lvl="3" indent="-298450">
               <a:spcBef>
                 <a:spcPts val="0"/>
               </a:spcBef>
@@ -394,7 +409,7 @@
               <a:buChar char="●"/>
               <a:defRPr sz="1100"/>
             </a:lvl4pPr>
-            <a:lvl5pPr indent="-298450" lvl="4" marL="2286000">
+            <a:lvl5pPr marL="2286000" lvl="4" indent="-298450">
               <a:spcBef>
                 <a:spcPts val="0"/>
               </a:spcBef>
@@ -405,7 +420,7 @@
               <a:buChar char="○"/>
               <a:defRPr sz="1100"/>
             </a:lvl5pPr>
-            <a:lvl6pPr indent="-298450" lvl="5" marL="2743200">
+            <a:lvl6pPr marL="2743200" lvl="5" indent="-298450">
               <a:spcBef>
                 <a:spcPts val="0"/>
               </a:spcBef>
@@ -416,7 +431,7 @@
               <a:buChar char="■"/>
               <a:defRPr sz="1100"/>
             </a:lvl6pPr>
-            <a:lvl7pPr indent="-298450" lvl="6" marL="3200400">
+            <a:lvl7pPr marL="3200400" lvl="6" indent="-298450">
               <a:spcBef>
                 <a:spcPts val="0"/>
               </a:spcBef>
@@ -427,7 +442,7 @@
               <a:buChar char="●"/>
               <a:defRPr sz="1100"/>
             </a:lvl7pPr>
-            <a:lvl8pPr indent="-298450" lvl="7" marL="3657600">
+            <a:lvl8pPr marL="3657600" lvl="7" indent="-298450">
               <a:spcBef>
                 <a:spcPts val="0"/>
               </a:spcBef>
@@ -438,7 +453,7 @@
               <a:buChar char="○"/>
               <a:defRPr sz="1100"/>
             </a:lvl8pPr>
-            <a:lvl9pPr indent="-298450" lvl="8" marL="4114800">
+            <a:lvl9pPr marL="4114800" lvl="8" indent="-298450">
               <a:spcBef>
                 <a:spcPts val="0"/>
               </a:spcBef>
@@ -450,14 +465,16 @@
               <a:defRPr sz="1100"/>
             </a:lvl9pPr>
           </a:lstStyle>
-          <a:p/>
+          <a:p>
+            <a:endParaRPr/>
+          </a:p>
         </p:txBody>
       </p:sp>
     </p:spTree>
   </p:cSld>
-  <p:clrMap accent1="accent1" accent2="accent2" accent3="accent3" accent4="accent4" accent5="accent5" accent6="accent6" bg1="lt1" bg2="dk2" tx1="dk1" tx2="lt2" folHlink="folHlink" hlink="hlink"/>
+  <p:clrMap bg1="lt1" tx1="dk1" bg2="dk2" tx2="lt2" accent1="accent1" accent2="accent2" accent3="accent3" accent4="accent4" accent5="accent5" accent6="accent6" hlink="hlink" folHlink="folHlink"/>
   <p:notesStyle>
-    <a:defPPr lvl="0" marR="0" rtl="0" algn="l">
+    <a:defPPr marR="0" lvl="0" algn="l" rtl="0">
       <a:lnSpc>
         <a:spcPct val="100000"/>
       </a:lnSpc>
@@ -468,7 +485,7 @@
         <a:spcPts val="0"/>
       </a:spcAft>
     </a:defPPr>
-    <a:lvl1pPr lvl="0" marR="0" rtl="0" algn="l">
+    <a:lvl1pPr marR="0" lvl="0" algn="l" rtl="0">
       <a:lnSpc>
         <a:spcPct val="100000"/>
       </a:lnSpc>
@@ -482,7 +499,7 @@
         <a:srgbClr val="000000"/>
       </a:buClr>
       <a:buFont typeface="Arial"/>
-      <a:defRPr b="0" i="0" sz="1400" u="none" cap="none" strike="noStrike">
+      <a:defRPr sz="1400" b="0" i="0" u="none" strike="noStrike" cap="none">
         <a:solidFill>
           <a:srgbClr val="000000"/>
         </a:solidFill>
@@ -492,7 +509,7 @@
         <a:sym typeface="Arial"/>
       </a:defRPr>
     </a:lvl1pPr>
-    <a:lvl2pPr lvl="1" marR="0" rtl="0" algn="l">
+    <a:lvl2pPr marR="0" lvl="1" algn="l" rtl="0">
       <a:lnSpc>
         <a:spcPct val="100000"/>
       </a:lnSpc>
@@ -506,7 +523,7 @@
         <a:srgbClr val="000000"/>
       </a:buClr>
       <a:buFont typeface="Arial"/>
-      <a:defRPr b="0" i="0" sz="1400" u="none" cap="none" strike="noStrike">
+      <a:defRPr sz="1400" b="0" i="0" u="none" strike="noStrike" cap="none">
         <a:solidFill>
           <a:srgbClr val="000000"/>
         </a:solidFill>
@@ -516,7 +533,7 @@
         <a:sym typeface="Arial"/>
       </a:defRPr>
     </a:lvl2pPr>
-    <a:lvl3pPr lvl="2" marR="0" rtl="0" algn="l">
+    <a:lvl3pPr marR="0" lvl="2" algn="l" rtl="0">
       <a:lnSpc>
         <a:spcPct val="100000"/>
       </a:lnSpc>
@@ -530,7 +547,7 @@
         <a:srgbClr val="000000"/>
       </a:buClr>
       <a:buFont typeface="Arial"/>
-      <a:defRPr b="0" i="0" sz="1400" u="none" cap="none" strike="noStrike">
+      <a:defRPr sz="1400" b="0" i="0" u="none" strike="noStrike" cap="none">
         <a:solidFill>
           <a:srgbClr val="000000"/>
         </a:solidFill>
@@ -540,7 +557,7 @@
         <a:sym typeface="Arial"/>
       </a:defRPr>
     </a:lvl3pPr>
-    <a:lvl4pPr lvl="3" marR="0" rtl="0" algn="l">
+    <a:lvl4pPr marR="0" lvl="3" algn="l" rtl="0">
       <a:lnSpc>
         <a:spcPct val="100000"/>
       </a:lnSpc>
@@ -554,7 +571,7 @@
         <a:srgbClr val="000000"/>
       </a:buClr>
       <a:buFont typeface="Arial"/>
-      <a:defRPr b="0" i="0" sz="1400" u="none" cap="none" strike="noStrike">
+      <a:defRPr sz="1400" b="0" i="0" u="none" strike="noStrike" cap="none">
         <a:solidFill>
           <a:srgbClr val="000000"/>
         </a:solidFill>
@@ -564,7 +581,7 @@
         <a:sym typeface="Arial"/>
       </a:defRPr>
     </a:lvl4pPr>
-    <a:lvl5pPr lvl="4" marR="0" rtl="0" algn="l">
+    <a:lvl5pPr marR="0" lvl="4" algn="l" rtl="0">
       <a:lnSpc>
         <a:spcPct val="100000"/>
       </a:lnSpc>
@@ -578,7 +595,7 @@
         <a:srgbClr val="000000"/>
       </a:buClr>
       <a:buFont typeface="Arial"/>
-      <a:defRPr b="0" i="0" sz="1400" u="none" cap="none" strike="noStrike">
+      <a:defRPr sz="1400" b="0" i="0" u="none" strike="noStrike" cap="none">
         <a:solidFill>
           <a:srgbClr val="000000"/>
         </a:solidFill>
@@ -588,7 +605,7 @@
         <a:sym typeface="Arial"/>
       </a:defRPr>
     </a:lvl5pPr>
-    <a:lvl6pPr lvl="5" marR="0" rtl="0" algn="l">
+    <a:lvl6pPr marR="0" lvl="5" algn="l" rtl="0">
       <a:lnSpc>
         <a:spcPct val="100000"/>
       </a:lnSpc>
@@ -602,7 +619,7 @@
         <a:srgbClr val="000000"/>
       </a:buClr>
       <a:buFont typeface="Arial"/>
-      <a:defRPr b="0" i="0" sz="1400" u="none" cap="none" strike="noStrike">
+      <a:defRPr sz="1400" b="0" i="0" u="none" strike="noStrike" cap="none">
         <a:solidFill>
           <a:srgbClr val="000000"/>
         </a:solidFill>
@@ -612,7 +629,7 @@
         <a:sym typeface="Arial"/>
       </a:defRPr>
     </a:lvl6pPr>
-    <a:lvl7pPr lvl="6" marR="0" rtl="0" algn="l">
+    <a:lvl7pPr marR="0" lvl="6" algn="l" rtl="0">
       <a:lnSpc>
         <a:spcPct val="100000"/>
       </a:lnSpc>
@@ -626,7 +643,7 @@
         <a:srgbClr val="000000"/>
       </a:buClr>
       <a:buFont typeface="Arial"/>
-      <a:defRPr b="0" i="0" sz="1400" u="none" cap="none" strike="noStrike">
+      <a:defRPr sz="1400" b="0" i="0" u="none" strike="noStrike" cap="none">
         <a:solidFill>
           <a:srgbClr val="000000"/>
         </a:solidFill>
@@ -636,7 +653,7 @@
         <a:sym typeface="Arial"/>
       </a:defRPr>
     </a:lvl7pPr>
-    <a:lvl8pPr lvl="7" marR="0" rtl="0" algn="l">
+    <a:lvl8pPr marR="0" lvl="7" algn="l" rtl="0">
       <a:lnSpc>
         <a:spcPct val="100000"/>
       </a:lnSpc>
@@ -650,7 +667,7 @@
         <a:srgbClr val="000000"/>
       </a:buClr>
       <a:buFont typeface="Arial"/>
-      <a:defRPr b="0" i="0" sz="1400" u="none" cap="none" strike="noStrike">
+      <a:defRPr sz="1400" b="0" i="0" u="none" strike="noStrike" cap="none">
         <a:solidFill>
           <a:srgbClr val="000000"/>
         </a:solidFill>
@@ -660,7 +677,7 @@
         <a:sym typeface="Arial"/>
       </a:defRPr>
     </a:lvl8pPr>
-    <a:lvl9pPr lvl="8" marR="0" rtl="0" algn="l">
+    <a:lvl9pPr marR="0" lvl="8" algn="l" rtl="0">
       <a:lnSpc>
         <a:spcPct val="100000"/>
       </a:lnSpc>
@@ -674,7 +691,7 @@
         <a:srgbClr val="000000"/>
       </a:buClr>
       <a:buFont typeface="Arial"/>
-      <a:defRPr b="0" i="0" sz="1400" u="none" cap="none" strike="noStrike">
+      <a:defRPr sz="1400" b="0" i="0" u="none" strike="noStrike" cap="none">
         <a:solidFill>
           <a:srgbClr val="000000"/>
         </a:solidFill>
@@ -689,11 +706,11 @@
 </file>
 
 <file path=ppt/notesSlides/notesSlide1.xml><?xml version="1.0" encoding="utf-8"?>
-<p:notes xmlns:a="http://schemas.openxmlformats.org/drawingml/2006/main" xmlns:r="http://schemas.openxmlformats.org/officeDocument/2006/relationships" xmlns:mc="http://schemas.openxmlformats.org/markup-compatibility/2006" xmlns:mv="urn:schemas-microsoft-com:mac:vml" xmlns:p="http://schemas.openxmlformats.org/presentationml/2006/main" xmlns:c="http://schemas.openxmlformats.org/drawingml/2006/chart" xmlns:dgm="http://schemas.openxmlformats.org/drawingml/2006/diagram" xmlns:o="urn:schemas-microsoft-com:office:office" xmlns:v="urn:schemas-microsoft-com:vml" xmlns:pvml="urn:schemas-microsoft-com:office:powerpoint" xmlns:com="http://schemas.openxmlformats.org/drawingml/2006/compatibility" xmlns:p14="http://schemas.microsoft.com/office/powerpoint/2010/main" xmlns:p15="http://schemas.microsoft.com/office/powerpoint/2012/main" showMasterPhAnim="0" showMasterSp="0">
+<p:notes xmlns:a="http://schemas.openxmlformats.org/drawingml/2006/main" xmlns:r="http://schemas.openxmlformats.org/officeDocument/2006/relationships" xmlns:p="http://schemas.openxmlformats.org/presentationml/2006/main" showMasterSp="0" showMasterPhAnim="0">
   <p:cSld>
     <p:spTree>
       <p:nvGrpSpPr>
-        <p:cNvPr id="50" name="Shape 50"/>
+        <p:cNvPr id="1" name="Shape 50"/>
         <p:cNvGrpSpPr/>
         <p:nvPr/>
       </p:nvGrpSpPr>
@@ -708,20 +725,26 @@
       <p:sp>
         <p:nvSpPr>
           <p:cNvPr id="51" name="Google Shape;51;p:notes"/>
-          <p:cNvSpPr/>
+          <p:cNvSpPr>
+            <a:spLocks noGrp="1" noRot="1" noChangeAspect="1"/>
+          </p:cNvSpPr>
           <p:nvPr>
-            <p:ph idx="2" type="sldImg"/>
+            <p:ph type="sldImg" idx="2"/>
           </p:nvPr>
         </p:nvSpPr>
         <p:spPr>
           <a:xfrm>
-            <a:off x="381300" y="685800"/>
-            <a:ext cx="6096075" cy="3429000"/>
+            <a:off x="381000" y="685800"/>
+            <a:ext cx="6096000" cy="3429000"/>
           </a:xfrm>
           <a:custGeom>
-            <a:rect b="b" l="l" r="r" t="t"/>
+            <a:avLst/>
+            <a:gdLst/>
+            <a:ahLst/>
+            <a:cxnLst/>
+            <a:rect l="l" t="t" r="r" b="b"/>
             <a:pathLst>
-              <a:path extrusionOk="0" h="120000" w="120000">
+              <a:path w="120000" h="120000" extrusionOk="0">
                 <a:moveTo>
                   <a:pt x="0" y="0"/>
                 </a:moveTo>
@@ -743,9 +766,11 @@
       <p:sp>
         <p:nvSpPr>
           <p:cNvPr id="52" name="Google Shape;52;p:notes"/>
-          <p:cNvSpPr txBox="1"/>
+          <p:cNvSpPr txBox="1">
+            <a:spLocks noGrp="1"/>
+          </p:cNvSpPr>
           <p:nvPr>
-            <p:ph idx="1" type="body"/>
+            <p:ph type="body" idx="1"/>
           </p:nvPr>
         </p:nvSpPr>
         <p:spPr>
@@ -758,12 +783,12 @@
           </a:prstGeom>
         </p:spPr>
         <p:txBody>
-          <a:bodyPr anchorCtr="0" anchor="t" bIns="91425" lIns="91425" spcFirstLastPara="1" rIns="91425" wrap="square" tIns="91425">
+          <a:bodyPr spcFirstLastPara="1" wrap="square" lIns="91425" tIns="91425" rIns="91425" bIns="91425" anchor="t" anchorCtr="0">
             <a:noAutofit/>
           </a:bodyPr>
           <a:lstStyle/>
           <a:p>
-            <a:pPr indent="0" lvl="0" marL="0" rtl="0" algn="l">
+            <a:pPr marL="0" lvl="0" indent="0" algn="l" rtl="0">
               <a:spcBef>
                 <a:spcPts val="0"/>
               </a:spcBef>
@@ -772,9 +797,6 @@
               </a:spcAft>
               <a:buNone/>
             </a:pPr>
-            <a:r>
-              <a:t/>
-            </a:r>
             <a:endParaRPr/>
           </a:p>
         </p:txBody>
@@ -788,11 +810,11 @@
 </file>
 
 <file path=ppt/notesSlides/notesSlide2.xml><?xml version="1.0" encoding="utf-8"?>
-<p:notes xmlns:a="http://schemas.openxmlformats.org/drawingml/2006/main" xmlns:r="http://schemas.openxmlformats.org/officeDocument/2006/relationships" xmlns:mc="http://schemas.openxmlformats.org/markup-compatibility/2006" xmlns:mv="urn:schemas-microsoft-com:mac:vml" xmlns:p="http://schemas.openxmlformats.org/presentationml/2006/main" xmlns:c="http://schemas.openxmlformats.org/drawingml/2006/chart" xmlns:dgm="http://schemas.openxmlformats.org/drawingml/2006/diagram" xmlns:o="urn:schemas-microsoft-com:office:office" xmlns:v="urn:schemas-microsoft-com:vml" xmlns:pvml="urn:schemas-microsoft-com:office:powerpoint" xmlns:com="http://schemas.openxmlformats.org/drawingml/2006/compatibility" xmlns:p14="http://schemas.microsoft.com/office/powerpoint/2010/main" xmlns:p15="http://schemas.microsoft.com/office/powerpoint/2012/main" showMasterPhAnim="0" showMasterSp="0">
+<p:notes xmlns:a="http://schemas.openxmlformats.org/drawingml/2006/main" xmlns:r="http://schemas.openxmlformats.org/officeDocument/2006/relationships" xmlns:p="http://schemas.openxmlformats.org/presentationml/2006/main" showMasterSp="0" showMasterPhAnim="0">
   <p:cSld>
     <p:spTree>
       <p:nvGrpSpPr>
-        <p:cNvPr id="56" name="Shape 56"/>
+        <p:cNvPr id="1" name="Shape 56"/>
         <p:cNvGrpSpPr/>
         <p:nvPr/>
       </p:nvGrpSpPr>
@@ -807,9 +829,11 @@
       <p:sp>
         <p:nvSpPr>
           <p:cNvPr id="57" name="Google Shape;57;g80026473fe_0_55:notes"/>
-          <p:cNvSpPr/>
+          <p:cNvSpPr>
+            <a:spLocks noGrp="1" noRot="1" noChangeAspect="1"/>
+          </p:cNvSpPr>
           <p:nvPr>
-            <p:ph idx="2" type="sldImg"/>
+            <p:ph type="sldImg" idx="2"/>
           </p:nvPr>
         </p:nvSpPr>
         <p:spPr>
@@ -818,9 +842,13 @@
             <a:ext cx="6096000" cy="3429000"/>
           </a:xfrm>
           <a:custGeom>
-            <a:rect b="b" l="l" r="r" t="t"/>
+            <a:avLst/>
+            <a:gdLst/>
+            <a:ahLst/>
+            <a:cxnLst/>
+            <a:rect l="l" t="t" r="r" b="b"/>
             <a:pathLst>
-              <a:path extrusionOk="0" h="120000" w="120000">
+              <a:path w="120000" h="120000" extrusionOk="0">
                 <a:moveTo>
                   <a:pt x="0" y="0"/>
                 </a:moveTo>
@@ -842,9 +870,11 @@
       <p:sp>
         <p:nvSpPr>
           <p:cNvPr id="58" name="Google Shape;58;g80026473fe_0_55:notes"/>
-          <p:cNvSpPr txBox="1"/>
+          <p:cNvSpPr txBox="1">
+            <a:spLocks noGrp="1"/>
+          </p:cNvSpPr>
           <p:nvPr>
-            <p:ph idx="1" type="body"/>
+            <p:ph type="body" idx="1"/>
           </p:nvPr>
         </p:nvSpPr>
         <p:spPr>
@@ -857,12 +887,12 @@
           </a:prstGeom>
         </p:spPr>
         <p:txBody>
-          <a:bodyPr anchorCtr="0" anchor="t" bIns="91425" lIns="91425" spcFirstLastPara="1" rIns="91425" wrap="square" tIns="91425">
+          <a:bodyPr spcFirstLastPara="1" wrap="square" lIns="91425" tIns="91425" rIns="91425" bIns="91425" anchor="t" anchorCtr="0">
             <a:noAutofit/>
           </a:bodyPr>
           <a:lstStyle/>
           <a:p>
-            <a:pPr indent="0" lvl="0" marL="0" rtl="0" algn="l">
+            <a:pPr marL="0" lvl="0" indent="0" algn="l" rtl="0">
               <a:spcBef>
                 <a:spcPts val="0"/>
               </a:spcBef>
@@ -871,9 +901,6 @@
               </a:spcAft>
               <a:buNone/>
             </a:pPr>
-            <a:r>
-              <a:t/>
-            </a:r>
             <a:endParaRPr/>
           </a:p>
         </p:txBody>
@@ -887,11 +914,11 @@
 </file>
 
 <file path=ppt/notesSlides/notesSlide3.xml><?xml version="1.0" encoding="utf-8"?>
-<p:notes xmlns:a="http://schemas.openxmlformats.org/drawingml/2006/main" xmlns:r="http://schemas.openxmlformats.org/officeDocument/2006/relationships" xmlns:mc="http://schemas.openxmlformats.org/markup-compatibility/2006" xmlns:mv="urn:schemas-microsoft-com:mac:vml" xmlns:p="http://schemas.openxmlformats.org/presentationml/2006/main" xmlns:c="http://schemas.openxmlformats.org/drawingml/2006/chart" xmlns:dgm="http://schemas.openxmlformats.org/drawingml/2006/diagram" xmlns:o="urn:schemas-microsoft-com:office:office" xmlns:v="urn:schemas-microsoft-com:vml" xmlns:pvml="urn:schemas-microsoft-com:office:powerpoint" xmlns:com="http://schemas.openxmlformats.org/drawingml/2006/compatibility" xmlns:p14="http://schemas.microsoft.com/office/powerpoint/2010/main" xmlns:p15="http://schemas.microsoft.com/office/powerpoint/2012/main" showMasterPhAnim="0" showMasterSp="0">
+<p:notes xmlns:a="http://schemas.openxmlformats.org/drawingml/2006/main" xmlns:r="http://schemas.openxmlformats.org/officeDocument/2006/relationships" xmlns:p="http://schemas.openxmlformats.org/presentationml/2006/main" showMasterSp="0" showMasterPhAnim="0">
   <p:cSld>
     <p:spTree>
       <p:nvGrpSpPr>
-        <p:cNvPr id="65" name="Shape 65"/>
+        <p:cNvPr id="1" name="Shape 65"/>
         <p:cNvGrpSpPr/>
         <p:nvPr/>
       </p:nvGrpSpPr>
@@ -906,9 +933,11 @@
       <p:sp>
         <p:nvSpPr>
           <p:cNvPr id="66" name="Google Shape;66;g80026473fe_0_50:notes"/>
-          <p:cNvSpPr/>
+          <p:cNvSpPr>
+            <a:spLocks noGrp="1" noRot="1" noChangeAspect="1"/>
+          </p:cNvSpPr>
           <p:nvPr>
-            <p:ph idx="2" type="sldImg"/>
+            <p:ph type="sldImg" idx="2"/>
           </p:nvPr>
         </p:nvSpPr>
         <p:spPr>
@@ -917,9 +946,13 @@
             <a:ext cx="6096000" cy="3429000"/>
           </a:xfrm>
           <a:custGeom>
-            <a:rect b="b" l="l" r="r" t="t"/>
+            <a:avLst/>
+            <a:gdLst/>
+            <a:ahLst/>
+            <a:cxnLst/>
+            <a:rect l="l" t="t" r="r" b="b"/>
             <a:pathLst>
-              <a:path extrusionOk="0" h="120000" w="120000">
+              <a:path w="120000" h="120000" extrusionOk="0">
                 <a:moveTo>
                   <a:pt x="0" y="0"/>
                 </a:moveTo>
@@ -941,9 +974,11 @@
       <p:sp>
         <p:nvSpPr>
           <p:cNvPr id="67" name="Google Shape;67;g80026473fe_0_50:notes"/>
-          <p:cNvSpPr txBox="1"/>
+          <p:cNvSpPr txBox="1">
+            <a:spLocks noGrp="1"/>
+          </p:cNvSpPr>
           <p:nvPr>
-            <p:ph idx="1" type="body"/>
+            <p:ph type="body" idx="1"/>
           </p:nvPr>
         </p:nvSpPr>
         <p:spPr>
@@ -956,12 +991,12 @@
           </a:prstGeom>
         </p:spPr>
         <p:txBody>
-          <a:bodyPr anchorCtr="0" anchor="t" bIns="91425" lIns="91425" spcFirstLastPara="1" rIns="91425" wrap="square" tIns="91425">
+          <a:bodyPr spcFirstLastPara="1" wrap="square" lIns="91425" tIns="91425" rIns="91425" bIns="91425" anchor="t" anchorCtr="0">
             <a:noAutofit/>
           </a:bodyPr>
           <a:lstStyle/>
           <a:p>
-            <a:pPr indent="0" lvl="0" marL="0" rtl="0" algn="l">
+            <a:pPr marL="0" lvl="0" indent="0" algn="l" rtl="0">
               <a:spcBef>
                 <a:spcPts val="0"/>
               </a:spcBef>
@@ -970,9 +1005,6 @@
               </a:spcAft>
               <a:buNone/>
             </a:pPr>
-            <a:r>
-              <a:t/>
-            </a:r>
             <a:endParaRPr/>
           </a:p>
         </p:txBody>
@@ -986,11 +1018,11 @@
 </file>
 
 <file path=ppt/slideLayouts/slideLayout1.xml><?xml version="1.0" encoding="utf-8"?>
-<p:sldLayout xmlns:a="http://schemas.openxmlformats.org/drawingml/2006/main" xmlns:r="http://schemas.openxmlformats.org/officeDocument/2006/relationships" xmlns:mc="http://schemas.openxmlformats.org/markup-compatibility/2006" xmlns:mv="urn:schemas-microsoft-com:mac:vml" xmlns:p="http://schemas.openxmlformats.org/presentationml/2006/main" xmlns:c="http://schemas.openxmlformats.org/drawingml/2006/chart" xmlns:dgm="http://schemas.openxmlformats.org/drawingml/2006/diagram" xmlns:o="urn:schemas-microsoft-com:office:office" xmlns:v="urn:schemas-microsoft-com:vml" xmlns:pvml="urn:schemas-microsoft-com:office:powerpoint" xmlns:com="http://schemas.openxmlformats.org/drawingml/2006/compatibility" xmlns:p14="http://schemas.microsoft.com/office/powerpoint/2010/main" xmlns:p15="http://schemas.microsoft.com/office/powerpoint/2012/main" matchingName="Title slide" type="title">
+<p:sldLayout xmlns:a="http://schemas.openxmlformats.org/drawingml/2006/main" xmlns:r="http://schemas.openxmlformats.org/officeDocument/2006/relationships" xmlns:p="http://schemas.openxmlformats.org/presentationml/2006/main" matchingName="Title slide" type="title">
   <p:cSld name="TITLE">
     <p:spTree>
       <p:nvGrpSpPr>
-        <p:cNvPr id="9" name="Shape 9"/>
+        <p:cNvPr id="1" name="Shape 9"/>
         <p:cNvGrpSpPr/>
         <p:nvPr/>
       </p:nvGrpSpPr>
@@ -1005,7 +1037,9 @@
       <p:sp>
         <p:nvSpPr>
           <p:cNvPr id="10" name="Google Shape;10;p2"/>
-          <p:cNvSpPr txBox="1"/>
+          <p:cNvSpPr txBox="1">
+            <a:spLocks noGrp="1"/>
+          </p:cNvSpPr>
           <p:nvPr>
             <p:ph type="ctrTitle"/>
           </p:nvPr>
@@ -1020,7 +1054,7 @@
           </a:prstGeom>
         </p:spPr>
         <p:txBody>
-          <a:bodyPr anchorCtr="0" anchor="b" bIns="91425" lIns="91425" spcFirstLastPara="1" rIns="91425" wrap="square" tIns="91425">
+          <a:bodyPr spcFirstLastPara="1" wrap="square" lIns="91425" tIns="91425" rIns="91425" bIns="91425" anchor="b" anchorCtr="0">
             <a:noAutofit/>
           </a:bodyPr>
           <a:lstStyle>
@@ -1124,15 +1158,19 @@
               <a:defRPr sz="5200"/>
             </a:lvl9pPr>
           </a:lstStyle>
-          <a:p/>
+          <a:p>
+            <a:endParaRPr/>
+          </a:p>
         </p:txBody>
       </p:sp>
       <p:sp>
         <p:nvSpPr>
           <p:cNvPr id="11" name="Google Shape;11;p2"/>
-          <p:cNvSpPr txBox="1"/>
+          <p:cNvSpPr txBox="1">
+            <a:spLocks noGrp="1"/>
+          </p:cNvSpPr>
           <p:nvPr>
-            <p:ph idx="1" type="subTitle"/>
+            <p:ph type="subTitle" idx="1"/>
           </p:nvPr>
         </p:nvSpPr>
         <p:spPr>
@@ -1145,7 +1183,7 @@
           </a:prstGeom>
         </p:spPr>
         <p:txBody>
-          <a:bodyPr anchorCtr="0" anchor="t" bIns="91425" lIns="91425" spcFirstLastPara="1" rIns="91425" wrap="square" tIns="91425">
+          <a:bodyPr spcFirstLastPara="1" wrap="square" lIns="91425" tIns="91425" rIns="91425" bIns="91425" anchor="t" anchorCtr="0">
             <a:noAutofit/>
           </a:bodyPr>
           <a:lstStyle>
@@ -1276,15 +1314,19 @@
               <a:defRPr sz="2800"/>
             </a:lvl9pPr>
           </a:lstStyle>
-          <a:p/>
+          <a:p>
+            <a:endParaRPr/>
+          </a:p>
         </p:txBody>
       </p:sp>
       <p:sp>
         <p:nvSpPr>
           <p:cNvPr id="12" name="Google Shape;12;p2"/>
-          <p:cNvSpPr txBox="1"/>
+          <p:cNvSpPr txBox="1">
+            <a:spLocks noGrp="1"/>
+          </p:cNvSpPr>
           <p:nvPr>
-            <p:ph idx="12" type="sldNum"/>
+            <p:ph type="sldNum" idx="12"/>
           </p:nvPr>
         </p:nvSpPr>
         <p:spPr>
@@ -1297,7 +1339,7 @@
           </a:prstGeom>
         </p:spPr>
         <p:txBody>
-          <a:bodyPr anchorCtr="0" anchor="ctr" bIns="91425" lIns="91425" spcFirstLastPara="1" rIns="91425" wrap="square" tIns="91425">
+          <a:bodyPr spcFirstLastPara="1" wrap="square" lIns="91425" tIns="91425" rIns="91425" bIns="91425" anchor="ctr" anchorCtr="0">
             <a:noAutofit/>
           </a:bodyPr>
           <a:lstStyle>
@@ -1339,7 +1381,7 @@
             </a:lvl9pPr>
           </a:lstStyle>
           <a:p>
-            <a:pPr indent="0" lvl="0" marL="0" rtl="0" algn="r">
+            <a:pPr marL="0" lvl="0" indent="0" algn="r" rtl="0">
               <a:spcBef>
                 <a:spcPts val="0"/>
               </a:spcBef>
@@ -1365,11 +1407,11 @@
 </file>
 
 <file path=ppt/slideLayouts/slideLayout10.xml><?xml version="1.0" encoding="utf-8"?>
-<p:sldLayout xmlns:a="http://schemas.openxmlformats.org/drawingml/2006/main" xmlns:r="http://schemas.openxmlformats.org/officeDocument/2006/relationships" xmlns:mc="http://schemas.openxmlformats.org/markup-compatibility/2006" xmlns:mv="urn:schemas-microsoft-com:mac:vml" xmlns:p="http://schemas.openxmlformats.org/presentationml/2006/main" xmlns:c="http://schemas.openxmlformats.org/drawingml/2006/chart" xmlns:dgm="http://schemas.openxmlformats.org/drawingml/2006/diagram" xmlns:o="urn:schemas-microsoft-com:office:office" xmlns:v="urn:schemas-microsoft-com:vml" xmlns:pvml="urn:schemas-microsoft-com:office:powerpoint" xmlns:com="http://schemas.openxmlformats.org/drawingml/2006/compatibility" xmlns:p14="http://schemas.microsoft.com/office/powerpoint/2010/main" xmlns:p15="http://schemas.microsoft.com/office/powerpoint/2012/main" matchingName="Big number">
+<p:sldLayout xmlns:a="http://schemas.openxmlformats.org/drawingml/2006/main" xmlns:r="http://schemas.openxmlformats.org/officeDocument/2006/relationships" xmlns:p="http://schemas.openxmlformats.org/presentationml/2006/main" matchingName="Big number">
   <p:cSld name="BIG_NUMBER">
     <p:spTree>
       <p:nvGrpSpPr>
-        <p:cNvPr id="44" name="Shape 44"/>
+        <p:cNvPr id="1" name="Shape 44"/>
         <p:cNvGrpSpPr/>
         <p:nvPr/>
       </p:nvGrpSpPr>
@@ -1384,9 +1426,11 @@
       <p:sp>
         <p:nvSpPr>
           <p:cNvPr id="45" name="Google Shape;45;p11"/>
-          <p:cNvSpPr txBox="1"/>
+          <p:cNvSpPr txBox="1">
+            <a:spLocks noGrp="1"/>
+          </p:cNvSpPr>
           <p:nvPr>
-            <p:ph hasCustomPrompt="1" type="title"/>
+            <p:ph type="title" hasCustomPrompt="1"/>
           </p:nvPr>
         </p:nvSpPr>
         <p:spPr>
@@ -1399,7 +1443,7 @@
           </a:prstGeom>
         </p:spPr>
         <p:txBody>
-          <a:bodyPr anchorCtr="0" anchor="b" bIns="91425" lIns="91425" spcFirstLastPara="1" rIns="91425" wrap="square" tIns="91425">
+          <a:bodyPr spcFirstLastPara="1" wrap="square" lIns="91425" tIns="91425" rIns="91425" bIns="91425" anchor="b" anchorCtr="0">
             <a:noAutofit/>
           </a:bodyPr>
           <a:lstStyle>
@@ -1513,9 +1557,11 @@
       <p:sp>
         <p:nvSpPr>
           <p:cNvPr id="46" name="Google Shape;46;p11"/>
-          <p:cNvSpPr txBox="1"/>
+          <p:cNvSpPr txBox="1">
+            <a:spLocks noGrp="1"/>
+          </p:cNvSpPr>
           <p:nvPr>
-            <p:ph idx="1" type="body"/>
+            <p:ph type="body" idx="1"/>
           </p:nvPr>
         </p:nvSpPr>
         <p:spPr>
@@ -1528,11 +1574,11 @@
           </a:prstGeom>
         </p:spPr>
         <p:txBody>
-          <a:bodyPr anchorCtr="0" anchor="t" bIns="91425" lIns="91425" spcFirstLastPara="1" rIns="91425" wrap="square" tIns="91425">
+          <a:bodyPr spcFirstLastPara="1" wrap="square" lIns="91425" tIns="91425" rIns="91425" bIns="91425" anchor="t" anchorCtr="0">
             <a:noAutofit/>
           </a:bodyPr>
           <a:lstStyle>
-            <a:lvl1pPr indent="-342900" lvl="0" marL="457200" algn="ctr">
+            <a:lvl1pPr marL="457200" lvl="0" indent="-342900" algn="ctr">
               <a:spcBef>
                 <a:spcPts val="0"/>
               </a:spcBef>
@@ -1543,7 +1589,7 @@
               <a:buChar char="●"/>
               <a:defRPr/>
             </a:lvl1pPr>
-            <a:lvl2pPr indent="-317500" lvl="1" marL="914400" algn="ctr">
+            <a:lvl2pPr marL="914400" lvl="1" indent="-317500" algn="ctr">
               <a:spcBef>
                 <a:spcPts val="1600"/>
               </a:spcBef>
@@ -1554,7 +1600,7 @@
               <a:buChar char="○"/>
               <a:defRPr/>
             </a:lvl2pPr>
-            <a:lvl3pPr indent="-317500" lvl="2" marL="1371600" algn="ctr">
+            <a:lvl3pPr marL="1371600" lvl="2" indent="-317500" algn="ctr">
               <a:spcBef>
                 <a:spcPts val="1600"/>
               </a:spcBef>
@@ -1565,7 +1611,7 @@
               <a:buChar char="■"/>
               <a:defRPr/>
             </a:lvl3pPr>
-            <a:lvl4pPr indent="-317500" lvl="3" marL="1828800" algn="ctr">
+            <a:lvl4pPr marL="1828800" lvl="3" indent="-317500" algn="ctr">
               <a:spcBef>
                 <a:spcPts val="1600"/>
               </a:spcBef>
@@ -1576,7 +1622,7 @@
               <a:buChar char="●"/>
               <a:defRPr/>
             </a:lvl4pPr>
-            <a:lvl5pPr indent="-317500" lvl="4" marL="2286000" algn="ctr">
+            <a:lvl5pPr marL="2286000" lvl="4" indent="-317500" algn="ctr">
               <a:spcBef>
                 <a:spcPts val="1600"/>
               </a:spcBef>
@@ -1587,7 +1633,7 @@
               <a:buChar char="○"/>
               <a:defRPr/>
             </a:lvl5pPr>
-            <a:lvl6pPr indent="-317500" lvl="5" marL="2743200" algn="ctr">
+            <a:lvl6pPr marL="2743200" lvl="5" indent="-317500" algn="ctr">
               <a:spcBef>
                 <a:spcPts val="1600"/>
               </a:spcBef>
@@ -1598,7 +1644,7 @@
               <a:buChar char="■"/>
               <a:defRPr/>
             </a:lvl6pPr>
-            <a:lvl7pPr indent="-317500" lvl="6" marL="3200400" algn="ctr">
+            <a:lvl7pPr marL="3200400" lvl="6" indent="-317500" algn="ctr">
               <a:spcBef>
                 <a:spcPts val="1600"/>
               </a:spcBef>
@@ -1609,7 +1655,7 @@
               <a:buChar char="●"/>
               <a:defRPr/>
             </a:lvl7pPr>
-            <a:lvl8pPr indent="-317500" lvl="7" marL="3657600" algn="ctr">
+            <a:lvl8pPr marL="3657600" lvl="7" indent="-317500" algn="ctr">
               <a:spcBef>
                 <a:spcPts val="1600"/>
               </a:spcBef>
@@ -1620,7 +1666,7 @@
               <a:buChar char="○"/>
               <a:defRPr/>
             </a:lvl8pPr>
-            <a:lvl9pPr indent="-317500" lvl="8" marL="4114800" algn="ctr">
+            <a:lvl9pPr marL="4114800" lvl="8" indent="-317500" algn="ctr">
               <a:spcBef>
                 <a:spcPts val="1600"/>
               </a:spcBef>
@@ -1632,15 +1678,19 @@
               <a:defRPr/>
             </a:lvl9pPr>
           </a:lstStyle>
-          <a:p/>
+          <a:p>
+            <a:endParaRPr/>
+          </a:p>
         </p:txBody>
       </p:sp>
       <p:sp>
         <p:nvSpPr>
           <p:cNvPr id="47" name="Google Shape;47;p11"/>
-          <p:cNvSpPr txBox="1"/>
+          <p:cNvSpPr txBox="1">
+            <a:spLocks noGrp="1"/>
+          </p:cNvSpPr>
           <p:nvPr>
-            <p:ph idx="12" type="sldNum"/>
+            <p:ph type="sldNum" idx="12"/>
           </p:nvPr>
         </p:nvSpPr>
         <p:spPr>
@@ -1653,7 +1703,7 @@
           </a:prstGeom>
         </p:spPr>
         <p:txBody>
-          <a:bodyPr anchorCtr="0" anchor="ctr" bIns="91425" lIns="91425" spcFirstLastPara="1" rIns="91425" wrap="square" tIns="91425">
+          <a:bodyPr spcFirstLastPara="1" wrap="square" lIns="91425" tIns="91425" rIns="91425" bIns="91425" anchor="ctr" anchorCtr="0">
             <a:noAutofit/>
           </a:bodyPr>
           <a:lstStyle>
@@ -1695,7 +1745,7 @@
             </a:lvl9pPr>
           </a:lstStyle>
           <a:p>
-            <a:pPr indent="0" lvl="0" marL="0" rtl="0" algn="r">
+            <a:pPr marL="0" lvl="0" indent="0" algn="r" rtl="0">
               <a:spcBef>
                 <a:spcPts val="0"/>
               </a:spcBef>
@@ -1721,11 +1771,11 @@
 </file>
 
 <file path=ppt/slideLayouts/slideLayout11.xml><?xml version="1.0" encoding="utf-8"?>
-<p:sldLayout xmlns:a="http://schemas.openxmlformats.org/drawingml/2006/main" xmlns:r="http://schemas.openxmlformats.org/officeDocument/2006/relationships" xmlns:mc="http://schemas.openxmlformats.org/markup-compatibility/2006" xmlns:mv="urn:schemas-microsoft-com:mac:vml" xmlns:p="http://schemas.openxmlformats.org/presentationml/2006/main" xmlns:c="http://schemas.openxmlformats.org/drawingml/2006/chart" xmlns:dgm="http://schemas.openxmlformats.org/drawingml/2006/diagram" xmlns:o="urn:schemas-microsoft-com:office:office" xmlns:v="urn:schemas-microsoft-com:vml" xmlns:pvml="urn:schemas-microsoft-com:office:powerpoint" xmlns:com="http://schemas.openxmlformats.org/drawingml/2006/compatibility" xmlns:p14="http://schemas.microsoft.com/office/powerpoint/2010/main" xmlns:p15="http://schemas.microsoft.com/office/powerpoint/2012/main" matchingName="Blank" type="blank">
+<p:sldLayout xmlns:a="http://schemas.openxmlformats.org/drawingml/2006/main" xmlns:r="http://schemas.openxmlformats.org/officeDocument/2006/relationships" xmlns:p="http://schemas.openxmlformats.org/presentationml/2006/main" matchingName="Blank" type="blank">
   <p:cSld name="BLANK">
     <p:spTree>
       <p:nvGrpSpPr>
-        <p:cNvPr id="48" name="Shape 48"/>
+        <p:cNvPr id="1" name="Shape 48"/>
         <p:cNvGrpSpPr/>
         <p:nvPr/>
       </p:nvGrpSpPr>
@@ -1740,9 +1790,11 @@
       <p:sp>
         <p:nvSpPr>
           <p:cNvPr id="49" name="Google Shape;49;p12"/>
-          <p:cNvSpPr txBox="1"/>
+          <p:cNvSpPr txBox="1">
+            <a:spLocks noGrp="1"/>
+          </p:cNvSpPr>
           <p:nvPr>
-            <p:ph idx="12" type="sldNum"/>
+            <p:ph type="sldNum" idx="12"/>
           </p:nvPr>
         </p:nvSpPr>
         <p:spPr>
@@ -1755,7 +1807,7 @@
           </a:prstGeom>
         </p:spPr>
         <p:txBody>
-          <a:bodyPr anchorCtr="0" anchor="ctr" bIns="91425" lIns="91425" spcFirstLastPara="1" rIns="91425" wrap="square" tIns="91425">
+          <a:bodyPr spcFirstLastPara="1" wrap="square" lIns="91425" tIns="91425" rIns="91425" bIns="91425" anchor="ctr" anchorCtr="0">
             <a:noAutofit/>
           </a:bodyPr>
           <a:lstStyle>
@@ -1797,7 +1849,7 @@
             </a:lvl9pPr>
           </a:lstStyle>
           <a:p>
-            <a:pPr indent="0" lvl="0" marL="0" rtl="0" algn="r">
+            <a:pPr marL="0" lvl="0" indent="0" algn="r" rtl="0">
               <a:spcBef>
                 <a:spcPts val="0"/>
               </a:spcBef>
@@ -1823,11 +1875,11 @@
 </file>
 
 <file path=ppt/slideLayouts/slideLayout2.xml><?xml version="1.0" encoding="utf-8"?>
-<p:sldLayout xmlns:a="http://schemas.openxmlformats.org/drawingml/2006/main" xmlns:r="http://schemas.openxmlformats.org/officeDocument/2006/relationships" xmlns:mc="http://schemas.openxmlformats.org/markup-compatibility/2006" xmlns:mv="urn:schemas-microsoft-com:mac:vml" xmlns:p="http://schemas.openxmlformats.org/presentationml/2006/main" xmlns:c="http://schemas.openxmlformats.org/drawingml/2006/chart" xmlns:dgm="http://schemas.openxmlformats.org/drawingml/2006/diagram" xmlns:o="urn:schemas-microsoft-com:office:office" xmlns:v="urn:schemas-microsoft-com:vml" xmlns:pvml="urn:schemas-microsoft-com:office:powerpoint" xmlns:com="http://schemas.openxmlformats.org/drawingml/2006/compatibility" xmlns:p14="http://schemas.microsoft.com/office/powerpoint/2010/main" xmlns:p15="http://schemas.microsoft.com/office/powerpoint/2012/main" matchingName="Section header" type="secHead">
+<p:sldLayout xmlns:a="http://schemas.openxmlformats.org/drawingml/2006/main" xmlns:r="http://schemas.openxmlformats.org/officeDocument/2006/relationships" xmlns:p="http://schemas.openxmlformats.org/presentationml/2006/main" matchingName="Section header" type="secHead">
   <p:cSld name="SECTION_HEADER">
     <p:spTree>
       <p:nvGrpSpPr>
-        <p:cNvPr id="13" name="Shape 13"/>
+        <p:cNvPr id="1" name="Shape 13"/>
         <p:cNvGrpSpPr/>
         <p:nvPr/>
       </p:nvGrpSpPr>
@@ -1842,7 +1894,9 @@
       <p:sp>
         <p:nvSpPr>
           <p:cNvPr id="14" name="Google Shape;14;p3"/>
-          <p:cNvSpPr txBox="1"/>
+          <p:cNvSpPr txBox="1">
+            <a:spLocks noGrp="1"/>
+          </p:cNvSpPr>
           <p:nvPr>
             <p:ph type="title"/>
           </p:nvPr>
@@ -1857,7 +1911,7 @@
           </a:prstGeom>
         </p:spPr>
         <p:txBody>
-          <a:bodyPr anchorCtr="0" anchor="ctr" bIns="91425" lIns="91425" spcFirstLastPara="1" rIns="91425" wrap="square" tIns="91425">
+          <a:bodyPr spcFirstLastPara="1" wrap="square" lIns="91425" tIns="91425" rIns="91425" bIns="91425" anchor="ctr" anchorCtr="0">
             <a:noAutofit/>
           </a:bodyPr>
           <a:lstStyle>
@@ -1961,15 +2015,19 @@
               <a:defRPr sz="3600"/>
             </a:lvl9pPr>
           </a:lstStyle>
-          <a:p/>
+          <a:p>
+            <a:endParaRPr/>
+          </a:p>
         </p:txBody>
       </p:sp>
       <p:sp>
         <p:nvSpPr>
           <p:cNvPr id="15" name="Google Shape;15;p3"/>
-          <p:cNvSpPr txBox="1"/>
+          <p:cNvSpPr txBox="1">
+            <a:spLocks noGrp="1"/>
+          </p:cNvSpPr>
           <p:nvPr>
-            <p:ph idx="12" type="sldNum"/>
+            <p:ph type="sldNum" idx="12"/>
           </p:nvPr>
         </p:nvSpPr>
         <p:spPr>
@@ -1982,7 +2040,7 @@
           </a:prstGeom>
         </p:spPr>
         <p:txBody>
-          <a:bodyPr anchorCtr="0" anchor="ctr" bIns="91425" lIns="91425" spcFirstLastPara="1" rIns="91425" wrap="square" tIns="91425">
+          <a:bodyPr spcFirstLastPara="1" wrap="square" lIns="91425" tIns="91425" rIns="91425" bIns="91425" anchor="ctr" anchorCtr="0">
             <a:noAutofit/>
           </a:bodyPr>
           <a:lstStyle>
@@ -2024,7 +2082,7 @@
             </a:lvl9pPr>
           </a:lstStyle>
           <a:p>
-            <a:pPr indent="0" lvl="0" marL="0" rtl="0" algn="r">
+            <a:pPr marL="0" lvl="0" indent="0" algn="r" rtl="0">
               <a:spcBef>
                 <a:spcPts val="0"/>
               </a:spcBef>
@@ -2050,11 +2108,11 @@
 </file>
 
 <file path=ppt/slideLayouts/slideLayout3.xml><?xml version="1.0" encoding="utf-8"?>
-<p:sldLayout xmlns:a="http://schemas.openxmlformats.org/drawingml/2006/main" xmlns:r="http://schemas.openxmlformats.org/officeDocument/2006/relationships" xmlns:mc="http://schemas.openxmlformats.org/markup-compatibility/2006" xmlns:mv="urn:schemas-microsoft-com:mac:vml" xmlns:p="http://schemas.openxmlformats.org/presentationml/2006/main" xmlns:c="http://schemas.openxmlformats.org/drawingml/2006/chart" xmlns:dgm="http://schemas.openxmlformats.org/drawingml/2006/diagram" xmlns:o="urn:schemas-microsoft-com:office:office" xmlns:v="urn:schemas-microsoft-com:vml" xmlns:pvml="urn:schemas-microsoft-com:office:powerpoint" xmlns:com="http://schemas.openxmlformats.org/drawingml/2006/compatibility" xmlns:p14="http://schemas.microsoft.com/office/powerpoint/2010/main" xmlns:p15="http://schemas.microsoft.com/office/powerpoint/2012/main" matchingName="Title and body" type="tx">
+<p:sldLayout xmlns:a="http://schemas.openxmlformats.org/drawingml/2006/main" xmlns:r="http://schemas.openxmlformats.org/officeDocument/2006/relationships" xmlns:p="http://schemas.openxmlformats.org/presentationml/2006/main" matchingName="Title and body" type="tx">
   <p:cSld name="TITLE_AND_BODY">
     <p:spTree>
       <p:nvGrpSpPr>
-        <p:cNvPr id="16" name="Shape 16"/>
+        <p:cNvPr id="1" name="Shape 16"/>
         <p:cNvGrpSpPr/>
         <p:nvPr/>
       </p:nvGrpSpPr>
@@ -2069,7 +2127,9 @@
       <p:sp>
         <p:nvSpPr>
           <p:cNvPr id="17" name="Google Shape;17;p4"/>
-          <p:cNvSpPr txBox="1"/>
+          <p:cNvSpPr txBox="1">
+            <a:spLocks noGrp="1"/>
+          </p:cNvSpPr>
           <p:nvPr>
             <p:ph type="title"/>
           </p:nvPr>
@@ -2084,7 +2144,7 @@
           </a:prstGeom>
         </p:spPr>
         <p:txBody>
-          <a:bodyPr anchorCtr="0" anchor="t" bIns="91425" lIns="91425" spcFirstLastPara="1" rIns="91425" wrap="square" tIns="91425">
+          <a:bodyPr spcFirstLastPara="1" wrap="square" lIns="91425" tIns="91425" rIns="91425" bIns="91425" anchor="t" anchorCtr="0">
             <a:noAutofit/>
           </a:bodyPr>
           <a:lstStyle>
@@ -2188,15 +2248,19 @@
               <a:defRPr/>
             </a:lvl9pPr>
           </a:lstStyle>
-          <a:p/>
+          <a:p>
+            <a:endParaRPr/>
+          </a:p>
         </p:txBody>
       </p:sp>
       <p:sp>
         <p:nvSpPr>
           <p:cNvPr id="18" name="Google Shape;18;p4"/>
-          <p:cNvSpPr txBox="1"/>
+          <p:cNvSpPr txBox="1">
+            <a:spLocks noGrp="1"/>
+          </p:cNvSpPr>
           <p:nvPr>
-            <p:ph idx="1" type="body"/>
+            <p:ph type="body" idx="1"/>
           </p:nvPr>
         </p:nvSpPr>
         <p:spPr>
@@ -2209,11 +2273,11 @@
           </a:prstGeom>
         </p:spPr>
         <p:txBody>
-          <a:bodyPr anchorCtr="0" anchor="t" bIns="91425" lIns="91425" spcFirstLastPara="1" rIns="91425" wrap="square" tIns="91425">
+          <a:bodyPr spcFirstLastPara="1" wrap="square" lIns="91425" tIns="91425" rIns="91425" bIns="91425" anchor="t" anchorCtr="0">
             <a:noAutofit/>
           </a:bodyPr>
           <a:lstStyle>
-            <a:lvl1pPr indent="-342900" lvl="0" marL="457200">
+            <a:lvl1pPr marL="457200" lvl="0" indent="-342900">
               <a:spcBef>
                 <a:spcPts val="0"/>
               </a:spcBef>
@@ -2224,7 +2288,7 @@
               <a:buChar char="●"/>
               <a:defRPr/>
             </a:lvl1pPr>
-            <a:lvl2pPr indent="-317500" lvl="1" marL="914400">
+            <a:lvl2pPr marL="914400" lvl="1" indent="-317500">
               <a:spcBef>
                 <a:spcPts val="1600"/>
               </a:spcBef>
@@ -2235,7 +2299,7 @@
               <a:buChar char="○"/>
               <a:defRPr/>
             </a:lvl2pPr>
-            <a:lvl3pPr indent="-317500" lvl="2" marL="1371600">
+            <a:lvl3pPr marL="1371600" lvl="2" indent="-317500">
               <a:spcBef>
                 <a:spcPts val="1600"/>
               </a:spcBef>
@@ -2246,7 +2310,7 @@
               <a:buChar char="■"/>
               <a:defRPr/>
             </a:lvl3pPr>
-            <a:lvl4pPr indent="-317500" lvl="3" marL="1828800">
+            <a:lvl4pPr marL="1828800" lvl="3" indent="-317500">
               <a:spcBef>
                 <a:spcPts val="1600"/>
               </a:spcBef>
@@ -2257,7 +2321,7 @@
               <a:buChar char="●"/>
               <a:defRPr/>
             </a:lvl4pPr>
-            <a:lvl5pPr indent="-317500" lvl="4" marL="2286000">
+            <a:lvl5pPr marL="2286000" lvl="4" indent="-317500">
               <a:spcBef>
                 <a:spcPts val="1600"/>
               </a:spcBef>
@@ -2268,7 +2332,7 @@
               <a:buChar char="○"/>
               <a:defRPr/>
             </a:lvl5pPr>
-            <a:lvl6pPr indent="-317500" lvl="5" marL="2743200">
+            <a:lvl6pPr marL="2743200" lvl="5" indent="-317500">
               <a:spcBef>
                 <a:spcPts val="1600"/>
               </a:spcBef>
@@ -2279,7 +2343,7 @@
               <a:buChar char="■"/>
               <a:defRPr/>
             </a:lvl6pPr>
-            <a:lvl7pPr indent="-317500" lvl="6" marL="3200400">
+            <a:lvl7pPr marL="3200400" lvl="6" indent="-317500">
               <a:spcBef>
                 <a:spcPts val="1600"/>
               </a:spcBef>
@@ -2290,7 +2354,7 @@
               <a:buChar char="●"/>
               <a:defRPr/>
             </a:lvl7pPr>
-            <a:lvl8pPr indent="-317500" lvl="7" marL="3657600">
+            <a:lvl8pPr marL="3657600" lvl="7" indent="-317500">
               <a:spcBef>
                 <a:spcPts val="1600"/>
               </a:spcBef>
@@ -2301,7 +2365,7 @@
               <a:buChar char="○"/>
               <a:defRPr/>
             </a:lvl8pPr>
-            <a:lvl9pPr indent="-317500" lvl="8" marL="4114800">
+            <a:lvl9pPr marL="4114800" lvl="8" indent="-317500">
               <a:spcBef>
                 <a:spcPts val="1600"/>
               </a:spcBef>
@@ -2313,15 +2377,19 @@
               <a:defRPr/>
             </a:lvl9pPr>
           </a:lstStyle>
-          <a:p/>
+          <a:p>
+            <a:endParaRPr/>
+          </a:p>
         </p:txBody>
       </p:sp>
       <p:sp>
         <p:nvSpPr>
           <p:cNvPr id="19" name="Google Shape;19;p4"/>
-          <p:cNvSpPr txBox="1"/>
+          <p:cNvSpPr txBox="1">
+            <a:spLocks noGrp="1"/>
+          </p:cNvSpPr>
           <p:nvPr>
-            <p:ph idx="12" type="sldNum"/>
+            <p:ph type="sldNum" idx="12"/>
           </p:nvPr>
         </p:nvSpPr>
         <p:spPr>
@@ -2334,7 +2402,7 @@
           </a:prstGeom>
         </p:spPr>
         <p:txBody>
-          <a:bodyPr anchorCtr="0" anchor="ctr" bIns="91425" lIns="91425" spcFirstLastPara="1" rIns="91425" wrap="square" tIns="91425">
+          <a:bodyPr spcFirstLastPara="1" wrap="square" lIns="91425" tIns="91425" rIns="91425" bIns="91425" anchor="ctr" anchorCtr="0">
             <a:noAutofit/>
           </a:bodyPr>
           <a:lstStyle>
@@ -2376,7 +2444,7 @@
             </a:lvl9pPr>
           </a:lstStyle>
           <a:p>
-            <a:pPr indent="0" lvl="0" marL="0" rtl="0" algn="r">
+            <a:pPr marL="0" lvl="0" indent="0" algn="r" rtl="0">
               <a:spcBef>
                 <a:spcPts val="0"/>
               </a:spcBef>
@@ -2402,11 +2470,11 @@
 </file>
 
 <file path=ppt/slideLayouts/slideLayout4.xml><?xml version="1.0" encoding="utf-8"?>
-<p:sldLayout xmlns:a="http://schemas.openxmlformats.org/drawingml/2006/main" xmlns:r="http://schemas.openxmlformats.org/officeDocument/2006/relationships" xmlns:mc="http://schemas.openxmlformats.org/markup-compatibility/2006" xmlns:mv="urn:schemas-microsoft-com:mac:vml" xmlns:p="http://schemas.openxmlformats.org/presentationml/2006/main" xmlns:c="http://schemas.openxmlformats.org/drawingml/2006/chart" xmlns:dgm="http://schemas.openxmlformats.org/drawingml/2006/diagram" xmlns:o="urn:schemas-microsoft-com:office:office" xmlns:v="urn:schemas-microsoft-com:vml" xmlns:pvml="urn:schemas-microsoft-com:office:powerpoint" xmlns:com="http://schemas.openxmlformats.org/drawingml/2006/compatibility" xmlns:p14="http://schemas.microsoft.com/office/powerpoint/2010/main" xmlns:p15="http://schemas.microsoft.com/office/powerpoint/2012/main" matchingName="Title and two columns" type="twoColTx">
+<p:sldLayout xmlns:a="http://schemas.openxmlformats.org/drawingml/2006/main" xmlns:r="http://schemas.openxmlformats.org/officeDocument/2006/relationships" xmlns:p="http://schemas.openxmlformats.org/presentationml/2006/main" matchingName="Title and two columns" type="twoColTx">
   <p:cSld name="TITLE_AND_TWO_COLUMNS">
     <p:spTree>
       <p:nvGrpSpPr>
-        <p:cNvPr id="20" name="Shape 20"/>
+        <p:cNvPr id="1" name="Shape 20"/>
         <p:cNvGrpSpPr/>
         <p:nvPr/>
       </p:nvGrpSpPr>
@@ -2421,7 +2489,9 @@
       <p:sp>
         <p:nvSpPr>
           <p:cNvPr id="21" name="Google Shape;21;p5"/>
-          <p:cNvSpPr txBox="1"/>
+          <p:cNvSpPr txBox="1">
+            <a:spLocks noGrp="1"/>
+          </p:cNvSpPr>
           <p:nvPr>
             <p:ph type="title"/>
           </p:nvPr>
@@ -2436,7 +2506,7 @@
           </a:prstGeom>
         </p:spPr>
         <p:txBody>
-          <a:bodyPr anchorCtr="0" anchor="t" bIns="91425" lIns="91425" spcFirstLastPara="1" rIns="91425" wrap="square" tIns="91425">
+          <a:bodyPr spcFirstLastPara="1" wrap="square" lIns="91425" tIns="91425" rIns="91425" bIns="91425" anchor="t" anchorCtr="0">
             <a:noAutofit/>
           </a:bodyPr>
           <a:lstStyle>
@@ -2540,15 +2610,19 @@
               <a:defRPr/>
             </a:lvl9pPr>
           </a:lstStyle>
-          <a:p/>
+          <a:p>
+            <a:endParaRPr/>
+          </a:p>
         </p:txBody>
       </p:sp>
       <p:sp>
         <p:nvSpPr>
           <p:cNvPr id="22" name="Google Shape;22;p5"/>
-          <p:cNvSpPr txBox="1"/>
+          <p:cNvSpPr txBox="1">
+            <a:spLocks noGrp="1"/>
+          </p:cNvSpPr>
           <p:nvPr>
-            <p:ph idx="1" type="body"/>
+            <p:ph type="body" idx="1"/>
           </p:nvPr>
         </p:nvSpPr>
         <p:spPr>
@@ -2561,11 +2635,11 @@
           </a:prstGeom>
         </p:spPr>
         <p:txBody>
-          <a:bodyPr anchorCtr="0" anchor="t" bIns="91425" lIns="91425" spcFirstLastPara="1" rIns="91425" wrap="square" tIns="91425">
+          <a:bodyPr spcFirstLastPara="1" wrap="square" lIns="91425" tIns="91425" rIns="91425" bIns="91425" anchor="t" anchorCtr="0">
             <a:noAutofit/>
           </a:bodyPr>
           <a:lstStyle>
-            <a:lvl1pPr indent="-317500" lvl="0" marL="457200">
+            <a:lvl1pPr marL="457200" lvl="0" indent="-317500">
               <a:spcBef>
                 <a:spcPts val="0"/>
               </a:spcBef>
@@ -2576,7 +2650,7 @@
               <a:buChar char="●"/>
               <a:defRPr sz="1400"/>
             </a:lvl1pPr>
-            <a:lvl2pPr indent="-304800" lvl="1" marL="914400">
+            <a:lvl2pPr marL="914400" lvl="1" indent="-304800">
               <a:spcBef>
                 <a:spcPts val="1600"/>
               </a:spcBef>
@@ -2587,7 +2661,7 @@
               <a:buChar char="○"/>
               <a:defRPr sz="1200"/>
             </a:lvl2pPr>
-            <a:lvl3pPr indent="-304800" lvl="2" marL="1371600">
+            <a:lvl3pPr marL="1371600" lvl="2" indent="-304800">
               <a:spcBef>
                 <a:spcPts val="1600"/>
               </a:spcBef>
@@ -2598,7 +2672,7 @@
               <a:buChar char="■"/>
               <a:defRPr sz="1200"/>
             </a:lvl3pPr>
-            <a:lvl4pPr indent="-304800" lvl="3" marL="1828800">
+            <a:lvl4pPr marL="1828800" lvl="3" indent="-304800">
               <a:spcBef>
                 <a:spcPts val="1600"/>
               </a:spcBef>
@@ -2609,7 +2683,7 @@
               <a:buChar char="●"/>
               <a:defRPr sz="1200"/>
             </a:lvl4pPr>
-            <a:lvl5pPr indent="-304800" lvl="4" marL="2286000">
+            <a:lvl5pPr marL="2286000" lvl="4" indent="-304800">
               <a:spcBef>
                 <a:spcPts val="1600"/>
               </a:spcBef>
@@ -2620,7 +2694,7 @@
               <a:buChar char="○"/>
               <a:defRPr sz="1200"/>
             </a:lvl5pPr>
-            <a:lvl6pPr indent="-304800" lvl="5" marL="2743200">
+            <a:lvl6pPr marL="2743200" lvl="5" indent="-304800">
               <a:spcBef>
                 <a:spcPts val="1600"/>
               </a:spcBef>
@@ -2631,7 +2705,7 @@
               <a:buChar char="■"/>
               <a:defRPr sz="1200"/>
             </a:lvl6pPr>
-            <a:lvl7pPr indent="-304800" lvl="6" marL="3200400">
+            <a:lvl7pPr marL="3200400" lvl="6" indent="-304800">
               <a:spcBef>
                 <a:spcPts val="1600"/>
               </a:spcBef>
@@ -2642,7 +2716,7 @@
               <a:buChar char="●"/>
               <a:defRPr sz="1200"/>
             </a:lvl7pPr>
-            <a:lvl8pPr indent="-304800" lvl="7" marL="3657600">
+            <a:lvl8pPr marL="3657600" lvl="7" indent="-304800">
               <a:spcBef>
                 <a:spcPts val="1600"/>
               </a:spcBef>
@@ -2653,7 +2727,7 @@
               <a:buChar char="○"/>
               <a:defRPr sz="1200"/>
             </a:lvl8pPr>
-            <a:lvl9pPr indent="-304800" lvl="8" marL="4114800">
+            <a:lvl9pPr marL="4114800" lvl="8" indent="-304800">
               <a:spcBef>
                 <a:spcPts val="1600"/>
               </a:spcBef>
@@ -2665,15 +2739,19 @@
               <a:defRPr sz="1200"/>
             </a:lvl9pPr>
           </a:lstStyle>
-          <a:p/>
+          <a:p>
+            <a:endParaRPr/>
+          </a:p>
         </p:txBody>
       </p:sp>
       <p:sp>
         <p:nvSpPr>
           <p:cNvPr id="23" name="Google Shape;23;p5"/>
-          <p:cNvSpPr txBox="1"/>
+          <p:cNvSpPr txBox="1">
+            <a:spLocks noGrp="1"/>
+          </p:cNvSpPr>
           <p:nvPr>
-            <p:ph idx="2" type="body"/>
+            <p:ph type="body" idx="2"/>
           </p:nvPr>
         </p:nvSpPr>
         <p:spPr>
@@ -2686,11 +2764,11 @@
           </a:prstGeom>
         </p:spPr>
         <p:txBody>
-          <a:bodyPr anchorCtr="0" anchor="t" bIns="91425" lIns="91425" spcFirstLastPara="1" rIns="91425" wrap="square" tIns="91425">
+          <a:bodyPr spcFirstLastPara="1" wrap="square" lIns="91425" tIns="91425" rIns="91425" bIns="91425" anchor="t" anchorCtr="0">
             <a:noAutofit/>
           </a:bodyPr>
           <a:lstStyle>
-            <a:lvl1pPr indent="-317500" lvl="0" marL="457200">
+            <a:lvl1pPr marL="457200" lvl="0" indent="-317500">
               <a:spcBef>
                 <a:spcPts val="0"/>
               </a:spcBef>
@@ -2701,7 +2779,7 @@
               <a:buChar char="●"/>
               <a:defRPr sz="1400"/>
             </a:lvl1pPr>
-            <a:lvl2pPr indent="-304800" lvl="1" marL="914400">
+            <a:lvl2pPr marL="914400" lvl="1" indent="-304800">
               <a:spcBef>
                 <a:spcPts val="1600"/>
               </a:spcBef>
@@ -2712,7 +2790,7 @@
               <a:buChar char="○"/>
               <a:defRPr sz="1200"/>
             </a:lvl2pPr>
-            <a:lvl3pPr indent="-304800" lvl="2" marL="1371600">
+            <a:lvl3pPr marL="1371600" lvl="2" indent="-304800">
               <a:spcBef>
                 <a:spcPts val="1600"/>
               </a:spcBef>
@@ -2723,7 +2801,7 @@
               <a:buChar char="■"/>
               <a:defRPr sz="1200"/>
             </a:lvl3pPr>
-            <a:lvl4pPr indent="-304800" lvl="3" marL="1828800">
+            <a:lvl4pPr marL="1828800" lvl="3" indent="-304800">
               <a:spcBef>
                 <a:spcPts val="1600"/>
               </a:spcBef>
@@ -2734,7 +2812,7 @@
               <a:buChar char="●"/>
               <a:defRPr sz="1200"/>
             </a:lvl4pPr>
-            <a:lvl5pPr indent="-304800" lvl="4" marL="2286000">
+            <a:lvl5pPr marL="2286000" lvl="4" indent="-304800">
               <a:spcBef>
                 <a:spcPts val="1600"/>
               </a:spcBef>
@@ -2745,7 +2823,7 @@
               <a:buChar char="○"/>
               <a:defRPr sz="1200"/>
             </a:lvl5pPr>
-            <a:lvl6pPr indent="-304800" lvl="5" marL="2743200">
+            <a:lvl6pPr marL="2743200" lvl="5" indent="-304800">
               <a:spcBef>
                 <a:spcPts val="1600"/>
               </a:spcBef>
@@ -2756,7 +2834,7 @@
               <a:buChar char="■"/>
               <a:defRPr sz="1200"/>
             </a:lvl6pPr>
-            <a:lvl7pPr indent="-304800" lvl="6" marL="3200400">
+            <a:lvl7pPr marL="3200400" lvl="6" indent="-304800">
               <a:spcBef>
                 <a:spcPts val="1600"/>
               </a:spcBef>
@@ -2767,7 +2845,7 @@
               <a:buChar char="●"/>
               <a:defRPr sz="1200"/>
             </a:lvl7pPr>
-            <a:lvl8pPr indent="-304800" lvl="7" marL="3657600">
+            <a:lvl8pPr marL="3657600" lvl="7" indent="-304800">
               <a:spcBef>
                 <a:spcPts val="1600"/>
               </a:spcBef>
@@ -2778,7 +2856,7 @@
               <a:buChar char="○"/>
               <a:defRPr sz="1200"/>
             </a:lvl8pPr>
-            <a:lvl9pPr indent="-304800" lvl="8" marL="4114800">
+            <a:lvl9pPr marL="4114800" lvl="8" indent="-304800">
               <a:spcBef>
                 <a:spcPts val="1600"/>
               </a:spcBef>
@@ -2790,15 +2868,19 @@
               <a:defRPr sz="1200"/>
             </a:lvl9pPr>
           </a:lstStyle>
-          <a:p/>
+          <a:p>
+            <a:endParaRPr/>
+          </a:p>
         </p:txBody>
       </p:sp>
       <p:sp>
         <p:nvSpPr>
           <p:cNvPr id="24" name="Google Shape;24;p5"/>
-          <p:cNvSpPr txBox="1"/>
+          <p:cNvSpPr txBox="1">
+            <a:spLocks noGrp="1"/>
+          </p:cNvSpPr>
           <p:nvPr>
-            <p:ph idx="12" type="sldNum"/>
+            <p:ph type="sldNum" idx="12"/>
           </p:nvPr>
         </p:nvSpPr>
         <p:spPr>
@@ -2811,7 +2893,7 @@
           </a:prstGeom>
         </p:spPr>
         <p:txBody>
-          <a:bodyPr anchorCtr="0" anchor="ctr" bIns="91425" lIns="91425" spcFirstLastPara="1" rIns="91425" wrap="square" tIns="91425">
+          <a:bodyPr spcFirstLastPara="1" wrap="square" lIns="91425" tIns="91425" rIns="91425" bIns="91425" anchor="ctr" anchorCtr="0">
             <a:noAutofit/>
           </a:bodyPr>
           <a:lstStyle>
@@ -2853,7 +2935,7 @@
             </a:lvl9pPr>
           </a:lstStyle>
           <a:p>
-            <a:pPr indent="0" lvl="0" marL="0" rtl="0" algn="r">
+            <a:pPr marL="0" lvl="0" indent="0" algn="r" rtl="0">
               <a:spcBef>
                 <a:spcPts val="0"/>
               </a:spcBef>
@@ -2879,11 +2961,11 @@
 </file>
 
 <file path=ppt/slideLayouts/slideLayout5.xml><?xml version="1.0" encoding="utf-8"?>
-<p:sldLayout xmlns:a="http://schemas.openxmlformats.org/drawingml/2006/main" xmlns:r="http://schemas.openxmlformats.org/officeDocument/2006/relationships" xmlns:mc="http://schemas.openxmlformats.org/markup-compatibility/2006" xmlns:mv="urn:schemas-microsoft-com:mac:vml" xmlns:p="http://schemas.openxmlformats.org/presentationml/2006/main" xmlns:c="http://schemas.openxmlformats.org/drawingml/2006/chart" xmlns:dgm="http://schemas.openxmlformats.org/drawingml/2006/diagram" xmlns:o="urn:schemas-microsoft-com:office:office" xmlns:v="urn:schemas-microsoft-com:vml" xmlns:pvml="urn:schemas-microsoft-com:office:powerpoint" xmlns:com="http://schemas.openxmlformats.org/drawingml/2006/compatibility" xmlns:p14="http://schemas.microsoft.com/office/powerpoint/2010/main" xmlns:p15="http://schemas.microsoft.com/office/powerpoint/2012/main" matchingName="Title only" type="titleOnly">
+<p:sldLayout xmlns:a="http://schemas.openxmlformats.org/drawingml/2006/main" xmlns:r="http://schemas.openxmlformats.org/officeDocument/2006/relationships" xmlns:p="http://schemas.openxmlformats.org/presentationml/2006/main" matchingName="Title only" type="titleOnly">
   <p:cSld name="TITLE_ONLY">
     <p:spTree>
       <p:nvGrpSpPr>
-        <p:cNvPr id="25" name="Shape 25"/>
+        <p:cNvPr id="1" name="Shape 25"/>
         <p:cNvGrpSpPr/>
         <p:nvPr/>
       </p:nvGrpSpPr>
@@ -2898,7 +2980,9 @@
       <p:sp>
         <p:nvSpPr>
           <p:cNvPr id="26" name="Google Shape;26;p6"/>
-          <p:cNvSpPr txBox="1"/>
+          <p:cNvSpPr txBox="1">
+            <a:spLocks noGrp="1"/>
+          </p:cNvSpPr>
           <p:nvPr>
             <p:ph type="title"/>
           </p:nvPr>
@@ -2913,7 +2997,7 @@
           </a:prstGeom>
         </p:spPr>
         <p:txBody>
-          <a:bodyPr anchorCtr="0" anchor="t" bIns="91425" lIns="91425" spcFirstLastPara="1" rIns="91425" wrap="square" tIns="91425">
+          <a:bodyPr spcFirstLastPara="1" wrap="square" lIns="91425" tIns="91425" rIns="91425" bIns="91425" anchor="t" anchorCtr="0">
             <a:noAutofit/>
           </a:bodyPr>
           <a:lstStyle>
@@ -3017,15 +3101,19 @@
               <a:defRPr/>
             </a:lvl9pPr>
           </a:lstStyle>
-          <a:p/>
+          <a:p>
+            <a:endParaRPr/>
+          </a:p>
         </p:txBody>
       </p:sp>
       <p:sp>
         <p:nvSpPr>
           <p:cNvPr id="27" name="Google Shape;27;p6"/>
-          <p:cNvSpPr txBox="1"/>
+          <p:cNvSpPr txBox="1">
+            <a:spLocks noGrp="1"/>
+          </p:cNvSpPr>
           <p:nvPr>
-            <p:ph idx="12" type="sldNum"/>
+            <p:ph type="sldNum" idx="12"/>
           </p:nvPr>
         </p:nvSpPr>
         <p:spPr>
@@ -3038,7 +3126,7 @@
           </a:prstGeom>
         </p:spPr>
         <p:txBody>
-          <a:bodyPr anchorCtr="0" anchor="ctr" bIns="91425" lIns="91425" spcFirstLastPara="1" rIns="91425" wrap="square" tIns="91425">
+          <a:bodyPr spcFirstLastPara="1" wrap="square" lIns="91425" tIns="91425" rIns="91425" bIns="91425" anchor="ctr" anchorCtr="0">
             <a:noAutofit/>
           </a:bodyPr>
           <a:lstStyle>
@@ -3080,7 +3168,7 @@
             </a:lvl9pPr>
           </a:lstStyle>
           <a:p>
-            <a:pPr indent="0" lvl="0" marL="0" rtl="0" algn="r">
+            <a:pPr marL="0" lvl="0" indent="0" algn="r" rtl="0">
               <a:spcBef>
                 <a:spcPts val="0"/>
               </a:spcBef>
@@ -3106,11 +3194,11 @@
 </file>
 
 <file path=ppt/slideLayouts/slideLayout6.xml><?xml version="1.0" encoding="utf-8"?>
-<p:sldLayout xmlns:a="http://schemas.openxmlformats.org/drawingml/2006/main" xmlns:r="http://schemas.openxmlformats.org/officeDocument/2006/relationships" xmlns:mc="http://schemas.openxmlformats.org/markup-compatibility/2006" xmlns:mv="urn:schemas-microsoft-com:mac:vml" xmlns:p="http://schemas.openxmlformats.org/presentationml/2006/main" xmlns:c="http://schemas.openxmlformats.org/drawingml/2006/chart" xmlns:dgm="http://schemas.openxmlformats.org/drawingml/2006/diagram" xmlns:o="urn:schemas-microsoft-com:office:office" xmlns:v="urn:schemas-microsoft-com:vml" xmlns:pvml="urn:schemas-microsoft-com:office:powerpoint" xmlns:com="http://schemas.openxmlformats.org/drawingml/2006/compatibility" xmlns:p14="http://schemas.microsoft.com/office/powerpoint/2010/main" xmlns:p15="http://schemas.microsoft.com/office/powerpoint/2012/main" matchingName="One column text">
+<p:sldLayout xmlns:a="http://schemas.openxmlformats.org/drawingml/2006/main" xmlns:r="http://schemas.openxmlformats.org/officeDocument/2006/relationships" xmlns:p="http://schemas.openxmlformats.org/presentationml/2006/main" matchingName="One column text">
   <p:cSld name="ONE_COLUMN_TEXT">
     <p:spTree>
       <p:nvGrpSpPr>
-        <p:cNvPr id="28" name="Shape 28"/>
+        <p:cNvPr id="1" name="Shape 28"/>
         <p:cNvGrpSpPr/>
         <p:nvPr/>
       </p:nvGrpSpPr>
@@ -3125,7 +3213,9 @@
       <p:sp>
         <p:nvSpPr>
           <p:cNvPr id="29" name="Google Shape;29;p7"/>
-          <p:cNvSpPr txBox="1"/>
+          <p:cNvSpPr txBox="1">
+            <a:spLocks noGrp="1"/>
+          </p:cNvSpPr>
           <p:nvPr>
             <p:ph type="title"/>
           </p:nvPr>
@@ -3140,7 +3230,7 @@
           </a:prstGeom>
         </p:spPr>
         <p:txBody>
-          <a:bodyPr anchorCtr="0" anchor="b" bIns="91425" lIns="91425" spcFirstLastPara="1" rIns="91425" wrap="square" tIns="91425">
+          <a:bodyPr spcFirstLastPara="1" wrap="square" lIns="91425" tIns="91425" rIns="91425" bIns="91425" anchor="b" anchorCtr="0">
             <a:noAutofit/>
           </a:bodyPr>
           <a:lstStyle>
@@ -3244,15 +3334,19 @@
               <a:defRPr sz="2400"/>
             </a:lvl9pPr>
           </a:lstStyle>
-          <a:p/>
+          <a:p>
+            <a:endParaRPr/>
+          </a:p>
         </p:txBody>
       </p:sp>
       <p:sp>
         <p:nvSpPr>
           <p:cNvPr id="30" name="Google Shape;30;p7"/>
-          <p:cNvSpPr txBox="1"/>
+          <p:cNvSpPr txBox="1">
+            <a:spLocks noGrp="1"/>
+          </p:cNvSpPr>
           <p:nvPr>
-            <p:ph idx="1" type="body"/>
+            <p:ph type="body" idx="1"/>
           </p:nvPr>
         </p:nvSpPr>
         <p:spPr>
@@ -3265,11 +3359,11 @@
           </a:prstGeom>
         </p:spPr>
         <p:txBody>
-          <a:bodyPr anchorCtr="0" anchor="t" bIns="91425" lIns="91425" spcFirstLastPara="1" rIns="91425" wrap="square" tIns="91425">
+          <a:bodyPr spcFirstLastPara="1" wrap="square" lIns="91425" tIns="91425" rIns="91425" bIns="91425" anchor="t" anchorCtr="0">
             <a:noAutofit/>
           </a:bodyPr>
           <a:lstStyle>
-            <a:lvl1pPr indent="-304800" lvl="0" marL="457200">
+            <a:lvl1pPr marL="457200" lvl="0" indent="-304800">
               <a:spcBef>
                 <a:spcPts val="0"/>
               </a:spcBef>
@@ -3280,7 +3374,7 @@
               <a:buChar char="●"/>
               <a:defRPr sz="1200"/>
             </a:lvl1pPr>
-            <a:lvl2pPr indent="-304800" lvl="1" marL="914400">
+            <a:lvl2pPr marL="914400" lvl="1" indent="-304800">
               <a:spcBef>
                 <a:spcPts val="1600"/>
               </a:spcBef>
@@ -3291,7 +3385,7 @@
               <a:buChar char="○"/>
               <a:defRPr sz="1200"/>
             </a:lvl2pPr>
-            <a:lvl3pPr indent="-304800" lvl="2" marL="1371600">
+            <a:lvl3pPr marL="1371600" lvl="2" indent="-304800">
               <a:spcBef>
                 <a:spcPts val="1600"/>
               </a:spcBef>
@@ -3302,7 +3396,7 @@
               <a:buChar char="■"/>
               <a:defRPr sz="1200"/>
             </a:lvl3pPr>
-            <a:lvl4pPr indent="-304800" lvl="3" marL="1828800">
+            <a:lvl4pPr marL="1828800" lvl="3" indent="-304800">
               <a:spcBef>
                 <a:spcPts val="1600"/>
               </a:spcBef>
@@ -3313,7 +3407,7 @@
               <a:buChar char="●"/>
               <a:defRPr sz="1200"/>
             </a:lvl4pPr>
-            <a:lvl5pPr indent="-304800" lvl="4" marL="2286000">
+            <a:lvl5pPr marL="2286000" lvl="4" indent="-304800">
               <a:spcBef>
                 <a:spcPts val="1600"/>
               </a:spcBef>
@@ -3324,7 +3418,7 @@
               <a:buChar char="○"/>
               <a:defRPr sz="1200"/>
             </a:lvl5pPr>
-            <a:lvl6pPr indent="-304800" lvl="5" marL="2743200">
+            <a:lvl6pPr marL="2743200" lvl="5" indent="-304800">
               <a:spcBef>
                 <a:spcPts val="1600"/>
               </a:spcBef>
@@ -3335,7 +3429,7 @@
               <a:buChar char="■"/>
               <a:defRPr sz="1200"/>
             </a:lvl6pPr>
-            <a:lvl7pPr indent="-304800" lvl="6" marL="3200400">
+            <a:lvl7pPr marL="3200400" lvl="6" indent="-304800">
               <a:spcBef>
                 <a:spcPts val="1600"/>
               </a:spcBef>
@@ -3346,7 +3440,7 @@
               <a:buChar char="●"/>
               <a:defRPr sz="1200"/>
             </a:lvl7pPr>
-            <a:lvl8pPr indent="-304800" lvl="7" marL="3657600">
+            <a:lvl8pPr marL="3657600" lvl="7" indent="-304800">
               <a:spcBef>
                 <a:spcPts val="1600"/>
               </a:spcBef>
@@ -3357,7 +3451,7 @@
               <a:buChar char="○"/>
               <a:defRPr sz="1200"/>
             </a:lvl8pPr>
-            <a:lvl9pPr indent="-304800" lvl="8" marL="4114800">
+            <a:lvl9pPr marL="4114800" lvl="8" indent="-304800">
               <a:spcBef>
                 <a:spcPts val="1600"/>
               </a:spcBef>
@@ -3369,15 +3463,19 @@
               <a:defRPr sz="1200"/>
             </a:lvl9pPr>
           </a:lstStyle>
-          <a:p/>
+          <a:p>
+            <a:endParaRPr/>
+          </a:p>
         </p:txBody>
       </p:sp>
       <p:sp>
         <p:nvSpPr>
           <p:cNvPr id="31" name="Google Shape;31;p7"/>
-          <p:cNvSpPr txBox="1"/>
+          <p:cNvSpPr txBox="1">
+            <a:spLocks noGrp="1"/>
+          </p:cNvSpPr>
           <p:nvPr>
-            <p:ph idx="12" type="sldNum"/>
+            <p:ph type="sldNum" idx="12"/>
           </p:nvPr>
         </p:nvSpPr>
         <p:spPr>
@@ -3390,7 +3488,7 @@
           </a:prstGeom>
         </p:spPr>
         <p:txBody>
-          <a:bodyPr anchorCtr="0" anchor="ctr" bIns="91425" lIns="91425" spcFirstLastPara="1" rIns="91425" wrap="square" tIns="91425">
+          <a:bodyPr spcFirstLastPara="1" wrap="square" lIns="91425" tIns="91425" rIns="91425" bIns="91425" anchor="ctr" anchorCtr="0">
             <a:noAutofit/>
           </a:bodyPr>
           <a:lstStyle>
@@ -3432,7 +3530,7 @@
             </a:lvl9pPr>
           </a:lstStyle>
           <a:p>
-            <a:pPr indent="0" lvl="0" marL="0" rtl="0" algn="r">
+            <a:pPr marL="0" lvl="0" indent="0" algn="r" rtl="0">
               <a:spcBef>
                 <a:spcPts val="0"/>
               </a:spcBef>
@@ -3458,11 +3556,11 @@
 </file>
 
 <file path=ppt/slideLayouts/slideLayout7.xml><?xml version="1.0" encoding="utf-8"?>
-<p:sldLayout xmlns:a="http://schemas.openxmlformats.org/drawingml/2006/main" xmlns:r="http://schemas.openxmlformats.org/officeDocument/2006/relationships" xmlns:mc="http://schemas.openxmlformats.org/markup-compatibility/2006" xmlns:mv="urn:schemas-microsoft-com:mac:vml" xmlns:p="http://schemas.openxmlformats.org/presentationml/2006/main" xmlns:c="http://schemas.openxmlformats.org/drawingml/2006/chart" xmlns:dgm="http://schemas.openxmlformats.org/drawingml/2006/diagram" xmlns:o="urn:schemas-microsoft-com:office:office" xmlns:v="urn:schemas-microsoft-com:vml" xmlns:pvml="urn:schemas-microsoft-com:office:powerpoint" xmlns:com="http://schemas.openxmlformats.org/drawingml/2006/compatibility" xmlns:p14="http://schemas.microsoft.com/office/powerpoint/2010/main" xmlns:p15="http://schemas.microsoft.com/office/powerpoint/2012/main" matchingName="Main point">
+<p:sldLayout xmlns:a="http://schemas.openxmlformats.org/drawingml/2006/main" xmlns:r="http://schemas.openxmlformats.org/officeDocument/2006/relationships" xmlns:p="http://schemas.openxmlformats.org/presentationml/2006/main" matchingName="Main point">
   <p:cSld name="MAIN_POINT">
     <p:spTree>
       <p:nvGrpSpPr>
-        <p:cNvPr id="32" name="Shape 32"/>
+        <p:cNvPr id="1" name="Shape 32"/>
         <p:cNvGrpSpPr/>
         <p:nvPr/>
       </p:nvGrpSpPr>
@@ -3477,7 +3575,9 @@
       <p:sp>
         <p:nvSpPr>
           <p:cNvPr id="33" name="Google Shape;33;p8"/>
-          <p:cNvSpPr txBox="1"/>
+          <p:cNvSpPr txBox="1">
+            <a:spLocks noGrp="1"/>
+          </p:cNvSpPr>
           <p:nvPr>
             <p:ph type="title"/>
           </p:nvPr>
@@ -3492,7 +3592,7 @@
           </a:prstGeom>
         </p:spPr>
         <p:txBody>
-          <a:bodyPr anchorCtr="0" anchor="ctr" bIns="91425" lIns="91425" spcFirstLastPara="1" rIns="91425" wrap="square" tIns="91425">
+          <a:bodyPr spcFirstLastPara="1" wrap="square" lIns="91425" tIns="91425" rIns="91425" bIns="91425" anchor="ctr" anchorCtr="0">
             <a:noAutofit/>
           </a:bodyPr>
           <a:lstStyle>
@@ -3596,15 +3696,19 @@
               <a:defRPr sz="4800"/>
             </a:lvl9pPr>
           </a:lstStyle>
-          <a:p/>
+          <a:p>
+            <a:endParaRPr/>
+          </a:p>
         </p:txBody>
       </p:sp>
       <p:sp>
         <p:nvSpPr>
           <p:cNvPr id="34" name="Google Shape;34;p8"/>
-          <p:cNvSpPr txBox="1"/>
+          <p:cNvSpPr txBox="1">
+            <a:spLocks noGrp="1"/>
+          </p:cNvSpPr>
           <p:nvPr>
-            <p:ph idx="12" type="sldNum"/>
+            <p:ph type="sldNum" idx="12"/>
           </p:nvPr>
         </p:nvSpPr>
         <p:spPr>
@@ -3617,7 +3721,7 @@
           </a:prstGeom>
         </p:spPr>
         <p:txBody>
-          <a:bodyPr anchorCtr="0" anchor="ctr" bIns="91425" lIns="91425" spcFirstLastPara="1" rIns="91425" wrap="square" tIns="91425">
+          <a:bodyPr spcFirstLastPara="1" wrap="square" lIns="91425" tIns="91425" rIns="91425" bIns="91425" anchor="ctr" anchorCtr="0">
             <a:noAutofit/>
           </a:bodyPr>
           <a:lstStyle>
@@ -3659,7 +3763,7 @@
             </a:lvl9pPr>
           </a:lstStyle>
           <a:p>
-            <a:pPr indent="0" lvl="0" marL="0" rtl="0" algn="r">
+            <a:pPr marL="0" lvl="0" indent="0" algn="r" rtl="0">
               <a:spcBef>
                 <a:spcPts val="0"/>
               </a:spcBef>
@@ -3685,11 +3789,11 @@
 </file>
 
 <file path=ppt/slideLayouts/slideLayout8.xml><?xml version="1.0" encoding="utf-8"?>
-<p:sldLayout xmlns:a="http://schemas.openxmlformats.org/drawingml/2006/main" xmlns:r="http://schemas.openxmlformats.org/officeDocument/2006/relationships" xmlns:mc="http://schemas.openxmlformats.org/markup-compatibility/2006" xmlns:mv="urn:schemas-microsoft-com:mac:vml" xmlns:p="http://schemas.openxmlformats.org/presentationml/2006/main" xmlns:c="http://schemas.openxmlformats.org/drawingml/2006/chart" xmlns:dgm="http://schemas.openxmlformats.org/drawingml/2006/diagram" xmlns:o="urn:schemas-microsoft-com:office:office" xmlns:v="urn:schemas-microsoft-com:vml" xmlns:pvml="urn:schemas-microsoft-com:office:powerpoint" xmlns:com="http://schemas.openxmlformats.org/drawingml/2006/compatibility" xmlns:p14="http://schemas.microsoft.com/office/powerpoint/2010/main" xmlns:p15="http://schemas.microsoft.com/office/powerpoint/2012/main" matchingName="Section title and description">
+<p:sldLayout xmlns:a="http://schemas.openxmlformats.org/drawingml/2006/main" xmlns:r="http://schemas.openxmlformats.org/officeDocument/2006/relationships" xmlns:p="http://schemas.openxmlformats.org/presentationml/2006/main" matchingName="Section title and description">
   <p:cSld name="SECTION_TITLE_AND_DESCRIPTION">
     <p:spTree>
       <p:nvGrpSpPr>
-        <p:cNvPr id="35" name="Shape 35"/>
+        <p:cNvPr id="1" name="Shape 35"/>
         <p:cNvGrpSpPr/>
         <p:nvPr/>
       </p:nvGrpSpPr>
@@ -3723,12 +3827,12 @@
           </a:ln>
         </p:spPr>
         <p:txBody>
-          <a:bodyPr anchorCtr="0" anchor="ctr" bIns="91425" lIns="91425" spcFirstLastPara="1" rIns="91425" wrap="square" tIns="91425">
+          <a:bodyPr spcFirstLastPara="1" wrap="square" lIns="91425" tIns="91425" rIns="91425" bIns="91425" anchor="ctr" anchorCtr="0">
             <a:noAutofit/>
           </a:bodyPr>
           <a:lstStyle/>
           <a:p>
-            <a:pPr indent="0" lvl="0" marL="0" rtl="0" algn="l">
+            <a:pPr marL="0" lvl="0" indent="0" algn="l" rtl="0">
               <a:spcBef>
                 <a:spcPts val="0"/>
               </a:spcBef>
@@ -3737,9 +3841,6 @@
               </a:spcAft>
               <a:buNone/>
             </a:pPr>
-            <a:r>
-              <a:t/>
-            </a:r>
             <a:endParaRPr/>
           </a:p>
         </p:txBody>
@@ -3747,7 +3848,9 @@
       <p:sp>
         <p:nvSpPr>
           <p:cNvPr id="37" name="Google Shape;37;p9"/>
-          <p:cNvSpPr txBox="1"/>
+          <p:cNvSpPr txBox="1">
+            <a:spLocks noGrp="1"/>
+          </p:cNvSpPr>
           <p:nvPr>
             <p:ph type="title"/>
           </p:nvPr>
@@ -3762,7 +3865,7 @@
           </a:prstGeom>
         </p:spPr>
         <p:txBody>
-          <a:bodyPr anchorCtr="0" anchor="b" bIns="91425" lIns="91425" spcFirstLastPara="1" rIns="91425" wrap="square" tIns="91425">
+          <a:bodyPr spcFirstLastPara="1" wrap="square" lIns="91425" tIns="91425" rIns="91425" bIns="91425" anchor="b" anchorCtr="0">
             <a:noAutofit/>
           </a:bodyPr>
           <a:lstStyle>
@@ -3866,15 +3969,19 @@
               <a:defRPr sz="4200"/>
             </a:lvl9pPr>
           </a:lstStyle>
-          <a:p/>
+          <a:p>
+            <a:endParaRPr/>
+          </a:p>
         </p:txBody>
       </p:sp>
       <p:sp>
         <p:nvSpPr>
           <p:cNvPr id="38" name="Google Shape;38;p9"/>
-          <p:cNvSpPr txBox="1"/>
+          <p:cNvSpPr txBox="1">
+            <a:spLocks noGrp="1"/>
+          </p:cNvSpPr>
           <p:nvPr>
-            <p:ph idx="1" type="subTitle"/>
+            <p:ph type="subTitle" idx="1"/>
           </p:nvPr>
         </p:nvSpPr>
         <p:spPr>
@@ -3887,7 +3994,7 @@
           </a:prstGeom>
         </p:spPr>
         <p:txBody>
-          <a:bodyPr anchorCtr="0" anchor="t" bIns="91425" lIns="91425" spcFirstLastPara="1" rIns="91425" wrap="square" tIns="91425">
+          <a:bodyPr spcFirstLastPara="1" wrap="square" lIns="91425" tIns="91425" rIns="91425" bIns="91425" anchor="t" anchorCtr="0">
             <a:noAutofit/>
           </a:bodyPr>
           <a:lstStyle>
@@ -4018,15 +4125,19 @@
               <a:defRPr sz="2100"/>
             </a:lvl9pPr>
           </a:lstStyle>
-          <a:p/>
+          <a:p>
+            <a:endParaRPr/>
+          </a:p>
         </p:txBody>
       </p:sp>
       <p:sp>
         <p:nvSpPr>
           <p:cNvPr id="39" name="Google Shape;39;p9"/>
-          <p:cNvSpPr txBox="1"/>
+          <p:cNvSpPr txBox="1">
+            <a:spLocks noGrp="1"/>
+          </p:cNvSpPr>
           <p:nvPr>
-            <p:ph idx="2" type="body"/>
+            <p:ph type="body" idx="2"/>
           </p:nvPr>
         </p:nvSpPr>
         <p:spPr>
@@ -4039,11 +4150,11 @@
           </a:prstGeom>
         </p:spPr>
         <p:txBody>
-          <a:bodyPr anchorCtr="0" anchor="ctr" bIns="91425" lIns="91425" spcFirstLastPara="1" rIns="91425" wrap="square" tIns="91425">
+          <a:bodyPr spcFirstLastPara="1" wrap="square" lIns="91425" tIns="91425" rIns="91425" bIns="91425" anchor="ctr" anchorCtr="0">
             <a:noAutofit/>
           </a:bodyPr>
           <a:lstStyle>
-            <a:lvl1pPr indent="-342900" lvl="0" marL="457200">
+            <a:lvl1pPr marL="457200" lvl="0" indent="-342900">
               <a:spcBef>
                 <a:spcPts val="0"/>
               </a:spcBef>
@@ -4061,7 +4172,7 @@
                 </a:solidFill>
               </a:defRPr>
             </a:lvl1pPr>
-            <a:lvl2pPr indent="-317500" lvl="1" marL="914400">
+            <a:lvl2pPr marL="914400" lvl="1" indent="-317500">
               <a:spcBef>
                 <a:spcPts val="1600"/>
               </a:spcBef>
@@ -4079,7 +4190,7 @@
                 </a:solidFill>
               </a:defRPr>
             </a:lvl2pPr>
-            <a:lvl3pPr indent="-317500" lvl="2" marL="1371600">
+            <a:lvl3pPr marL="1371600" lvl="2" indent="-317500">
               <a:spcBef>
                 <a:spcPts val="1600"/>
               </a:spcBef>
@@ -4097,7 +4208,7 @@
                 </a:solidFill>
               </a:defRPr>
             </a:lvl3pPr>
-            <a:lvl4pPr indent="-317500" lvl="3" marL="1828800">
+            <a:lvl4pPr marL="1828800" lvl="3" indent="-317500">
               <a:spcBef>
                 <a:spcPts val="1600"/>
               </a:spcBef>
@@ -4115,7 +4226,7 @@
                 </a:solidFill>
               </a:defRPr>
             </a:lvl4pPr>
-            <a:lvl5pPr indent="-317500" lvl="4" marL="2286000">
+            <a:lvl5pPr marL="2286000" lvl="4" indent="-317500">
               <a:spcBef>
                 <a:spcPts val="1600"/>
               </a:spcBef>
@@ -4133,7 +4244,7 @@
                 </a:solidFill>
               </a:defRPr>
             </a:lvl5pPr>
-            <a:lvl6pPr indent="-317500" lvl="5" marL="2743200">
+            <a:lvl6pPr marL="2743200" lvl="5" indent="-317500">
               <a:spcBef>
                 <a:spcPts val="1600"/>
               </a:spcBef>
@@ -4151,7 +4262,7 @@
                 </a:solidFill>
               </a:defRPr>
             </a:lvl6pPr>
-            <a:lvl7pPr indent="-317500" lvl="6" marL="3200400">
+            <a:lvl7pPr marL="3200400" lvl="6" indent="-317500">
               <a:spcBef>
                 <a:spcPts val="1600"/>
               </a:spcBef>
@@ -4169,7 +4280,7 @@
                 </a:solidFill>
               </a:defRPr>
             </a:lvl7pPr>
-            <a:lvl8pPr indent="-317500" lvl="7" marL="3657600">
+            <a:lvl8pPr marL="3657600" lvl="7" indent="-317500">
               <a:spcBef>
                 <a:spcPts val="1600"/>
               </a:spcBef>
@@ -4187,7 +4298,7 @@
                 </a:solidFill>
               </a:defRPr>
             </a:lvl8pPr>
-            <a:lvl9pPr indent="-317500" lvl="8" marL="4114800">
+            <a:lvl9pPr marL="4114800" lvl="8" indent="-317500">
               <a:spcBef>
                 <a:spcPts val="1600"/>
               </a:spcBef>
@@ -4206,15 +4317,19 @@
               </a:defRPr>
             </a:lvl9pPr>
           </a:lstStyle>
-          <a:p/>
+          <a:p>
+            <a:endParaRPr/>
+          </a:p>
         </p:txBody>
       </p:sp>
       <p:sp>
         <p:nvSpPr>
           <p:cNvPr id="40" name="Google Shape;40;p9"/>
-          <p:cNvSpPr txBox="1"/>
+          <p:cNvSpPr txBox="1">
+            <a:spLocks noGrp="1"/>
+          </p:cNvSpPr>
           <p:nvPr>
-            <p:ph idx="12" type="sldNum"/>
+            <p:ph type="sldNum" idx="12"/>
           </p:nvPr>
         </p:nvSpPr>
         <p:spPr>
@@ -4227,7 +4342,7 @@
           </a:prstGeom>
         </p:spPr>
         <p:txBody>
-          <a:bodyPr anchorCtr="0" anchor="ctr" bIns="91425" lIns="91425" spcFirstLastPara="1" rIns="91425" wrap="square" tIns="91425">
+          <a:bodyPr spcFirstLastPara="1" wrap="square" lIns="91425" tIns="91425" rIns="91425" bIns="91425" anchor="ctr" anchorCtr="0">
             <a:noAutofit/>
           </a:bodyPr>
           <a:lstStyle>
@@ -4269,7 +4384,7 @@
             </a:lvl9pPr>
           </a:lstStyle>
           <a:p>
-            <a:pPr indent="0" lvl="0" marL="0" rtl="0" algn="r">
+            <a:pPr marL="0" lvl="0" indent="0" algn="r" rtl="0">
               <a:spcBef>
                 <a:spcPts val="0"/>
               </a:spcBef>
@@ -4295,11 +4410,11 @@
 </file>
 
 <file path=ppt/slideLayouts/slideLayout9.xml><?xml version="1.0" encoding="utf-8"?>
-<p:sldLayout xmlns:a="http://schemas.openxmlformats.org/drawingml/2006/main" xmlns:r="http://schemas.openxmlformats.org/officeDocument/2006/relationships" xmlns:mc="http://schemas.openxmlformats.org/markup-compatibility/2006" xmlns:mv="urn:schemas-microsoft-com:mac:vml" xmlns:p="http://schemas.openxmlformats.org/presentationml/2006/main" xmlns:c="http://schemas.openxmlformats.org/drawingml/2006/chart" xmlns:dgm="http://schemas.openxmlformats.org/drawingml/2006/diagram" xmlns:o="urn:schemas-microsoft-com:office:office" xmlns:v="urn:schemas-microsoft-com:vml" xmlns:pvml="urn:schemas-microsoft-com:office:powerpoint" xmlns:com="http://schemas.openxmlformats.org/drawingml/2006/compatibility" xmlns:p14="http://schemas.microsoft.com/office/powerpoint/2010/main" xmlns:p15="http://schemas.microsoft.com/office/powerpoint/2012/main" matchingName="Caption">
+<p:sldLayout xmlns:a="http://schemas.openxmlformats.org/drawingml/2006/main" xmlns:r="http://schemas.openxmlformats.org/officeDocument/2006/relationships" xmlns:p="http://schemas.openxmlformats.org/presentationml/2006/main" matchingName="Caption">
   <p:cSld name="CAPTION_ONLY">
     <p:spTree>
       <p:nvGrpSpPr>
-        <p:cNvPr id="41" name="Shape 41"/>
+        <p:cNvPr id="1" name="Shape 41"/>
         <p:cNvGrpSpPr/>
         <p:nvPr/>
       </p:nvGrpSpPr>
@@ -4314,9 +4429,11 @@
       <p:sp>
         <p:nvSpPr>
           <p:cNvPr id="42" name="Google Shape;42;p10"/>
-          <p:cNvSpPr txBox="1"/>
+          <p:cNvSpPr txBox="1">
+            <a:spLocks noGrp="1"/>
+          </p:cNvSpPr>
           <p:nvPr>
-            <p:ph idx="1" type="body"/>
+            <p:ph type="body" idx="1"/>
           </p:nvPr>
         </p:nvSpPr>
         <p:spPr>
@@ -4329,11 +4446,11 @@
           </a:prstGeom>
         </p:spPr>
         <p:txBody>
-          <a:bodyPr anchorCtr="0" anchor="ctr" bIns="91425" lIns="91425" spcFirstLastPara="1" rIns="91425" wrap="square" tIns="91425">
+          <a:bodyPr spcFirstLastPara="1" wrap="square" lIns="91425" tIns="91425" rIns="91425" bIns="91425" anchor="ctr" anchorCtr="0">
             <a:noAutofit/>
           </a:bodyPr>
           <a:lstStyle>
-            <a:lvl1pPr indent="-228600" lvl="0" marL="457200">
+            <a:lvl1pPr marL="457200" lvl="0" indent="-228600">
               <a:lnSpc>
                 <a:spcPct val="100000"/>
               </a:lnSpc>
@@ -4348,15 +4465,19 @@
               <a:defRPr/>
             </a:lvl1pPr>
           </a:lstStyle>
-          <a:p/>
+          <a:p>
+            <a:endParaRPr/>
+          </a:p>
         </p:txBody>
       </p:sp>
       <p:sp>
         <p:nvSpPr>
           <p:cNvPr id="43" name="Google Shape;43;p10"/>
-          <p:cNvSpPr txBox="1"/>
+          <p:cNvSpPr txBox="1">
+            <a:spLocks noGrp="1"/>
+          </p:cNvSpPr>
           <p:nvPr>
-            <p:ph idx="12" type="sldNum"/>
+            <p:ph type="sldNum" idx="12"/>
           </p:nvPr>
         </p:nvSpPr>
         <p:spPr>
@@ -4369,7 +4490,7 @@
           </a:prstGeom>
         </p:spPr>
         <p:txBody>
-          <a:bodyPr anchorCtr="0" anchor="ctr" bIns="91425" lIns="91425" spcFirstLastPara="1" rIns="91425" wrap="square" tIns="91425">
+          <a:bodyPr spcFirstLastPara="1" wrap="square" lIns="91425" tIns="91425" rIns="91425" bIns="91425" anchor="ctr" anchorCtr="0">
             <a:noAutofit/>
           </a:bodyPr>
           <a:lstStyle>
@@ -4411,7 +4532,7 @@
             </a:lvl9pPr>
           </a:lstStyle>
           <a:p>
-            <a:pPr indent="0" lvl="0" marL="0" rtl="0" algn="r">
+            <a:pPr marL="0" lvl="0" indent="0" algn="r" rtl="0">
               <a:spcBef>
                 <a:spcPts val="0"/>
               </a:spcBef>
@@ -4437,18 +4558,19 @@
 </file>
 
 <file path=ppt/slideMasters/slideMaster1.xml><?xml version="1.0" encoding="utf-8"?>
-<p:sldMaster xmlns:a="http://schemas.openxmlformats.org/drawingml/2006/main" xmlns:r="http://schemas.openxmlformats.org/officeDocument/2006/relationships" xmlns:mc="http://schemas.openxmlformats.org/markup-compatibility/2006" xmlns:mv="urn:schemas-microsoft-com:mac:vml" xmlns:p="http://schemas.openxmlformats.org/presentationml/2006/main" xmlns:c="http://schemas.openxmlformats.org/drawingml/2006/chart" xmlns:dgm="http://schemas.openxmlformats.org/drawingml/2006/diagram" xmlns:o="urn:schemas-microsoft-com:office:office" xmlns:v="urn:schemas-microsoft-com:vml" xmlns:pvml="urn:schemas-microsoft-com:office:powerpoint" xmlns:com="http://schemas.openxmlformats.org/drawingml/2006/compatibility" xmlns:p14="http://schemas.microsoft.com/office/powerpoint/2010/main" xmlns:p15="http://schemas.microsoft.com/office/powerpoint/2012/main">
+<p:sldMaster xmlns:a="http://schemas.openxmlformats.org/drawingml/2006/main" xmlns:r="http://schemas.openxmlformats.org/officeDocument/2006/relationships" xmlns:p="http://schemas.openxmlformats.org/presentationml/2006/main">
   <p:cSld name="simple-dark-2">
     <p:bg>
       <p:bgPr>
         <a:solidFill>
           <a:schemeClr val="lt1"/>
         </a:solidFill>
+        <a:effectLst/>
       </p:bgPr>
     </p:bg>
     <p:spTree>
       <p:nvGrpSpPr>
-        <p:cNvPr id="5" name="Shape 5"/>
+        <p:cNvPr id="1" name="Shape 5"/>
         <p:cNvGrpSpPr/>
         <p:nvPr/>
       </p:nvGrpSpPr>
@@ -4463,7 +4585,9 @@
       <p:sp>
         <p:nvSpPr>
           <p:cNvPr id="6" name="Google Shape;6;p1"/>
-          <p:cNvSpPr txBox="1"/>
+          <p:cNvSpPr txBox="1">
+            <a:spLocks noGrp="1"/>
+          </p:cNvSpPr>
           <p:nvPr>
             <p:ph type="title"/>
           </p:nvPr>
@@ -4482,7 +4606,7 @@
           </a:ln>
         </p:spPr>
         <p:txBody>
-          <a:bodyPr anchorCtr="0" anchor="t" bIns="91425" lIns="91425" spcFirstLastPara="1" rIns="91425" wrap="square" tIns="91425">
+          <a:bodyPr spcFirstLastPara="1" wrap="square" lIns="91425" tIns="91425" rIns="91425" bIns="91425" anchor="t" anchorCtr="0">
             <a:noAutofit/>
           </a:bodyPr>
           <a:lstStyle>
@@ -4649,15 +4773,19 @@
               </a:defRPr>
             </a:lvl9pPr>
           </a:lstStyle>
-          <a:p/>
+          <a:p>
+            <a:endParaRPr/>
+          </a:p>
         </p:txBody>
       </p:sp>
       <p:sp>
         <p:nvSpPr>
           <p:cNvPr id="7" name="Google Shape;7;p1"/>
-          <p:cNvSpPr txBox="1"/>
+          <p:cNvSpPr txBox="1">
+            <a:spLocks noGrp="1"/>
+          </p:cNvSpPr>
           <p:nvPr>
-            <p:ph idx="1" type="body"/>
+            <p:ph type="body" idx="1"/>
           </p:nvPr>
         </p:nvSpPr>
         <p:spPr>
@@ -4674,11 +4802,11 @@
           </a:ln>
         </p:spPr>
         <p:txBody>
-          <a:bodyPr anchorCtr="0" anchor="t" bIns="91425" lIns="91425" spcFirstLastPara="1" rIns="91425" wrap="square" tIns="91425">
+          <a:bodyPr spcFirstLastPara="1" wrap="square" lIns="91425" tIns="91425" rIns="91425" bIns="91425" anchor="t" anchorCtr="0">
             <a:noAutofit/>
           </a:bodyPr>
           <a:lstStyle>
-            <a:lvl1pPr indent="-342900" lvl="0" marL="457200">
+            <a:lvl1pPr marL="457200" lvl="0" indent="-342900">
               <a:lnSpc>
                 <a:spcPct val="115000"/>
               </a:lnSpc>
@@ -4699,7 +4827,7 @@
                 </a:solidFill>
               </a:defRPr>
             </a:lvl1pPr>
-            <a:lvl2pPr indent="-317500" lvl="1" marL="914400">
+            <a:lvl2pPr marL="914400" lvl="1" indent="-317500">
               <a:lnSpc>
                 <a:spcPct val="115000"/>
               </a:lnSpc>
@@ -4720,7 +4848,7 @@
                 </a:solidFill>
               </a:defRPr>
             </a:lvl2pPr>
-            <a:lvl3pPr indent="-317500" lvl="2" marL="1371600">
+            <a:lvl3pPr marL="1371600" lvl="2" indent="-317500">
               <a:lnSpc>
                 <a:spcPct val="115000"/>
               </a:lnSpc>
@@ -4741,7 +4869,7 @@
                 </a:solidFill>
               </a:defRPr>
             </a:lvl3pPr>
-            <a:lvl4pPr indent="-317500" lvl="3" marL="1828800">
+            <a:lvl4pPr marL="1828800" lvl="3" indent="-317500">
               <a:lnSpc>
                 <a:spcPct val="115000"/>
               </a:lnSpc>
@@ -4762,7 +4890,7 @@
                 </a:solidFill>
               </a:defRPr>
             </a:lvl4pPr>
-            <a:lvl5pPr indent="-317500" lvl="4" marL="2286000">
+            <a:lvl5pPr marL="2286000" lvl="4" indent="-317500">
               <a:lnSpc>
                 <a:spcPct val="115000"/>
               </a:lnSpc>
@@ -4783,7 +4911,7 @@
                 </a:solidFill>
               </a:defRPr>
             </a:lvl5pPr>
-            <a:lvl6pPr indent="-317500" lvl="5" marL="2743200">
+            <a:lvl6pPr marL="2743200" lvl="5" indent="-317500">
               <a:lnSpc>
                 <a:spcPct val="115000"/>
               </a:lnSpc>
@@ -4804,7 +4932,7 @@
                 </a:solidFill>
               </a:defRPr>
             </a:lvl6pPr>
-            <a:lvl7pPr indent="-317500" lvl="6" marL="3200400">
+            <a:lvl7pPr marL="3200400" lvl="6" indent="-317500">
               <a:lnSpc>
                 <a:spcPct val="115000"/>
               </a:lnSpc>
@@ -4825,7 +4953,7 @@
                 </a:solidFill>
               </a:defRPr>
             </a:lvl7pPr>
-            <a:lvl8pPr indent="-317500" lvl="7" marL="3657600">
+            <a:lvl8pPr marL="3657600" lvl="7" indent="-317500">
               <a:lnSpc>
                 <a:spcPct val="115000"/>
               </a:lnSpc>
@@ -4846,7 +4974,7 @@
                 </a:solidFill>
               </a:defRPr>
             </a:lvl8pPr>
-            <a:lvl9pPr indent="-317500" lvl="8" marL="4114800">
+            <a:lvl9pPr marL="4114800" lvl="8" indent="-317500">
               <a:lnSpc>
                 <a:spcPct val="115000"/>
               </a:lnSpc>
@@ -4868,15 +4996,19 @@
               </a:defRPr>
             </a:lvl9pPr>
           </a:lstStyle>
-          <a:p/>
+          <a:p>
+            <a:endParaRPr/>
+          </a:p>
         </p:txBody>
       </p:sp>
       <p:sp>
         <p:nvSpPr>
           <p:cNvPr id="8" name="Google Shape;8;p1"/>
-          <p:cNvSpPr txBox="1"/>
+          <p:cNvSpPr txBox="1">
+            <a:spLocks noGrp="1"/>
+          </p:cNvSpPr>
           <p:nvPr>
-            <p:ph idx="12" type="sldNum"/>
+            <p:ph type="sldNum" idx="12"/>
           </p:nvPr>
         </p:nvSpPr>
         <p:spPr>
@@ -4893,7 +5025,7 @@
           </a:ln>
         </p:spPr>
         <p:txBody>
-          <a:bodyPr anchorCtr="0" anchor="ctr" bIns="91425" lIns="91425" spcFirstLastPara="1" rIns="91425" wrap="square" tIns="91425">
+          <a:bodyPr spcFirstLastPara="1" wrap="square" lIns="91425" tIns="91425" rIns="91425" bIns="91425" anchor="ctr" anchorCtr="0">
             <a:noAutofit/>
           </a:bodyPr>
           <a:lstStyle>
@@ -4971,7 +5103,7 @@
             </a:lvl9pPr>
           </a:lstStyle>
           <a:p>
-            <a:pPr indent="0" lvl="0" marL="0" rtl="0" algn="r">
+            <a:pPr marL="0" lvl="0" indent="0" algn="r" rtl="0">
               <a:spcBef>
                 <a:spcPts val="0"/>
               </a:spcBef>
@@ -4990,7 +5122,7 @@
       </p:sp>
     </p:spTree>
   </p:cSld>
-  <p:clrMap accent1="accent1" accent2="accent2" accent3="accent3" accent4="accent4" accent5="accent5" accent6="accent6" bg1="lt1" bg2="dk2" tx1="dk1" tx2="lt2" folHlink="folHlink" hlink="hlink"/>
+  <p:clrMap bg1="lt1" tx1="dk1" bg2="dk2" tx2="lt2" accent1="accent1" accent2="accent2" accent3="accent3" accent4="accent4" accent5="accent5" accent6="accent6" hlink="hlink" folHlink="folHlink"/>
   <p:sldLayoutIdLst>
     <p:sldLayoutId id="2147483648" r:id="rId1"/>
     <p:sldLayoutId id="2147483649" r:id="rId2"/>
@@ -5004,10 +5136,10 @@
     <p:sldLayoutId id="2147483657" r:id="rId10"/>
     <p:sldLayoutId id="2147483658" r:id="rId11"/>
   </p:sldLayoutIdLst>
-  <p:hf dt="0" ftr="0" hdr="0" sldNum="0"/>
+  <p:hf sldNum="0" hdr="0" ftr="0" dt="0"/>
   <p:txStyles>
     <p:titleStyle>
-      <a:defPPr lvl="0" marR="0" rtl="0" algn="l">
+      <a:defPPr marR="0" lvl="0" algn="l" rtl="0">
         <a:lnSpc>
           <a:spcPct val="100000"/>
         </a:lnSpc>
@@ -5018,7 +5150,7 @@
           <a:spcPts val="0"/>
         </a:spcAft>
       </a:defPPr>
-      <a:lvl1pPr lvl="0" marR="0" rtl="0" algn="l">
+      <a:lvl1pPr marR="0" lvl="0" algn="l" rtl="0">
         <a:lnSpc>
           <a:spcPct val="100000"/>
         </a:lnSpc>
@@ -5032,7 +5164,7 @@
           <a:srgbClr val="000000"/>
         </a:buClr>
         <a:buFont typeface="Arial"/>
-        <a:defRPr b="0" i="0" sz="1400" u="none" cap="none" strike="noStrike">
+        <a:defRPr sz="1400" b="0" i="0" u="none" strike="noStrike" cap="none">
           <a:solidFill>
             <a:srgbClr val="000000"/>
           </a:solidFill>
@@ -5042,7 +5174,7 @@
           <a:sym typeface="Arial"/>
         </a:defRPr>
       </a:lvl1pPr>
-      <a:lvl2pPr lvl="1" marR="0" rtl="0" algn="l">
+      <a:lvl2pPr marR="0" lvl="1" algn="l" rtl="0">
         <a:lnSpc>
           <a:spcPct val="100000"/>
         </a:lnSpc>
@@ -5056,7 +5188,7 @@
           <a:srgbClr val="000000"/>
         </a:buClr>
         <a:buFont typeface="Arial"/>
-        <a:defRPr b="0" i="0" sz="1400" u="none" cap="none" strike="noStrike">
+        <a:defRPr sz="1400" b="0" i="0" u="none" strike="noStrike" cap="none">
           <a:solidFill>
             <a:srgbClr val="000000"/>
           </a:solidFill>
@@ -5066,7 +5198,7 @@
           <a:sym typeface="Arial"/>
         </a:defRPr>
       </a:lvl2pPr>
-      <a:lvl3pPr lvl="2" marR="0" rtl="0" algn="l">
+      <a:lvl3pPr marR="0" lvl="2" algn="l" rtl="0">
         <a:lnSpc>
           <a:spcPct val="100000"/>
         </a:lnSpc>
@@ -5080,7 +5212,7 @@
           <a:srgbClr val="000000"/>
         </a:buClr>
         <a:buFont typeface="Arial"/>
-        <a:defRPr b="0" i="0" sz="1400" u="none" cap="none" strike="noStrike">
+        <a:defRPr sz="1400" b="0" i="0" u="none" strike="noStrike" cap="none">
           <a:solidFill>
             <a:srgbClr val="000000"/>
           </a:solidFill>
@@ -5090,7 +5222,7 @@
           <a:sym typeface="Arial"/>
         </a:defRPr>
       </a:lvl3pPr>
-      <a:lvl4pPr lvl="3" marR="0" rtl="0" algn="l">
+      <a:lvl4pPr marR="0" lvl="3" algn="l" rtl="0">
         <a:lnSpc>
           <a:spcPct val="100000"/>
         </a:lnSpc>
@@ -5104,7 +5236,7 @@
           <a:srgbClr val="000000"/>
         </a:buClr>
         <a:buFont typeface="Arial"/>
-        <a:defRPr b="0" i="0" sz="1400" u="none" cap="none" strike="noStrike">
+        <a:defRPr sz="1400" b="0" i="0" u="none" strike="noStrike" cap="none">
           <a:solidFill>
             <a:srgbClr val="000000"/>
           </a:solidFill>
@@ -5114,7 +5246,7 @@
           <a:sym typeface="Arial"/>
         </a:defRPr>
       </a:lvl4pPr>
-      <a:lvl5pPr lvl="4" marR="0" rtl="0" algn="l">
+      <a:lvl5pPr marR="0" lvl="4" algn="l" rtl="0">
         <a:lnSpc>
           <a:spcPct val="100000"/>
         </a:lnSpc>
@@ -5128,7 +5260,7 @@
           <a:srgbClr val="000000"/>
         </a:buClr>
         <a:buFont typeface="Arial"/>
-        <a:defRPr b="0" i="0" sz="1400" u="none" cap="none" strike="noStrike">
+        <a:defRPr sz="1400" b="0" i="0" u="none" strike="noStrike" cap="none">
           <a:solidFill>
             <a:srgbClr val="000000"/>
           </a:solidFill>
@@ -5138,7 +5270,7 @@
           <a:sym typeface="Arial"/>
         </a:defRPr>
       </a:lvl5pPr>
-      <a:lvl6pPr lvl="5" marR="0" rtl="0" algn="l">
+      <a:lvl6pPr marR="0" lvl="5" algn="l" rtl="0">
         <a:lnSpc>
           <a:spcPct val="100000"/>
         </a:lnSpc>
@@ -5152,7 +5284,7 @@
           <a:srgbClr val="000000"/>
         </a:buClr>
         <a:buFont typeface="Arial"/>
-        <a:defRPr b="0" i="0" sz="1400" u="none" cap="none" strike="noStrike">
+        <a:defRPr sz="1400" b="0" i="0" u="none" strike="noStrike" cap="none">
           <a:solidFill>
             <a:srgbClr val="000000"/>
           </a:solidFill>
@@ -5162,7 +5294,7 @@
           <a:sym typeface="Arial"/>
         </a:defRPr>
       </a:lvl6pPr>
-      <a:lvl7pPr lvl="6" marR="0" rtl="0" algn="l">
+      <a:lvl7pPr marR="0" lvl="6" algn="l" rtl="0">
         <a:lnSpc>
           <a:spcPct val="100000"/>
         </a:lnSpc>
@@ -5176,7 +5308,7 @@
           <a:srgbClr val="000000"/>
         </a:buClr>
         <a:buFont typeface="Arial"/>
-        <a:defRPr b="0" i="0" sz="1400" u="none" cap="none" strike="noStrike">
+        <a:defRPr sz="1400" b="0" i="0" u="none" strike="noStrike" cap="none">
           <a:solidFill>
             <a:srgbClr val="000000"/>
           </a:solidFill>
@@ -5186,7 +5318,7 @@
           <a:sym typeface="Arial"/>
         </a:defRPr>
       </a:lvl7pPr>
-      <a:lvl8pPr lvl="7" marR="0" rtl="0" algn="l">
+      <a:lvl8pPr marR="0" lvl="7" algn="l" rtl="0">
         <a:lnSpc>
           <a:spcPct val="100000"/>
         </a:lnSpc>
@@ -5200,7 +5332,7 @@
           <a:srgbClr val="000000"/>
         </a:buClr>
         <a:buFont typeface="Arial"/>
-        <a:defRPr b="0" i="0" sz="1400" u="none" cap="none" strike="noStrike">
+        <a:defRPr sz="1400" b="0" i="0" u="none" strike="noStrike" cap="none">
           <a:solidFill>
             <a:srgbClr val="000000"/>
           </a:solidFill>
@@ -5210,7 +5342,7 @@
           <a:sym typeface="Arial"/>
         </a:defRPr>
       </a:lvl8pPr>
-      <a:lvl9pPr lvl="8" marR="0" rtl="0" algn="l">
+      <a:lvl9pPr marR="0" lvl="8" algn="l" rtl="0">
         <a:lnSpc>
           <a:spcPct val="100000"/>
         </a:lnSpc>
@@ -5224,7 +5356,7 @@
           <a:srgbClr val="000000"/>
         </a:buClr>
         <a:buFont typeface="Arial"/>
-        <a:defRPr b="0" i="0" sz="1400" u="none" cap="none" strike="noStrike">
+        <a:defRPr sz="1400" b="0" i="0" u="none" strike="noStrike" cap="none">
           <a:solidFill>
             <a:srgbClr val="000000"/>
           </a:solidFill>
@@ -5236,7 +5368,7 @@
       </a:lvl9pPr>
     </p:titleStyle>
     <p:bodyStyle>
-      <a:defPPr lvl="0" marR="0" rtl="0" algn="l">
+      <a:defPPr marR="0" lvl="0" algn="l" rtl="0">
         <a:lnSpc>
           <a:spcPct val="100000"/>
         </a:lnSpc>
@@ -5247,7 +5379,7 @@
           <a:spcPts val="0"/>
         </a:spcAft>
       </a:defPPr>
-      <a:lvl1pPr lvl="0" marR="0" rtl="0" algn="l">
+      <a:lvl1pPr marR="0" lvl="0" algn="l" rtl="0">
         <a:lnSpc>
           <a:spcPct val="100000"/>
         </a:lnSpc>
@@ -5261,7 +5393,7 @@
           <a:srgbClr val="000000"/>
         </a:buClr>
         <a:buFont typeface="Arial"/>
-        <a:defRPr b="0" i="0" sz="1400" u="none" cap="none" strike="noStrike">
+        <a:defRPr sz="1400" b="0" i="0" u="none" strike="noStrike" cap="none">
           <a:solidFill>
             <a:srgbClr val="000000"/>
           </a:solidFill>
@@ -5271,7 +5403,7 @@
           <a:sym typeface="Arial"/>
         </a:defRPr>
       </a:lvl1pPr>
-      <a:lvl2pPr lvl="1" marR="0" rtl="0" algn="l">
+      <a:lvl2pPr marR="0" lvl="1" algn="l" rtl="0">
         <a:lnSpc>
           <a:spcPct val="100000"/>
         </a:lnSpc>
@@ -5285,7 +5417,7 @@
           <a:srgbClr val="000000"/>
         </a:buClr>
         <a:buFont typeface="Arial"/>
-        <a:defRPr b="0" i="0" sz="1400" u="none" cap="none" strike="noStrike">
+        <a:defRPr sz="1400" b="0" i="0" u="none" strike="noStrike" cap="none">
           <a:solidFill>
             <a:srgbClr val="000000"/>
           </a:solidFill>
@@ -5295,7 +5427,7 @@
           <a:sym typeface="Arial"/>
         </a:defRPr>
       </a:lvl2pPr>
-      <a:lvl3pPr lvl="2" marR="0" rtl="0" algn="l">
+      <a:lvl3pPr marR="0" lvl="2" algn="l" rtl="0">
         <a:lnSpc>
           <a:spcPct val="100000"/>
         </a:lnSpc>
@@ -5309,7 +5441,7 @@
           <a:srgbClr val="000000"/>
         </a:buClr>
         <a:buFont typeface="Arial"/>
-        <a:defRPr b="0" i="0" sz="1400" u="none" cap="none" strike="noStrike">
+        <a:defRPr sz="1400" b="0" i="0" u="none" strike="noStrike" cap="none">
           <a:solidFill>
             <a:srgbClr val="000000"/>
           </a:solidFill>
@@ -5319,7 +5451,7 @@
           <a:sym typeface="Arial"/>
         </a:defRPr>
       </a:lvl3pPr>
-      <a:lvl4pPr lvl="3" marR="0" rtl="0" algn="l">
+      <a:lvl4pPr marR="0" lvl="3" algn="l" rtl="0">
         <a:lnSpc>
           <a:spcPct val="100000"/>
         </a:lnSpc>
@@ -5333,7 +5465,7 @@
           <a:srgbClr val="000000"/>
         </a:buClr>
         <a:buFont typeface="Arial"/>
-        <a:defRPr b="0" i="0" sz="1400" u="none" cap="none" strike="noStrike">
+        <a:defRPr sz="1400" b="0" i="0" u="none" strike="noStrike" cap="none">
           <a:solidFill>
             <a:srgbClr val="000000"/>
           </a:solidFill>
@@ -5343,7 +5475,7 @@
           <a:sym typeface="Arial"/>
         </a:defRPr>
       </a:lvl4pPr>
-      <a:lvl5pPr lvl="4" marR="0" rtl="0" algn="l">
+      <a:lvl5pPr marR="0" lvl="4" algn="l" rtl="0">
         <a:lnSpc>
           <a:spcPct val="100000"/>
         </a:lnSpc>
@@ -5357,7 +5489,7 @@
           <a:srgbClr val="000000"/>
         </a:buClr>
         <a:buFont typeface="Arial"/>
-        <a:defRPr b="0" i="0" sz="1400" u="none" cap="none" strike="noStrike">
+        <a:defRPr sz="1400" b="0" i="0" u="none" strike="noStrike" cap="none">
           <a:solidFill>
             <a:srgbClr val="000000"/>
           </a:solidFill>
@@ -5367,7 +5499,7 @@
           <a:sym typeface="Arial"/>
         </a:defRPr>
       </a:lvl5pPr>
-      <a:lvl6pPr lvl="5" marR="0" rtl="0" algn="l">
+      <a:lvl6pPr marR="0" lvl="5" algn="l" rtl="0">
         <a:lnSpc>
           <a:spcPct val="100000"/>
         </a:lnSpc>
@@ -5381,7 +5513,7 @@
           <a:srgbClr val="000000"/>
         </a:buClr>
         <a:buFont typeface="Arial"/>
-        <a:defRPr b="0" i="0" sz="1400" u="none" cap="none" strike="noStrike">
+        <a:defRPr sz="1400" b="0" i="0" u="none" strike="noStrike" cap="none">
           <a:solidFill>
             <a:srgbClr val="000000"/>
           </a:solidFill>
@@ -5391,7 +5523,7 @@
           <a:sym typeface="Arial"/>
         </a:defRPr>
       </a:lvl6pPr>
-      <a:lvl7pPr lvl="6" marR="0" rtl="0" algn="l">
+      <a:lvl7pPr marR="0" lvl="6" algn="l" rtl="0">
         <a:lnSpc>
           <a:spcPct val="100000"/>
         </a:lnSpc>
@@ -5405,7 +5537,7 @@
           <a:srgbClr val="000000"/>
         </a:buClr>
         <a:buFont typeface="Arial"/>
-        <a:defRPr b="0" i="0" sz="1400" u="none" cap="none" strike="noStrike">
+        <a:defRPr sz="1400" b="0" i="0" u="none" strike="noStrike" cap="none">
           <a:solidFill>
             <a:srgbClr val="000000"/>
           </a:solidFill>
@@ -5415,7 +5547,7 @@
           <a:sym typeface="Arial"/>
         </a:defRPr>
       </a:lvl7pPr>
-      <a:lvl8pPr lvl="7" marR="0" rtl="0" algn="l">
+      <a:lvl8pPr marR="0" lvl="7" algn="l" rtl="0">
         <a:lnSpc>
           <a:spcPct val="100000"/>
         </a:lnSpc>
@@ -5429,7 +5561,7 @@
           <a:srgbClr val="000000"/>
         </a:buClr>
         <a:buFont typeface="Arial"/>
-        <a:defRPr b="0" i="0" sz="1400" u="none" cap="none" strike="noStrike">
+        <a:defRPr sz="1400" b="0" i="0" u="none" strike="noStrike" cap="none">
           <a:solidFill>
             <a:srgbClr val="000000"/>
           </a:solidFill>
@@ -5439,7 +5571,7 @@
           <a:sym typeface="Arial"/>
         </a:defRPr>
       </a:lvl8pPr>
-      <a:lvl9pPr lvl="8" marR="0" rtl="0" algn="l">
+      <a:lvl9pPr marR="0" lvl="8" algn="l" rtl="0">
         <a:lnSpc>
           <a:spcPct val="100000"/>
         </a:lnSpc>
@@ -5453,7 +5585,7 @@
           <a:srgbClr val="000000"/>
         </a:buClr>
         <a:buFont typeface="Arial"/>
-        <a:defRPr b="0" i="0" sz="1400" u="none" cap="none" strike="noStrike">
+        <a:defRPr sz="1400" b="0" i="0" u="none" strike="noStrike" cap="none">
           <a:solidFill>
             <a:srgbClr val="000000"/>
           </a:solidFill>
@@ -5465,7 +5597,7 @@
       </a:lvl9pPr>
     </p:bodyStyle>
     <p:otherStyle>
-      <a:defPPr lvl="0" marR="0" rtl="0" algn="l">
+      <a:defPPr marR="0" lvl="0" algn="l" rtl="0">
         <a:lnSpc>
           <a:spcPct val="100000"/>
         </a:lnSpc>
@@ -5476,7 +5608,7 @@
           <a:spcPts val="0"/>
         </a:spcAft>
       </a:defPPr>
-      <a:lvl1pPr lvl="0" marR="0" rtl="0" algn="l">
+      <a:lvl1pPr marR="0" lvl="0" algn="l" rtl="0">
         <a:lnSpc>
           <a:spcPct val="100000"/>
         </a:lnSpc>
@@ -5490,7 +5622,7 @@
           <a:srgbClr val="000000"/>
         </a:buClr>
         <a:buFont typeface="Arial"/>
-        <a:defRPr b="0" i="0" sz="1400" u="none" cap="none" strike="noStrike">
+        <a:defRPr sz="1400" b="0" i="0" u="none" strike="noStrike" cap="none">
           <a:solidFill>
             <a:srgbClr val="000000"/>
           </a:solidFill>
@@ -5500,7 +5632,7 @@
           <a:sym typeface="Arial"/>
         </a:defRPr>
       </a:lvl1pPr>
-      <a:lvl2pPr lvl="1" marR="0" rtl="0" algn="l">
+      <a:lvl2pPr marR="0" lvl="1" algn="l" rtl="0">
         <a:lnSpc>
           <a:spcPct val="100000"/>
         </a:lnSpc>
@@ -5514,7 +5646,7 @@
           <a:srgbClr val="000000"/>
         </a:buClr>
         <a:buFont typeface="Arial"/>
-        <a:defRPr b="0" i="0" sz="1400" u="none" cap="none" strike="noStrike">
+        <a:defRPr sz="1400" b="0" i="0" u="none" strike="noStrike" cap="none">
           <a:solidFill>
             <a:srgbClr val="000000"/>
           </a:solidFill>
@@ -5524,7 +5656,7 @@
           <a:sym typeface="Arial"/>
         </a:defRPr>
       </a:lvl2pPr>
-      <a:lvl3pPr lvl="2" marR="0" rtl="0" algn="l">
+      <a:lvl3pPr marR="0" lvl="2" algn="l" rtl="0">
         <a:lnSpc>
           <a:spcPct val="100000"/>
         </a:lnSpc>
@@ -5538,7 +5670,7 @@
           <a:srgbClr val="000000"/>
         </a:buClr>
         <a:buFont typeface="Arial"/>
-        <a:defRPr b="0" i="0" sz="1400" u="none" cap="none" strike="noStrike">
+        <a:defRPr sz="1400" b="0" i="0" u="none" strike="noStrike" cap="none">
           <a:solidFill>
             <a:srgbClr val="000000"/>
           </a:solidFill>
@@ -5548,7 +5680,7 @@
           <a:sym typeface="Arial"/>
         </a:defRPr>
       </a:lvl3pPr>
-      <a:lvl4pPr lvl="3" marR="0" rtl="0" algn="l">
+      <a:lvl4pPr marR="0" lvl="3" algn="l" rtl="0">
         <a:lnSpc>
           <a:spcPct val="100000"/>
         </a:lnSpc>
@@ -5562,7 +5694,7 @@
           <a:srgbClr val="000000"/>
         </a:buClr>
         <a:buFont typeface="Arial"/>
-        <a:defRPr b="0" i="0" sz="1400" u="none" cap="none" strike="noStrike">
+        <a:defRPr sz="1400" b="0" i="0" u="none" strike="noStrike" cap="none">
           <a:solidFill>
             <a:srgbClr val="000000"/>
           </a:solidFill>
@@ -5572,7 +5704,7 @@
           <a:sym typeface="Arial"/>
         </a:defRPr>
       </a:lvl4pPr>
-      <a:lvl5pPr lvl="4" marR="0" rtl="0" algn="l">
+      <a:lvl5pPr marR="0" lvl="4" algn="l" rtl="0">
         <a:lnSpc>
           <a:spcPct val="100000"/>
         </a:lnSpc>
@@ -5586,7 +5718,7 @@
           <a:srgbClr val="000000"/>
         </a:buClr>
         <a:buFont typeface="Arial"/>
-        <a:defRPr b="0" i="0" sz="1400" u="none" cap="none" strike="noStrike">
+        <a:defRPr sz="1400" b="0" i="0" u="none" strike="noStrike" cap="none">
           <a:solidFill>
             <a:srgbClr val="000000"/>
           </a:solidFill>
@@ -5596,7 +5728,7 @@
           <a:sym typeface="Arial"/>
         </a:defRPr>
       </a:lvl5pPr>
-      <a:lvl6pPr lvl="5" marR="0" rtl="0" algn="l">
+      <a:lvl6pPr marR="0" lvl="5" algn="l" rtl="0">
         <a:lnSpc>
           <a:spcPct val="100000"/>
         </a:lnSpc>
@@ -5610,7 +5742,7 @@
           <a:srgbClr val="000000"/>
         </a:buClr>
         <a:buFont typeface="Arial"/>
-        <a:defRPr b="0" i="0" sz="1400" u="none" cap="none" strike="noStrike">
+        <a:defRPr sz="1400" b="0" i="0" u="none" strike="noStrike" cap="none">
           <a:solidFill>
             <a:srgbClr val="000000"/>
           </a:solidFill>
@@ -5620,7 +5752,7 @@
           <a:sym typeface="Arial"/>
         </a:defRPr>
       </a:lvl6pPr>
-      <a:lvl7pPr lvl="6" marR="0" rtl="0" algn="l">
+      <a:lvl7pPr marR="0" lvl="6" algn="l" rtl="0">
         <a:lnSpc>
           <a:spcPct val="100000"/>
         </a:lnSpc>
@@ -5634,7 +5766,7 @@
           <a:srgbClr val="000000"/>
         </a:buClr>
         <a:buFont typeface="Arial"/>
-        <a:defRPr b="0" i="0" sz="1400" u="none" cap="none" strike="noStrike">
+        <a:defRPr sz="1400" b="0" i="0" u="none" strike="noStrike" cap="none">
           <a:solidFill>
             <a:srgbClr val="000000"/>
           </a:solidFill>
@@ -5644,7 +5776,7 @@
           <a:sym typeface="Arial"/>
         </a:defRPr>
       </a:lvl7pPr>
-      <a:lvl8pPr lvl="7" marR="0" rtl="0" algn="l">
+      <a:lvl8pPr marR="0" lvl="7" algn="l" rtl="0">
         <a:lnSpc>
           <a:spcPct val="100000"/>
         </a:lnSpc>
@@ -5658,7 +5790,7 @@
           <a:srgbClr val="000000"/>
         </a:buClr>
         <a:buFont typeface="Arial"/>
-        <a:defRPr b="0" i="0" sz="1400" u="none" cap="none" strike="noStrike">
+        <a:defRPr sz="1400" b="0" i="0" u="none" strike="noStrike" cap="none">
           <a:solidFill>
             <a:srgbClr val="000000"/>
           </a:solidFill>
@@ -5668,7 +5800,7 @@
           <a:sym typeface="Arial"/>
         </a:defRPr>
       </a:lvl8pPr>
-      <a:lvl9pPr lvl="8" marR="0" rtl="0" algn="l">
+      <a:lvl9pPr marR="0" lvl="8" algn="l" rtl="0">
         <a:lnSpc>
           <a:spcPct val="100000"/>
         </a:lnSpc>
@@ -5682,7 +5814,7 @@
           <a:srgbClr val="000000"/>
         </a:buClr>
         <a:buFont typeface="Arial"/>
-        <a:defRPr b="0" i="0" sz="1400" u="none" cap="none" strike="noStrike">
+        <a:defRPr sz="1400" b="0" i="0" u="none" strike="noStrike" cap="none">
           <a:solidFill>
             <a:srgbClr val="000000"/>
           </a:solidFill>
@@ -5698,11 +5830,11 @@
 </file>
 
 <file path=ppt/slides/slide1.xml><?xml version="1.0" encoding="utf-8"?>
-<p:sld xmlns:a="http://schemas.openxmlformats.org/drawingml/2006/main" xmlns:r="http://schemas.openxmlformats.org/officeDocument/2006/relationships" xmlns:mc="http://schemas.openxmlformats.org/markup-compatibility/2006" xmlns:mv="urn:schemas-microsoft-com:mac:vml" xmlns:p="http://schemas.openxmlformats.org/presentationml/2006/main" xmlns:c="http://schemas.openxmlformats.org/drawingml/2006/chart" xmlns:dgm="http://schemas.openxmlformats.org/drawingml/2006/diagram" xmlns:o="urn:schemas-microsoft-com:office:office" xmlns:v="urn:schemas-microsoft-com:vml" xmlns:pvml="urn:schemas-microsoft-com:office:powerpoint" xmlns:com="http://schemas.openxmlformats.org/drawingml/2006/compatibility" xmlns:p14="http://schemas.microsoft.com/office/powerpoint/2010/main" xmlns:p15="http://schemas.microsoft.com/office/powerpoint/2012/main">
+<p:sld xmlns:a="http://schemas.openxmlformats.org/drawingml/2006/main" xmlns:r="http://schemas.openxmlformats.org/officeDocument/2006/relationships" xmlns:p="http://schemas.openxmlformats.org/presentationml/2006/main">
   <p:cSld>
     <p:spTree>
       <p:nvGrpSpPr>
-        <p:cNvPr id="53" name="Shape 53"/>
+        <p:cNvPr id="1" name="Shape 53"/>
         <p:cNvGrpSpPr/>
         <p:nvPr/>
       </p:nvGrpSpPr>
@@ -5717,7 +5849,9 @@
       <p:sp>
         <p:nvSpPr>
           <p:cNvPr id="54" name="Google Shape;54;p13"/>
-          <p:cNvSpPr txBox="1"/>
+          <p:cNvSpPr txBox="1">
+            <a:spLocks noGrp="1"/>
+          </p:cNvSpPr>
           <p:nvPr>
             <p:ph type="ctrTitle"/>
           </p:nvPr>
@@ -5732,12 +5866,12 @@
           </a:prstGeom>
         </p:spPr>
         <p:txBody>
-          <a:bodyPr anchorCtr="0" anchor="b" bIns="91425" lIns="91425" spcFirstLastPara="1" rIns="91425" wrap="square" tIns="91425">
+          <a:bodyPr spcFirstLastPara="1" wrap="square" lIns="91425" tIns="91425" rIns="91425" bIns="91425" anchor="b" anchorCtr="0">
             <a:noAutofit/>
           </a:bodyPr>
           <a:lstStyle/>
           <a:p>
-            <a:pPr indent="0" lvl="0" marL="0" rtl="0" algn="ctr">
+            <a:pPr marL="0" lvl="0" indent="0" algn="ctr" rtl="0">
               <a:spcBef>
                 <a:spcPts val="0"/>
               </a:spcBef>
@@ -5747,19 +5881,21 @@
               <a:buNone/>
             </a:pPr>
             <a:r>
-              <a:rPr lang="en" sz="4000"/>
+              <a:rPr lang="en" sz="4000" dirty="0"/>
               <a:t>ECONOMIC STIMULUS IMPACTS</a:t>
             </a:r>
-            <a:endParaRPr sz="4000"/>
+            <a:endParaRPr sz="4000" dirty="0"/>
           </a:p>
         </p:txBody>
       </p:sp>
       <p:sp>
         <p:nvSpPr>
           <p:cNvPr id="55" name="Google Shape;55;p13"/>
-          <p:cNvSpPr txBox="1"/>
+          <p:cNvSpPr txBox="1">
+            <a:spLocks noGrp="1"/>
+          </p:cNvSpPr>
           <p:nvPr>
-            <p:ph idx="1" type="subTitle"/>
+            <p:ph type="subTitle" idx="1"/>
           </p:nvPr>
         </p:nvSpPr>
         <p:spPr>
@@ -5772,12 +5908,12 @@
           </a:prstGeom>
         </p:spPr>
         <p:txBody>
-          <a:bodyPr anchorCtr="0" anchor="t" bIns="91425" lIns="91425" spcFirstLastPara="1" rIns="91425" wrap="square" tIns="91425">
+          <a:bodyPr spcFirstLastPara="1" wrap="square" lIns="91425" tIns="91425" rIns="91425" bIns="91425" anchor="t" anchorCtr="0">
             <a:noAutofit/>
           </a:bodyPr>
           <a:lstStyle/>
           <a:p>
-            <a:pPr indent="-342900" lvl="0" marL="457200" rtl="0" algn="l">
+            <a:pPr marL="457200" lvl="0" indent="-342900" algn="l" rtl="0">
               <a:spcBef>
                 <a:spcPts val="0"/>
               </a:spcBef>
@@ -5788,17 +5924,13 @@
               <a:buChar char="-"/>
             </a:pPr>
             <a:r>
-              <a:rPr lang="en" sz="1800"/>
-              <a:t>Bob</a:t>
+              <a:rPr lang="en" sz="1800" dirty="0"/>
+              <a:t>Bob Benton</a:t>
             </a:r>
-            <a:r>
-              <a:rPr lang="en" sz="1800"/>
-              <a:t> Benton</a:t>
-            </a:r>
-            <a:endParaRPr sz="1800"/>
-          </a:p>
-          <a:p>
-            <a:pPr indent="-342900" lvl="0" marL="457200" rtl="0" algn="l">
+            <a:endParaRPr sz="1800" dirty="0"/>
+          </a:p>
+          <a:p>
+            <a:pPr marL="457200" lvl="0" indent="-342900" algn="l" rtl="0">
               <a:spcBef>
                 <a:spcPts val="0"/>
               </a:spcBef>
@@ -5809,13 +5941,13 @@
               <a:buChar char="-"/>
             </a:pPr>
             <a:r>
-              <a:rPr lang="en" sz="1800"/>
+              <a:rPr lang="en" sz="1800" dirty="0"/>
               <a:t>David Frazier </a:t>
             </a:r>
-            <a:endParaRPr sz="1800"/>
-          </a:p>
-          <a:p>
-            <a:pPr indent="-342900" lvl="0" marL="457200" rtl="0" algn="l">
+            <a:endParaRPr sz="1800" dirty="0"/>
+          </a:p>
+          <a:p>
+            <a:pPr marL="457200" lvl="0" indent="-342900" algn="l" rtl="0">
               <a:spcBef>
                 <a:spcPts val="0"/>
               </a:spcBef>
@@ -5826,13 +5958,13 @@
               <a:buChar char="-"/>
             </a:pPr>
             <a:r>
-              <a:rPr lang="en" sz="1800"/>
-              <a:t>Tory </a:t>
+              <a:rPr lang="en" sz="1800" dirty="0"/>
+              <a:t>Tory Young</a:t>
             </a:r>
-            <a:endParaRPr sz="1800"/>
-          </a:p>
-          <a:p>
-            <a:pPr indent="-342900" lvl="0" marL="457200" rtl="0" algn="l">
+            <a:endParaRPr sz="1800" dirty="0"/>
+          </a:p>
+          <a:p>
+            <a:pPr marL="457200" lvl="0" indent="-342900" algn="l" rtl="0">
               <a:spcBef>
                 <a:spcPts val="0"/>
               </a:spcBef>
@@ -5843,10 +5975,10 @@
               <a:buChar char="-"/>
             </a:pPr>
             <a:r>
-              <a:rPr lang="en" sz="1800"/>
+              <a:rPr lang="en" sz="1800" dirty="0"/>
               <a:t>Pani Maddi </a:t>
             </a:r>
-            <a:endParaRPr sz="1800"/>
+            <a:endParaRPr sz="1800" dirty="0"/>
           </a:p>
         </p:txBody>
       </p:sp>
@@ -5859,18 +5991,19 @@
 </file>
 
 <file path=ppt/slides/slide2.xml><?xml version="1.0" encoding="utf-8"?>
-<p:sld xmlns:a="http://schemas.openxmlformats.org/drawingml/2006/main" xmlns:r="http://schemas.openxmlformats.org/officeDocument/2006/relationships" xmlns:mc="http://schemas.openxmlformats.org/markup-compatibility/2006" xmlns:mv="urn:schemas-microsoft-com:mac:vml" xmlns:p="http://schemas.openxmlformats.org/presentationml/2006/main" xmlns:c="http://schemas.openxmlformats.org/drawingml/2006/chart" xmlns:dgm="http://schemas.openxmlformats.org/drawingml/2006/diagram" xmlns:o="urn:schemas-microsoft-com:office:office" xmlns:v="urn:schemas-microsoft-com:vml" xmlns:pvml="urn:schemas-microsoft-com:office:powerpoint" xmlns:com="http://schemas.openxmlformats.org/drawingml/2006/compatibility" xmlns:p14="http://schemas.microsoft.com/office/powerpoint/2010/main" xmlns:p15="http://schemas.microsoft.com/office/powerpoint/2012/main">
+<p:sld xmlns:a="http://schemas.openxmlformats.org/drawingml/2006/main" xmlns:r="http://schemas.openxmlformats.org/officeDocument/2006/relationships" xmlns:p="http://schemas.openxmlformats.org/presentationml/2006/main">
   <p:cSld>
     <p:bg>
       <p:bgPr>
         <a:solidFill>
           <a:srgbClr val="000000"/>
         </a:solidFill>
+        <a:effectLst/>
       </p:bgPr>
     </p:bg>
     <p:spTree>
       <p:nvGrpSpPr>
-        <p:cNvPr id="59" name="Shape 59"/>
+        <p:cNvPr id="1" name="Shape 59"/>
         <p:cNvGrpSpPr/>
         <p:nvPr/>
       </p:nvGrpSpPr>
@@ -5885,7 +6018,9 @@
       <p:sp>
         <p:nvSpPr>
           <p:cNvPr id="60" name="Google Shape;60;p14"/>
-          <p:cNvSpPr txBox="1"/>
+          <p:cNvSpPr txBox="1">
+            <a:spLocks noGrp="1"/>
+          </p:cNvSpPr>
           <p:nvPr>
             <p:ph type="title"/>
           </p:nvPr>
@@ -5900,12 +6035,12 @@
           </a:prstGeom>
         </p:spPr>
         <p:txBody>
-          <a:bodyPr anchorCtr="0" anchor="t" bIns="91425" lIns="91425" spcFirstLastPara="1" rIns="91425" wrap="square" tIns="91425">
+          <a:bodyPr spcFirstLastPara="1" wrap="square" lIns="91425" tIns="91425" rIns="91425" bIns="91425" anchor="t" anchorCtr="0">
             <a:noAutofit/>
           </a:bodyPr>
           <a:lstStyle/>
           <a:p>
-            <a:pPr indent="0" lvl="0" marL="0" rtl="0" algn="l">
+            <a:pPr marL="0" lvl="0" indent="0" algn="l" rtl="0">
               <a:spcBef>
                 <a:spcPts val="0"/>
               </a:spcBef>
@@ -5925,9 +6060,11 @@
       <p:sp>
         <p:nvSpPr>
           <p:cNvPr id="61" name="Google Shape;61;p14"/>
-          <p:cNvSpPr txBox="1"/>
+          <p:cNvSpPr txBox="1">
+            <a:spLocks noGrp="1"/>
+          </p:cNvSpPr>
           <p:nvPr>
-            <p:ph idx="1" type="body"/>
+            <p:ph type="body" idx="1"/>
           </p:nvPr>
         </p:nvSpPr>
         <p:spPr>
@@ -5940,12 +6077,12 @@
           </a:prstGeom>
         </p:spPr>
         <p:txBody>
-          <a:bodyPr anchorCtr="0" anchor="t" bIns="91425" lIns="91425" spcFirstLastPara="1" rIns="91425" wrap="square" tIns="91425">
+          <a:bodyPr spcFirstLastPara="1" wrap="square" lIns="91425" tIns="91425" rIns="91425" bIns="91425" anchor="t" anchorCtr="0">
             <a:noAutofit/>
           </a:bodyPr>
           <a:lstStyle/>
           <a:p>
-            <a:pPr indent="0" lvl="0" marL="0" rtl="0" algn="l">
+            <a:pPr marL="0" lvl="0" indent="0" algn="l" rtl="0">
               <a:spcBef>
                 <a:spcPts val="0"/>
               </a:spcBef>
@@ -5965,9 +6102,11 @@
       <p:sp>
         <p:nvSpPr>
           <p:cNvPr id="62" name="Google Shape;62;p14"/>
-          <p:cNvSpPr txBox="1"/>
+          <p:cNvSpPr txBox="1">
+            <a:spLocks noGrp="1"/>
+          </p:cNvSpPr>
           <p:nvPr>
-            <p:ph idx="2" type="body"/>
+            <p:ph type="body" idx="2"/>
           </p:nvPr>
         </p:nvSpPr>
         <p:spPr>
@@ -5980,12 +6119,12 @@
           </a:prstGeom>
         </p:spPr>
         <p:txBody>
-          <a:bodyPr anchorCtr="0" anchor="t" bIns="91425" lIns="91425" spcFirstLastPara="1" rIns="91425" wrap="square" tIns="91425">
+          <a:bodyPr spcFirstLastPara="1" wrap="square" lIns="91425" tIns="91425" rIns="91425" bIns="91425" anchor="t" anchorCtr="0">
             <a:noAutofit/>
           </a:bodyPr>
           <a:lstStyle/>
           <a:p>
-            <a:pPr indent="0" lvl="0" marL="0" rtl="0" algn="l">
+            <a:pPr marL="0" lvl="0" indent="0" algn="l" rtl="0">
               <a:spcBef>
                 <a:spcPts val="0"/>
               </a:spcBef>
@@ -6022,12 +6161,12 @@
           </a:ln>
         </p:spPr>
         <p:txBody>
-          <a:bodyPr anchorCtr="0" anchor="t" bIns="91425" lIns="91425" spcFirstLastPara="1" rIns="91425" wrap="square" tIns="91425">
+          <a:bodyPr spcFirstLastPara="1" wrap="square" lIns="91425" tIns="91425" rIns="91425" bIns="91425" anchor="t" anchorCtr="0">
             <a:noAutofit/>
           </a:bodyPr>
           <a:lstStyle/>
           <a:p>
-            <a:pPr indent="0" lvl="0" marL="0" rtl="0" algn="l">
+            <a:pPr marL="0" lvl="0" indent="0" algn="l" rtl="0">
               <a:spcBef>
                 <a:spcPts val="0"/>
               </a:spcBef>
@@ -6072,12 +6211,12 @@
           </a:ln>
         </p:spPr>
         <p:txBody>
-          <a:bodyPr anchorCtr="0" anchor="t" bIns="91425" lIns="91425" spcFirstLastPara="1" rIns="91425" wrap="square" tIns="91425">
+          <a:bodyPr spcFirstLastPara="1" wrap="square" lIns="91425" tIns="91425" rIns="91425" bIns="91425" anchor="t" anchorCtr="0">
             <a:noAutofit/>
           </a:bodyPr>
           <a:lstStyle/>
           <a:p>
-            <a:pPr indent="0" lvl="0" marL="0" rtl="0" algn="l">
+            <a:pPr marL="0" lvl="0" indent="0" algn="l" rtl="0">
               <a:spcBef>
                 <a:spcPts val="0"/>
               </a:spcBef>
@@ -6111,11 +6250,11 @@
 </file>
 
 <file path=ppt/slides/slide3.xml><?xml version="1.0" encoding="utf-8"?>
-<p:sld xmlns:a="http://schemas.openxmlformats.org/drawingml/2006/main" xmlns:r="http://schemas.openxmlformats.org/officeDocument/2006/relationships" xmlns:mc="http://schemas.openxmlformats.org/markup-compatibility/2006" xmlns:mv="urn:schemas-microsoft-com:mac:vml" xmlns:p="http://schemas.openxmlformats.org/presentationml/2006/main" xmlns:c="http://schemas.openxmlformats.org/drawingml/2006/chart" xmlns:dgm="http://schemas.openxmlformats.org/drawingml/2006/diagram" xmlns:o="urn:schemas-microsoft-com:office:office" xmlns:v="urn:schemas-microsoft-com:vml" xmlns:pvml="urn:schemas-microsoft-com:office:powerpoint" xmlns:com="http://schemas.openxmlformats.org/drawingml/2006/compatibility" xmlns:p14="http://schemas.microsoft.com/office/powerpoint/2010/main" xmlns:p15="http://schemas.microsoft.com/office/powerpoint/2012/main">
+<p:sld xmlns:a="http://schemas.openxmlformats.org/drawingml/2006/main" xmlns:r="http://schemas.openxmlformats.org/officeDocument/2006/relationships" xmlns:p="http://schemas.openxmlformats.org/presentationml/2006/main">
   <p:cSld>
     <p:spTree>
       <p:nvGrpSpPr>
-        <p:cNvPr id="68" name="Shape 68"/>
+        <p:cNvPr id="1" name="Shape 68"/>
         <p:cNvGrpSpPr/>
         <p:nvPr/>
       </p:nvGrpSpPr>
@@ -6130,7 +6269,9 @@
       <p:sp>
         <p:nvSpPr>
           <p:cNvPr id="69" name="Google Shape;69;p15"/>
-          <p:cNvSpPr txBox="1"/>
+          <p:cNvSpPr txBox="1">
+            <a:spLocks noGrp="1"/>
+          </p:cNvSpPr>
           <p:nvPr>
             <p:ph type="title"/>
           </p:nvPr>
@@ -6145,12 +6286,12 @@
           </a:prstGeom>
         </p:spPr>
         <p:txBody>
-          <a:bodyPr anchorCtr="0" anchor="t" bIns="91425" lIns="91425" spcFirstLastPara="1" rIns="91425" wrap="square" tIns="91425">
+          <a:bodyPr spcFirstLastPara="1" wrap="square" lIns="91425" tIns="91425" rIns="91425" bIns="91425" anchor="t" anchorCtr="0">
             <a:noAutofit/>
           </a:bodyPr>
           <a:lstStyle/>
           <a:p>
-            <a:pPr indent="0" lvl="0" marL="0" rtl="0" algn="l">
+            <a:pPr marL="0" lvl="0" indent="0" algn="l" rtl="0">
               <a:spcBef>
                 <a:spcPts val="0"/>
               </a:spcBef>
@@ -6170,9 +6311,11 @@
       <p:sp>
         <p:nvSpPr>
           <p:cNvPr id="70" name="Google Shape;70;p15"/>
-          <p:cNvSpPr txBox="1"/>
+          <p:cNvSpPr txBox="1">
+            <a:spLocks noGrp="1"/>
+          </p:cNvSpPr>
           <p:nvPr>
-            <p:ph idx="1" type="body"/>
+            <p:ph type="body" idx="1"/>
           </p:nvPr>
         </p:nvSpPr>
         <p:spPr>
@@ -6185,12 +6328,12 @@
           </a:prstGeom>
         </p:spPr>
         <p:txBody>
-          <a:bodyPr anchorCtr="0" anchor="t" bIns="91425" lIns="91425" spcFirstLastPara="1" rIns="91425" wrap="square" tIns="91425">
+          <a:bodyPr spcFirstLastPara="1" wrap="square" lIns="91425" tIns="91425" rIns="91425" bIns="91425" anchor="t" anchorCtr="0">
             <a:noAutofit/>
           </a:bodyPr>
           <a:lstStyle/>
           <a:p>
-            <a:pPr indent="0" lvl="0" marL="0" rtl="0" algn="l">
+            <a:pPr marL="0" lvl="0" indent="0" algn="l" rtl="0">
               <a:spcBef>
                 <a:spcPts val="0"/>
               </a:spcBef>
@@ -6206,7 +6349,7 @@
             <a:endParaRPr/>
           </a:p>
           <a:p>
-            <a:pPr indent="0" lvl="0" marL="0" rtl="0" algn="l">
+            <a:pPr marL="0" lvl="0" indent="0" algn="l" rtl="0">
               <a:spcBef>
                 <a:spcPts val="1600"/>
               </a:spcBef>
@@ -6222,7 +6365,7 @@
             <a:endParaRPr/>
           </a:p>
           <a:p>
-            <a:pPr indent="0" lvl="0" marL="0" rtl="0" algn="l">
+            <a:pPr marL="0" lvl="0" indent="0" algn="l" rtl="0">
               <a:spcBef>
                 <a:spcPts val="1600"/>
               </a:spcBef>
@@ -6238,7 +6381,7 @@
             <a:endParaRPr/>
           </a:p>
           <a:p>
-            <a:pPr indent="0" lvl="0" marL="0" rtl="0" algn="l">
+            <a:pPr marL="0" lvl="0" indent="0" algn="l" rtl="0">
               <a:spcBef>
                 <a:spcPts val="1600"/>
               </a:spcBef>
@@ -6254,7 +6397,7 @@
             <a:endParaRPr/>
           </a:p>
           <a:p>
-            <a:pPr indent="0" lvl="0" marL="0" rtl="0" algn="l">
+            <a:pPr marL="0" lvl="0" indent="0" algn="l" rtl="0">
               <a:spcBef>
                 <a:spcPts val="1600"/>
               </a:spcBef>
@@ -6270,7 +6413,7 @@
             <a:endParaRPr/>
           </a:p>
           <a:p>
-            <a:pPr indent="0" lvl="0" marL="0" rtl="0" algn="l">
+            <a:pPr marL="0" lvl="0" indent="0" algn="l" rtl="0">
               <a:spcBef>
                 <a:spcPts val="1600"/>
               </a:spcBef>
@@ -6295,8 +6438,322 @@
 </p:sld>
 </file>
 
+<file path=ppt/slides/slide4.xml><?xml version="1.0" encoding="utf-8"?>
+<p:sld xmlns:a="http://schemas.openxmlformats.org/drawingml/2006/main" xmlns:r="http://schemas.openxmlformats.org/officeDocument/2006/relationships" xmlns:p="http://schemas.openxmlformats.org/presentationml/2006/main">
+  <p:cSld>
+    <p:spTree>
+      <p:nvGrpSpPr>
+        <p:cNvPr id="1" name=""/>
+        <p:cNvGrpSpPr/>
+        <p:nvPr/>
+      </p:nvGrpSpPr>
+      <p:grpSpPr>
+        <a:xfrm>
+          <a:off x="0" y="0"/>
+          <a:ext cx="0" cy="0"/>
+          <a:chOff x="0" y="0"/>
+          <a:chExt cx="0" cy="0"/>
+        </a:xfrm>
+      </p:grpSpPr>
+      <p:sp>
+        <p:nvSpPr>
+          <p:cNvPr id="2" name="Title 1">
+            <a:extLst>
+              <a:ext uri="{FF2B5EF4-FFF2-40B4-BE49-F238E27FC236}">
+                <a16:creationId xmlns:a16="http://schemas.microsoft.com/office/drawing/2014/main" id="{49AB58A3-5FD7-2342-8030-3082051BE3BB}"/>
+              </a:ext>
+            </a:extLst>
+          </p:cNvPr>
+          <p:cNvSpPr>
+            <a:spLocks noGrp="1"/>
+          </p:cNvSpPr>
+          <p:nvPr>
+            <p:ph type="title"/>
+          </p:nvPr>
+        </p:nvSpPr>
+        <p:spPr/>
+        <p:txBody>
+          <a:bodyPr/>
+          <a:lstStyle/>
+          <a:p>
+            <a:r>
+              <a:rPr lang="en-US" dirty="0"/>
+              <a:t>Current Stimulus</a:t>
+            </a:r>
+          </a:p>
+        </p:txBody>
+      </p:sp>
+      <p:sp>
+        <p:nvSpPr>
+          <p:cNvPr id="3" name="Text Placeholder 2">
+            <a:extLst>
+              <a:ext uri="{FF2B5EF4-FFF2-40B4-BE49-F238E27FC236}">
+                <a16:creationId xmlns:a16="http://schemas.microsoft.com/office/drawing/2014/main" id="{7C5CFD20-1629-3B47-B84F-087736EADDB1}"/>
+              </a:ext>
+            </a:extLst>
+          </p:cNvPr>
+          <p:cNvSpPr>
+            <a:spLocks noGrp="1"/>
+          </p:cNvSpPr>
+          <p:nvPr>
+            <p:ph type="body" idx="1"/>
+          </p:nvPr>
+        </p:nvSpPr>
+        <p:spPr/>
+        <p:txBody>
+          <a:bodyPr/>
+          <a:lstStyle/>
+          <a:p>
+            <a:r>
+              <a:rPr lang="en-US" dirty="0"/>
+              <a:t>2008 stimulus impacts –</a:t>
+            </a:r>
+          </a:p>
+          <a:p>
+            <a:pPr>
+              <a:buFont typeface="Wingdings" pitchFamily="2" charset="2"/>
+              <a:buChar char="Ø"/>
+            </a:pPr>
+            <a:r>
+              <a:rPr lang="en-US" dirty="0"/>
+              <a:t> look at unemployment (FRED)</a:t>
+            </a:r>
+          </a:p>
+          <a:p>
+            <a:pPr>
+              <a:buFont typeface="Wingdings" pitchFamily="2" charset="2"/>
+              <a:buChar char="Ø"/>
+            </a:pPr>
+            <a:r>
+              <a:rPr lang="en-US" dirty="0"/>
+              <a:t> GDP (FRED)</a:t>
+            </a:r>
+          </a:p>
+          <a:p>
+            <a:pPr>
+              <a:buFont typeface="Wingdings" pitchFamily="2" charset="2"/>
+              <a:buChar char="Ø"/>
+            </a:pPr>
+            <a:r>
+              <a:rPr lang="en-US" dirty="0"/>
+              <a:t> Foreclosures (</a:t>
+            </a:r>
+          </a:p>
+          <a:p>
+            <a:pPr>
+              <a:buFont typeface="Wingdings" pitchFamily="2" charset="2"/>
+              <a:buChar char="Ø"/>
+            </a:pPr>
+            <a:r>
+              <a:rPr lang="en-US" dirty="0"/>
+              <a:t>CPI (consumer price index)</a:t>
+            </a:r>
+          </a:p>
+          <a:p>
+            <a:pPr>
+              <a:buFont typeface="Wingdings" pitchFamily="2" charset="2"/>
+              <a:buChar char="Ø"/>
+            </a:pPr>
+            <a:r>
+              <a:rPr lang="en-US" dirty="0"/>
+              <a:t>Inflation</a:t>
+            </a:r>
+          </a:p>
+          <a:p>
+            <a:r>
+              <a:rPr lang="en-US" dirty="0"/>
+              <a:t>2020 stimulus</a:t>
+            </a:r>
+          </a:p>
+          <a:p>
+            <a:pPr>
+              <a:buFont typeface="Wingdings" pitchFamily="2" charset="2"/>
+              <a:buChar char="Ø"/>
+            </a:pPr>
+            <a:r>
+              <a:rPr lang="en-US" dirty="0"/>
+              <a:t> unemployment</a:t>
+            </a:r>
+          </a:p>
+          <a:p>
+            <a:pPr>
+              <a:buFont typeface="Wingdings" pitchFamily="2" charset="2"/>
+              <a:buChar char="Ø"/>
+            </a:pPr>
+            <a:r>
+              <a:rPr lang="en-US" dirty="0"/>
+              <a:t> debt </a:t>
+            </a:r>
+          </a:p>
+          <a:p>
+            <a:pPr>
+              <a:buFont typeface="Wingdings" pitchFamily="2" charset="2"/>
+              <a:buChar char="Ø"/>
+            </a:pPr>
+            <a:r>
+              <a:rPr lang="en-US" dirty="0"/>
+              <a:t> GDP</a:t>
+            </a:r>
+          </a:p>
+          <a:p>
+            <a:pPr>
+              <a:buFont typeface="Wingdings" pitchFamily="2" charset="2"/>
+              <a:buChar char="Ø"/>
+            </a:pPr>
+            <a:r>
+              <a:rPr lang="en-US" dirty="0"/>
+              <a:t> Eviction stats</a:t>
+            </a:r>
+          </a:p>
+          <a:p>
+            <a:pPr>
+              <a:buFont typeface="Wingdings" pitchFamily="2" charset="2"/>
+              <a:buChar char="Ø"/>
+            </a:pPr>
+            <a:r>
+              <a:rPr lang="en-US" dirty="0"/>
+              <a:t>CPI; </a:t>
+            </a:r>
+          </a:p>
+        </p:txBody>
+      </p:sp>
+    </p:spTree>
+    <p:extLst>
+      <p:ext uri="{BB962C8B-B14F-4D97-AF65-F5344CB8AC3E}">
+        <p14:creationId xmlns:p14="http://schemas.microsoft.com/office/powerpoint/2010/main" val="2998978406"/>
+      </p:ext>
+    </p:extLst>
+  </p:cSld>
+  <p:clrMapOvr>
+    <a:masterClrMapping/>
+  </p:clrMapOvr>
+</p:sld>
+</file>
+
+<file path=ppt/slides/slide5.xml><?xml version="1.0" encoding="utf-8"?>
+<p:sld xmlns:a="http://schemas.openxmlformats.org/drawingml/2006/main" xmlns:r="http://schemas.openxmlformats.org/officeDocument/2006/relationships" xmlns:p="http://schemas.openxmlformats.org/presentationml/2006/main">
+  <p:cSld>
+    <p:spTree>
+      <p:nvGrpSpPr>
+        <p:cNvPr id="1" name=""/>
+        <p:cNvGrpSpPr/>
+        <p:nvPr/>
+      </p:nvGrpSpPr>
+      <p:grpSpPr>
+        <a:xfrm>
+          <a:off x="0" y="0"/>
+          <a:ext cx="0" cy="0"/>
+          <a:chOff x="0" y="0"/>
+          <a:chExt cx="0" cy="0"/>
+        </a:xfrm>
+      </p:grpSpPr>
+      <p:sp>
+        <p:nvSpPr>
+          <p:cNvPr id="2" name="Title 1">
+            <a:extLst>
+              <a:ext uri="{FF2B5EF4-FFF2-40B4-BE49-F238E27FC236}">
+                <a16:creationId xmlns:a16="http://schemas.microsoft.com/office/drawing/2014/main" id="{B72028E7-96FC-3E48-B782-200A7C7DC1C1}"/>
+              </a:ext>
+            </a:extLst>
+          </p:cNvPr>
+          <p:cNvSpPr>
+            <a:spLocks noGrp="1"/>
+          </p:cNvSpPr>
+          <p:nvPr>
+            <p:ph type="title"/>
+          </p:nvPr>
+        </p:nvSpPr>
+        <p:spPr/>
+        <p:txBody>
+          <a:bodyPr/>
+          <a:lstStyle/>
+          <a:p>
+            <a:r>
+              <a:rPr lang="en-US" dirty="0"/>
+              <a:t>Next Steps</a:t>
+            </a:r>
+          </a:p>
+        </p:txBody>
+      </p:sp>
+      <p:sp>
+        <p:nvSpPr>
+          <p:cNvPr id="3" name="Text Placeholder 2">
+            <a:extLst>
+              <a:ext uri="{FF2B5EF4-FFF2-40B4-BE49-F238E27FC236}">
+                <a16:creationId xmlns:a16="http://schemas.microsoft.com/office/drawing/2014/main" id="{EFF89044-CCB5-EF41-B076-B5C3B4B3C1D7}"/>
+              </a:ext>
+            </a:extLst>
+          </p:cNvPr>
+          <p:cNvSpPr>
+            <a:spLocks noGrp="1"/>
+          </p:cNvSpPr>
+          <p:nvPr>
+            <p:ph type="body" idx="1"/>
+          </p:nvPr>
+        </p:nvSpPr>
+        <p:spPr/>
+        <p:txBody>
+          <a:bodyPr/>
+          <a:lstStyle/>
+          <a:p>
+            <a:r>
+              <a:rPr lang="en-US" dirty="0"/>
+              <a:t>Projections (assuming no Stimulus – based on historical/recent trend)</a:t>
+            </a:r>
+          </a:p>
+          <a:p>
+            <a:r>
+              <a:rPr lang="en-US" dirty="0"/>
+              <a:t>Get visualizations to work on the web </a:t>
+            </a:r>
+          </a:p>
+          <a:p>
+            <a:r>
+              <a:rPr lang="en-US" dirty="0"/>
+              <a:t>Census data for expense</a:t>
+            </a:r>
+          </a:p>
+          <a:p>
+            <a:pPr marL="114300" indent="0">
+              <a:buNone/>
+            </a:pPr>
+            <a:endParaRPr lang="en-US" dirty="0"/>
+          </a:p>
+          <a:p>
+            <a:endParaRPr lang="en-US" dirty="0"/>
+          </a:p>
+          <a:p>
+            <a:endParaRPr lang="en-US" dirty="0"/>
+          </a:p>
+          <a:p>
+            <a:endParaRPr lang="en-US" dirty="0"/>
+          </a:p>
+          <a:p>
+            <a:endParaRPr lang="en-US" dirty="0"/>
+          </a:p>
+          <a:p>
+            <a:r>
+              <a:rPr lang="en-US" dirty="0"/>
+              <a:t>Stimulus formula (think about what to include/exclude)</a:t>
+            </a:r>
+          </a:p>
+        </p:txBody>
+      </p:sp>
+    </p:spTree>
+    <p:extLst>
+      <p:ext uri="{BB962C8B-B14F-4D97-AF65-F5344CB8AC3E}">
+        <p14:creationId xmlns:p14="http://schemas.microsoft.com/office/powerpoint/2010/main" val="1353224219"/>
+      </p:ext>
+    </p:extLst>
+  </p:cSld>
+  <p:clrMapOvr>
+    <a:masterClrMapping/>
+  </p:clrMapOvr>
+</p:sld>
+</file>
+
 <file path=ppt/theme/theme1.xml><?xml version="1.0" encoding="utf-8"?>
-<a:theme xmlns:a="http://schemas.openxmlformats.org/drawingml/2006/main" xmlns:r="http://schemas.openxmlformats.org/officeDocument/2006/relationships" name="Simple Dark">
+<a:theme xmlns:a="http://schemas.openxmlformats.org/drawingml/2006/main" name="Simple Dark">
   <a:themeElements>
     <a:clrScheme name="Simple Dark">
       <a:dk1>
@@ -6571,11 +7028,13 @@
       </a:bgFillStyleLst>
     </a:fmtScheme>
   </a:themeElements>
+  <a:objectDefaults/>
+  <a:extraClrSchemeLst/>
 </a:theme>
 </file>
 
 <file path=ppt/theme/theme2.xml><?xml version="1.0" encoding="utf-8"?>
-<a:theme xmlns:a="http://schemas.openxmlformats.org/drawingml/2006/main" xmlns:r="http://schemas.openxmlformats.org/officeDocument/2006/relationships">
+<a:theme xmlns:a="http://schemas.openxmlformats.org/drawingml/2006/main">
   <a:themeElements>
     <a:clrScheme name="Default">
       <a:dk1>
@@ -6850,5 +7309,7 @@
       </a:bgFillStyleLst>
     </a:fmtScheme>
   </a:themeElements>
+  <a:objectDefaults/>
+  <a:extraClrSchemeLst/>
 </a:theme>
 </file>
</xml_diff>

<commit_message>
updated ppt & jupyter
</commit_message>
<xml_diff>
--- a/ECONOMIC STIMULUS IMPACTS.pptx
+++ b/ECONOMIC STIMULUS IMPACTS.pptx
@@ -5,14 +5,21 @@
     <p:sldMasterId id="2147483659" r:id="rId1"/>
   </p:sldMasterIdLst>
   <p:notesMasterIdLst>
-    <p:notesMasterId r:id="rId7"/>
+    <p:notesMasterId r:id="rId14"/>
   </p:notesMasterIdLst>
   <p:sldIdLst>
     <p:sldId id="256" r:id="rId2"/>
     <p:sldId id="257" r:id="rId3"/>
-    <p:sldId id="258" r:id="rId4"/>
-    <p:sldId id="260" r:id="rId5"/>
-    <p:sldId id="261" r:id="rId6"/>
+    <p:sldId id="267" r:id="rId4"/>
+    <p:sldId id="258" r:id="rId5"/>
+    <p:sldId id="262" r:id="rId6"/>
+    <p:sldId id="263" r:id="rId7"/>
+    <p:sldId id="264" r:id="rId8"/>
+    <p:sldId id="268" r:id="rId9"/>
+    <p:sldId id="265" r:id="rId10"/>
+    <p:sldId id="266" r:id="rId11"/>
+    <p:sldId id="260" r:id="rId12"/>
+    <p:sldId id="261" r:id="rId13"/>
   </p:sldIdLst>
   <p:sldSz cx="9144000" cy="5143500" type="screen16x9"/>
   <p:notesSz cx="6858000" cy="9144000"/>
@@ -809,6 +816,115 @@
 </p:notes>
 </file>
 
+<file path=ppt/notesSlides/notesSlide10.xml><?xml version="1.0" encoding="utf-8"?>
+<p:notes xmlns:a="http://schemas.openxmlformats.org/drawingml/2006/main" xmlns:r="http://schemas.openxmlformats.org/officeDocument/2006/relationships" xmlns:p="http://schemas.openxmlformats.org/presentationml/2006/main" showMasterSp="0" showMasterPhAnim="0">
+  <p:cSld>
+    <p:spTree>
+      <p:nvGrpSpPr>
+        <p:cNvPr id="1" name="Shape 65"/>
+        <p:cNvGrpSpPr/>
+        <p:nvPr/>
+      </p:nvGrpSpPr>
+      <p:grpSpPr>
+        <a:xfrm>
+          <a:off x="0" y="0"/>
+          <a:ext cx="0" cy="0"/>
+          <a:chOff x="0" y="0"/>
+          <a:chExt cx="0" cy="0"/>
+        </a:xfrm>
+      </p:grpSpPr>
+      <p:sp>
+        <p:nvSpPr>
+          <p:cNvPr id="66" name="Google Shape;66;g80026473fe_0_50:notes"/>
+          <p:cNvSpPr>
+            <a:spLocks noGrp="1" noRot="1" noChangeAspect="1"/>
+          </p:cNvSpPr>
+          <p:nvPr>
+            <p:ph type="sldImg" idx="2"/>
+          </p:nvPr>
+        </p:nvSpPr>
+        <p:spPr>
+          <a:xfrm>
+            <a:off x="381000" y="685800"/>
+            <a:ext cx="6096000" cy="3429000"/>
+          </a:xfrm>
+          <a:custGeom>
+            <a:avLst/>
+            <a:gdLst/>
+            <a:ahLst/>
+            <a:cxnLst/>
+            <a:rect l="l" t="t" r="r" b="b"/>
+            <a:pathLst>
+              <a:path w="120000" h="120000" extrusionOk="0">
+                <a:moveTo>
+                  <a:pt x="0" y="0"/>
+                </a:moveTo>
+                <a:lnTo>
+                  <a:pt x="120000" y="0"/>
+                </a:lnTo>
+                <a:lnTo>
+                  <a:pt x="120000" y="120000"/>
+                </a:lnTo>
+                <a:lnTo>
+                  <a:pt x="0" y="120000"/>
+                </a:lnTo>
+                <a:close/>
+              </a:path>
+            </a:pathLst>
+          </a:custGeom>
+        </p:spPr>
+      </p:sp>
+      <p:sp>
+        <p:nvSpPr>
+          <p:cNvPr id="67" name="Google Shape;67;g80026473fe_0_50:notes"/>
+          <p:cNvSpPr txBox="1">
+            <a:spLocks noGrp="1"/>
+          </p:cNvSpPr>
+          <p:nvPr>
+            <p:ph type="body" idx="1"/>
+          </p:nvPr>
+        </p:nvSpPr>
+        <p:spPr>
+          <a:xfrm>
+            <a:off x="685800" y="4343400"/>
+            <a:ext cx="5486400" cy="4114800"/>
+          </a:xfrm>
+          <a:prstGeom prst="rect">
+            <a:avLst/>
+          </a:prstGeom>
+        </p:spPr>
+        <p:txBody>
+          <a:bodyPr spcFirstLastPara="1" wrap="square" lIns="91425" tIns="91425" rIns="91425" bIns="91425" anchor="t" anchorCtr="0">
+            <a:noAutofit/>
+          </a:bodyPr>
+          <a:lstStyle/>
+          <a:p>
+            <a:pPr marL="0" lvl="0" indent="0" algn="l" rtl="0">
+              <a:spcBef>
+                <a:spcPts val="0"/>
+              </a:spcBef>
+              <a:spcAft>
+                <a:spcPts val="0"/>
+              </a:spcAft>
+              <a:buNone/>
+            </a:pPr>
+            <a:endParaRPr/>
+          </a:p>
+        </p:txBody>
+      </p:sp>
+    </p:spTree>
+    <p:extLst>
+      <p:ext uri="{BB962C8B-B14F-4D97-AF65-F5344CB8AC3E}">
+        <p14:creationId xmlns:p14="http://schemas.microsoft.com/office/powerpoint/2010/main" val="1461703205"/>
+      </p:ext>
+    </p:extLst>
+  </p:cSld>
+  <p:clrMapOvr>
+    <a:masterClrMapping/>
+  </p:clrMapOvr>
+</p:notes>
+</file>
+
 <file path=ppt/notesSlides/notesSlide2.xml><?xml version="1.0" encoding="utf-8"?>
 <p:notes xmlns:a="http://schemas.openxmlformats.org/drawingml/2006/main" xmlns:r="http://schemas.openxmlformats.org/officeDocument/2006/relationships" xmlns:p="http://schemas.openxmlformats.org/presentationml/2006/main" showMasterSp="0" showMasterPhAnim="0">
   <p:cSld>
@@ -838,7 +954,7 @@
         </p:nvSpPr>
         <p:spPr>
           <a:xfrm>
-            <a:off x="381300" y="685800"/>
+            <a:off x="381000" y="685800"/>
             <a:ext cx="6096000" cy="3429000"/>
           </a:xfrm>
           <a:custGeom>
@@ -918,6 +1034,115 @@
   <p:cSld>
     <p:spTree>
       <p:nvGrpSpPr>
+        <p:cNvPr id="1" name="Shape 56"/>
+        <p:cNvGrpSpPr/>
+        <p:nvPr/>
+      </p:nvGrpSpPr>
+      <p:grpSpPr>
+        <a:xfrm>
+          <a:off x="0" y="0"/>
+          <a:ext cx="0" cy="0"/>
+          <a:chOff x="0" y="0"/>
+          <a:chExt cx="0" cy="0"/>
+        </a:xfrm>
+      </p:grpSpPr>
+      <p:sp>
+        <p:nvSpPr>
+          <p:cNvPr id="57" name="Google Shape;57;g80026473fe_0_55:notes"/>
+          <p:cNvSpPr>
+            <a:spLocks noGrp="1" noRot="1" noChangeAspect="1"/>
+          </p:cNvSpPr>
+          <p:nvPr>
+            <p:ph type="sldImg" idx="2"/>
+          </p:nvPr>
+        </p:nvSpPr>
+        <p:spPr>
+          <a:xfrm>
+            <a:off x="381000" y="685800"/>
+            <a:ext cx="6096000" cy="3429000"/>
+          </a:xfrm>
+          <a:custGeom>
+            <a:avLst/>
+            <a:gdLst/>
+            <a:ahLst/>
+            <a:cxnLst/>
+            <a:rect l="l" t="t" r="r" b="b"/>
+            <a:pathLst>
+              <a:path w="120000" h="120000" extrusionOk="0">
+                <a:moveTo>
+                  <a:pt x="0" y="0"/>
+                </a:moveTo>
+                <a:lnTo>
+                  <a:pt x="120000" y="0"/>
+                </a:lnTo>
+                <a:lnTo>
+                  <a:pt x="120000" y="120000"/>
+                </a:lnTo>
+                <a:lnTo>
+                  <a:pt x="0" y="120000"/>
+                </a:lnTo>
+                <a:close/>
+              </a:path>
+            </a:pathLst>
+          </a:custGeom>
+        </p:spPr>
+      </p:sp>
+      <p:sp>
+        <p:nvSpPr>
+          <p:cNvPr id="58" name="Google Shape;58;g80026473fe_0_55:notes"/>
+          <p:cNvSpPr txBox="1">
+            <a:spLocks noGrp="1"/>
+          </p:cNvSpPr>
+          <p:nvPr>
+            <p:ph type="body" idx="1"/>
+          </p:nvPr>
+        </p:nvSpPr>
+        <p:spPr>
+          <a:xfrm>
+            <a:off x="685800" y="4343400"/>
+            <a:ext cx="5486400" cy="4114800"/>
+          </a:xfrm>
+          <a:prstGeom prst="rect">
+            <a:avLst/>
+          </a:prstGeom>
+        </p:spPr>
+        <p:txBody>
+          <a:bodyPr spcFirstLastPara="1" wrap="square" lIns="91425" tIns="91425" rIns="91425" bIns="91425" anchor="t" anchorCtr="0">
+            <a:noAutofit/>
+          </a:bodyPr>
+          <a:lstStyle/>
+          <a:p>
+            <a:pPr marL="0" lvl="0" indent="0" algn="l" rtl="0">
+              <a:spcBef>
+                <a:spcPts val="0"/>
+              </a:spcBef>
+              <a:spcAft>
+                <a:spcPts val="0"/>
+              </a:spcAft>
+              <a:buNone/>
+            </a:pPr>
+            <a:endParaRPr/>
+          </a:p>
+        </p:txBody>
+      </p:sp>
+    </p:spTree>
+    <p:extLst>
+      <p:ext uri="{BB962C8B-B14F-4D97-AF65-F5344CB8AC3E}">
+        <p14:creationId xmlns:p14="http://schemas.microsoft.com/office/powerpoint/2010/main" val="2107676076"/>
+      </p:ext>
+    </p:extLst>
+  </p:cSld>
+  <p:clrMapOvr>
+    <a:masterClrMapping/>
+  </p:clrMapOvr>
+</p:notes>
+</file>
+
+<file path=ppt/notesSlides/notesSlide4.xml><?xml version="1.0" encoding="utf-8"?>
+<p:notes xmlns:a="http://schemas.openxmlformats.org/drawingml/2006/main" xmlns:r="http://schemas.openxmlformats.org/officeDocument/2006/relationships" xmlns:p="http://schemas.openxmlformats.org/presentationml/2006/main" showMasterSp="0" showMasterPhAnim="0">
+  <p:cSld>
+    <p:spTree>
+      <p:nvGrpSpPr>
         <p:cNvPr id="1" name="Shape 65"/>
         <p:cNvGrpSpPr/>
         <p:nvPr/>
@@ -942,7 +1167,7 @@
         </p:nvSpPr>
         <p:spPr>
           <a:xfrm>
-            <a:off x="381300" y="685800"/>
+            <a:off x="381000" y="685800"/>
             <a:ext cx="6096000" cy="3429000"/>
           </a:xfrm>
           <a:custGeom>
@@ -1010,6 +1235,551 @@
         </p:txBody>
       </p:sp>
     </p:spTree>
+  </p:cSld>
+  <p:clrMapOvr>
+    <a:masterClrMapping/>
+  </p:clrMapOvr>
+</p:notes>
+</file>
+
+<file path=ppt/notesSlides/notesSlide5.xml><?xml version="1.0" encoding="utf-8"?>
+<p:notes xmlns:a="http://schemas.openxmlformats.org/drawingml/2006/main" xmlns:r="http://schemas.openxmlformats.org/officeDocument/2006/relationships" xmlns:p="http://schemas.openxmlformats.org/presentationml/2006/main" showMasterSp="0" showMasterPhAnim="0">
+  <p:cSld>
+    <p:spTree>
+      <p:nvGrpSpPr>
+        <p:cNvPr id="1" name="Shape 65"/>
+        <p:cNvGrpSpPr/>
+        <p:nvPr/>
+      </p:nvGrpSpPr>
+      <p:grpSpPr>
+        <a:xfrm>
+          <a:off x="0" y="0"/>
+          <a:ext cx="0" cy="0"/>
+          <a:chOff x="0" y="0"/>
+          <a:chExt cx="0" cy="0"/>
+        </a:xfrm>
+      </p:grpSpPr>
+      <p:sp>
+        <p:nvSpPr>
+          <p:cNvPr id="66" name="Google Shape;66;g80026473fe_0_50:notes"/>
+          <p:cNvSpPr>
+            <a:spLocks noGrp="1" noRot="1" noChangeAspect="1"/>
+          </p:cNvSpPr>
+          <p:nvPr>
+            <p:ph type="sldImg" idx="2"/>
+          </p:nvPr>
+        </p:nvSpPr>
+        <p:spPr>
+          <a:xfrm>
+            <a:off x="381000" y="685800"/>
+            <a:ext cx="6096000" cy="3429000"/>
+          </a:xfrm>
+          <a:custGeom>
+            <a:avLst/>
+            <a:gdLst/>
+            <a:ahLst/>
+            <a:cxnLst/>
+            <a:rect l="l" t="t" r="r" b="b"/>
+            <a:pathLst>
+              <a:path w="120000" h="120000" extrusionOk="0">
+                <a:moveTo>
+                  <a:pt x="0" y="0"/>
+                </a:moveTo>
+                <a:lnTo>
+                  <a:pt x="120000" y="0"/>
+                </a:lnTo>
+                <a:lnTo>
+                  <a:pt x="120000" y="120000"/>
+                </a:lnTo>
+                <a:lnTo>
+                  <a:pt x="0" y="120000"/>
+                </a:lnTo>
+                <a:close/>
+              </a:path>
+            </a:pathLst>
+          </a:custGeom>
+        </p:spPr>
+      </p:sp>
+      <p:sp>
+        <p:nvSpPr>
+          <p:cNvPr id="67" name="Google Shape;67;g80026473fe_0_50:notes"/>
+          <p:cNvSpPr txBox="1">
+            <a:spLocks noGrp="1"/>
+          </p:cNvSpPr>
+          <p:nvPr>
+            <p:ph type="body" idx="1"/>
+          </p:nvPr>
+        </p:nvSpPr>
+        <p:spPr>
+          <a:xfrm>
+            <a:off x="685800" y="4343400"/>
+            <a:ext cx="5486400" cy="4114800"/>
+          </a:xfrm>
+          <a:prstGeom prst="rect">
+            <a:avLst/>
+          </a:prstGeom>
+        </p:spPr>
+        <p:txBody>
+          <a:bodyPr spcFirstLastPara="1" wrap="square" lIns="91425" tIns="91425" rIns="91425" bIns="91425" anchor="t" anchorCtr="0">
+            <a:noAutofit/>
+          </a:bodyPr>
+          <a:lstStyle/>
+          <a:p>
+            <a:pPr marL="0" lvl="0" indent="0" algn="l" rtl="0">
+              <a:spcBef>
+                <a:spcPts val="0"/>
+              </a:spcBef>
+              <a:spcAft>
+                <a:spcPts val="0"/>
+              </a:spcAft>
+              <a:buNone/>
+            </a:pPr>
+            <a:endParaRPr/>
+          </a:p>
+        </p:txBody>
+      </p:sp>
+    </p:spTree>
+    <p:extLst>
+      <p:ext uri="{BB962C8B-B14F-4D97-AF65-F5344CB8AC3E}">
+        <p14:creationId xmlns:p14="http://schemas.microsoft.com/office/powerpoint/2010/main" val="2100031864"/>
+      </p:ext>
+    </p:extLst>
+  </p:cSld>
+  <p:clrMapOvr>
+    <a:masterClrMapping/>
+  </p:clrMapOvr>
+</p:notes>
+</file>
+
+<file path=ppt/notesSlides/notesSlide6.xml><?xml version="1.0" encoding="utf-8"?>
+<p:notes xmlns:a="http://schemas.openxmlformats.org/drawingml/2006/main" xmlns:r="http://schemas.openxmlformats.org/officeDocument/2006/relationships" xmlns:p="http://schemas.openxmlformats.org/presentationml/2006/main" showMasterSp="0" showMasterPhAnim="0">
+  <p:cSld>
+    <p:spTree>
+      <p:nvGrpSpPr>
+        <p:cNvPr id="1" name="Shape 65"/>
+        <p:cNvGrpSpPr/>
+        <p:nvPr/>
+      </p:nvGrpSpPr>
+      <p:grpSpPr>
+        <a:xfrm>
+          <a:off x="0" y="0"/>
+          <a:ext cx="0" cy="0"/>
+          <a:chOff x="0" y="0"/>
+          <a:chExt cx="0" cy="0"/>
+        </a:xfrm>
+      </p:grpSpPr>
+      <p:sp>
+        <p:nvSpPr>
+          <p:cNvPr id="66" name="Google Shape;66;g80026473fe_0_50:notes"/>
+          <p:cNvSpPr>
+            <a:spLocks noGrp="1" noRot="1" noChangeAspect="1"/>
+          </p:cNvSpPr>
+          <p:nvPr>
+            <p:ph type="sldImg" idx="2"/>
+          </p:nvPr>
+        </p:nvSpPr>
+        <p:spPr>
+          <a:xfrm>
+            <a:off x="381000" y="685800"/>
+            <a:ext cx="6096000" cy="3429000"/>
+          </a:xfrm>
+          <a:custGeom>
+            <a:avLst/>
+            <a:gdLst/>
+            <a:ahLst/>
+            <a:cxnLst/>
+            <a:rect l="l" t="t" r="r" b="b"/>
+            <a:pathLst>
+              <a:path w="120000" h="120000" extrusionOk="0">
+                <a:moveTo>
+                  <a:pt x="0" y="0"/>
+                </a:moveTo>
+                <a:lnTo>
+                  <a:pt x="120000" y="0"/>
+                </a:lnTo>
+                <a:lnTo>
+                  <a:pt x="120000" y="120000"/>
+                </a:lnTo>
+                <a:lnTo>
+                  <a:pt x="0" y="120000"/>
+                </a:lnTo>
+                <a:close/>
+              </a:path>
+            </a:pathLst>
+          </a:custGeom>
+        </p:spPr>
+      </p:sp>
+      <p:sp>
+        <p:nvSpPr>
+          <p:cNvPr id="67" name="Google Shape;67;g80026473fe_0_50:notes"/>
+          <p:cNvSpPr txBox="1">
+            <a:spLocks noGrp="1"/>
+          </p:cNvSpPr>
+          <p:nvPr>
+            <p:ph type="body" idx="1"/>
+          </p:nvPr>
+        </p:nvSpPr>
+        <p:spPr>
+          <a:xfrm>
+            <a:off x="685800" y="4343400"/>
+            <a:ext cx="5486400" cy="4114800"/>
+          </a:xfrm>
+          <a:prstGeom prst="rect">
+            <a:avLst/>
+          </a:prstGeom>
+        </p:spPr>
+        <p:txBody>
+          <a:bodyPr spcFirstLastPara="1" wrap="square" lIns="91425" tIns="91425" rIns="91425" bIns="91425" anchor="t" anchorCtr="0">
+            <a:noAutofit/>
+          </a:bodyPr>
+          <a:lstStyle/>
+          <a:p>
+            <a:pPr marL="0" lvl="0" indent="0" algn="l" rtl="0">
+              <a:spcBef>
+                <a:spcPts val="0"/>
+              </a:spcBef>
+              <a:spcAft>
+                <a:spcPts val="0"/>
+              </a:spcAft>
+              <a:buNone/>
+            </a:pPr>
+            <a:endParaRPr/>
+          </a:p>
+        </p:txBody>
+      </p:sp>
+    </p:spTree>
+    <p:extLst>
+      <p:ext uri="{BB962C8B-B14F-4D97-AF65-F5344CB8AC3E}">
+        <p14:creationId xmlns:p14="http://schemas.microsoft.com/office/powerpoint/2010/main" val="2777883006"/>
+      </p:ext>
+    </p:extLst>
+  </p:cSld>
+  <p:clrMapOvr>
+    <a:masterClrMapping/>
+  </p:clrMapOvr>
+</p:notes>
+</file>
+
+<file path=ppt/notesSlides/notesSlide7.xml><?xml version="1.0" encoding="utf-8"?>
+<p:notes xmlns:a="http://schemas.openxmlformats.org/drawingml/2006/main" xmlns:r="http://schemas.openxmlformats.org/officeDocument/2006/relationships" xmlns:p="http://schemas.openxmlformats.org/presentationml/2006/main" showMasterSp="0" showMasterPhAnim="0">
+  <p:cSld>
+    <p:spTree>
+      <p:nvGrpSpPr>
+        <p:cNvPr id="1" name="Shape 65"/>
+        <p:cNvGrpSpPr/>
+        <p:nvPr/>
+      </p:nvGrpSpPr>
+      <p:grpSpPr>
+        <a:xfrm>
+          <a:off x="0" y="0"/>
+          <a:ext cx="0" cy="0"/>
+          <a:chOff x="0" y="0"/>
+          <a:chExt cx="0" cy="0"/>
+        </a:xfrm>
+      </p:grpSpPr>
+      <p:sp>
+        <p:nvSpPr>
+          <p:cNvPr id="66" name="Google Shape;66;g80026473fe_0_50:notes"/>
+          <p:cNvSpPr>
+            <a:spLocks noGrp="1" noRot="1" noChangeAspect="1"/>
+          </p:cNvSpPr>
+          <p:nvPr>
+            <p:ph type="sldImg" idx="2"/>
+          </p:nvPr>
+        </p:nvSpPr>
+        <p:spPr>
+          <a:xfrm>
+            <a:off x="381000" y="685800"/>
+            <a:ext cx="6096000" cy="3429000"/>
+          </a:xfrm>
+          <a:custGeom>
+            <a:avLst/>
+            <a:gdLst/>
+            <a:ahLst/>
+            <a:cxnLst/>
+            <a:rect l="l" t="t" r="r" b="b"/>
+            <a:pathLst>
+              <a:path w="120000" h="120000" extrusionOk="0">
+                <a:moveTo>
+                  <a:pt x="0" y="0"/>
+                </a:moveTo>
+                <a:lnTo>
+                  <a:pt x="120000" y="0"/>
+                </a:lnTo>
+                <a:lnTo>
+                  <a:pt x="120000" y="120000"/>
+                </a:lnTo>
+                <a:lnTo>
+                  <a:pt x="0" y="120000"/>
+                </a:lnTo>
+                <a:close/>
+              </a:path>
+            </a:pathLst>
+          </a:custGeom>
+        </p:spPr>
+      </p:sp>
+      <p:sp>
+        <p:nvSpPr>
+          <p:cNvPr id="67" name="Google Shape;67;g80026473fe_0_50:notes"/>
+          <p:cNvSpPr txBox="1">
+            <a:spLocks noGrp="1"/>
+          </p:cNvSpPr>
+          <p:nvPr>
+            <p:ph type="body" idx="1"/>
+          </p:nvPr>
+        </p:nvSpPr>
+        <p:spPr>
+          <a:xfrm>
+            <a:off x="685800" y="4343400"/>
+            <a:ext cx="5486400" cy="4114800"/>
+          </a:xfrm>
+          <a:prstGeom prst="rect">
+            <a:avLst/>
+          </a:prstGeom>
+        </p:spPr>
+        <p:txBody>
+          <a:bodyPr spcFirstLastPara="1" wrap="square" lIns="91425" tIns="91425" rIns="91425" bIns="91425" anchor="t" anchorCtr="0">
+            <a:noAutofit/>
+          </a:bodyPr>
+          <a:lstStyle/>
+          <a:p>
+            <a:pPr marL="0" lvl="0" indent="0" algn="l" rtl="0">
+              <a:spcBef>
+                <a:spcPts val="0"/>
+              </a:spcBef>
+              <a:spcAft>
+                <a:spcPts val="0"/>
+              </a:spcAft>
+              <a:buNone/>
+            </a:pPr>
+            <a:endParaRPr/>
+          </a:p>
+        </p:txBody>
+      </p:sp>
+    </p:spTree>
+    <p:extLst>
+      <p:ext uri="{BB962C8B-B14F-4D97-AF65-F5344CB8AC3E}">
+        <p14:creationId xmlns:p14="http://schemas.microsoft.com/office/powerpoint/2010/main" val="3890451976"/>
+      </p:ext>
+    </p:extLst>
+  </p:cSld>
+  <p:clrMapOvr>
+    <a:masterClrMapping/>
+  </p:clrMapOvr>
+</p:notes>
+</file>
+
+<file path=ppt/notesSlides/notesSlide8.xml><?xml version="1.0" encoding="utf-8"?>
+<p:notes xmlns:a="http://schemas.openxmlformats.org/drawingml/2006/main" xmlns:r="http://schemas.openxmlformats.org/officeDocument/2006/relationships" xmlns:p="http://schemas.openxmlformats.org/presentationml/2006/main" showMasterSp="0" showMasterPhAnim="0">
+  <p:cSld>
+    <p:spTree>
+      <p:nvGrpSpPr>
+        <p:cNvPr id="1" name="Shape 65"/>
+        <p:cNvGrpSpPr/>
+        <p:nvPr/>
+      </p:nvGrpSpPr>
+      <p:grpSpPr>
+        <a:xfrm>
+          <a:off x="0" y="0"/>
+          <a:ext cx="0" cy="0"/>
+          <a:chOff x="0" y="0"/>
+          <a:chExt cx="0" cy="0"/>
+        </a:xfrm>
+      </p:grpSpPr>
+      <p:sp>
+        <p:nvSpPr>
+          <p:cNvPr id="66" name="Google Shape;66;g80026473fe_0_50:notes"/>
+          <p:cNvSpPr>
+            <a:spLocks noGrp="1" noRot="1" noChangeAspect="1"/>
+          </p:cNvSpPr>
+          <p:nvPr>
+            <p:ph type="sldImg" idx="2"/>
+          </p:nvPr>
+        </p:nvSpPr>
+        <p:spPr>
+          <a:xfrm>
+            <a:off x="381000" y="685800"/>
+            <a:ext cx="6096000" cy="3429000"/>
+          </a:xfrm>
+          <a:custGeom>
+            <a:avLst/>
+            <a:gdLst/>
+            <a:ahLst/>
+            <a:cxnLst/>
+            <a:rect l="l" t="t" r="r" b="b"/>
+            <a:pathLst>
+              <a:path w="120000" h="120000" extrusionOk="0">
+                <a:moveTo>
+                  <a:pt x="0" y="0"/>
+                </a:moveTo>
+                <a:lnTo>
+                  <a:pt x="120000" y="0"/>
+                </a:lnTo>
+                <a:lnTo>
+                  <a:pt x="120000" y="120000"/>
+                </a:lnTo>
+                <a:lnTo>
+                  <a:pt x="0" y="120000"/>
+                </a:lnTo>
+                <a:close/>
+              </a:path>
+            </a:pathLst>
+          </a:custGeom>
+        </p:spPr>
+      </p:sp>
+      <p:sp>
+        <p:nvSpPr>
+          <p:cNvPr id="67" name="Google Shape;67;g80026473fe_0_50:notes"/>
+          <p:cNvSpPr txBox="1">
+            <a:spLocks noGrp="1"/>
+          </p:cNvSpPr>
+          <p:nvPr>
+            <p:ph type="body" idx="1"/>
+          </p:nvPr>
+        </p:nvSpPr>
+        <p:spPr>
+          <a:xfrm>
+            <a:off x="685800" y="4343400"/>
+            <a:ext cx="5486400" cy="4114800"/>
+          </a:xfrm>
+          <a:prstGeom prst="rect">
+            <a:avLst/>
+          </a:prstGeom>
+        </p:spPr>
+        <p:txBody>
+          <a:bodyPr spcFirstLastPara="1" wrap="square" lIns="91425" tIns="91425" rIns="91425" bIns="91425" anchor="t" anchorCtr="0">
+            <a:noAutofit/>
+          </a:bodyPr>
+          <a:lstStyle/>
+          <a:p>
+            <a:pPr marL="0" lvl="0" indent="0" algn="l" rtl="0">
+              <a:spcBef>
+                <a:spcPts val="0"/>
+              </a:spcBef>
+              <a:spcAft>
+                <a:spcPts val="0"/>
+              </a:spcAft>
+              <a:buNone/>
+            </a:pPr>
+            <a:endParaRPr/>
+          </a:p>
+        </p:txBody>
+      </p:sp>
+    </p:spTree>
+    <p:extLst>
+      <p:ext uri="{BB962C8B-B14F-4D97-AF65-F5344CB8AC3E}">
+        <p14:creationId xmlns:p14="http://schemas.microsoft.com/office/powerpoint/2010/main" val="2297396560"/>
+      </p:ext>
+    </p:extLst>
+  </p:cSld>
+  <p:clrMapOvr>
+    <a:masterClrMapping/>
+  </p:clrMapOvr>
+</p:notes>
+</file>
+
+<file path=ppt/notesSlides/notesSlide9.xml><?xml version="1.0" encoding="utf-8"?>
+<p:notes xmlns:a="http://schemas.openxmlformats.org/drawingml/2006/main" xmlns:r="http://schemas.openxmlformats.org/officeDocument/2006/relationships" xmlns:p="http://schemas.openxmlformats.org/presentationml/2006/main" showMasterSp="0" showMasterPhAnim="0">
+  <p:cSld>
+    <p:spTree>
+      <p:nvGrpSpPr>
+        <p:cNvPr id="1" name="Shape 65"/>
+        <p:cNvGrpSpPr/>
+        <p:nvPr/>
+      </p:nvGrpSpPr>
+      <p:grpSpPr>
+        <a:xfrm>
+          <a:off x="0" y="0"/>
+          <a:ext cx="0" cy="0"/>
+          <a:chOff x="0" y="0"/>
+          <a:chExt cx="0" cy="0"/>
+        </a:xfrm>
+      </p:grpSpPr>
+      <p:sp>
+        <p:nvSpPr>
+          <p:cNvPr id="66" name="Google Shape;66;g80026473fe_0_50:notes"/>
+          <p:cNvSpPr>
+            <a:spLocks noGrp="1" noRot="1" noChangeAspect="1"/>
+          </p:cNvSpPr>
+          <p:nvPr>
+            <p:ph type="sldImg" idx="2"/>
+          </p:nvPr>
+        </p:nvSpPr>
+        <p:spPr>
+          <a:xfrm>
+            <a:off x="381000" y="685800"/>
+            <a:ext cx="6096000" cy="3429000"/>
+          </a:xfrm>
+          <a:custGeom>
+            <a:avLst/>
+            <a:gdLst/>
+            <a:ahLst/>
+            <a:cxnLst/>
+            <a:rect l="l" t="t" r="r" b="b"/>
+            <a:pathLst>
+              <a:path w="120000" h="120000" extrusionOk="0">
+                <a:moveTo>
+                  <a:pt x="0" y="0"/>
+                </a:moveTo>
+                <a:lnTo>
+                  <a:pt x="120000" y="0"/>
+                </a:lnTo>
+                <a:lnTo>
+                  <a:pt x="120000" y="120000"/>
+                </a:lnTo>
+                <a:lnTo>
+                  <a:pt x="0" y="120000"/>
+                </a:lnTo>
+                <a:close/>
+              </a:path>
+            </a:pathLst>
+          </a:custGeom>
+        </p:spPr>
+      </p:sp>
+      <p:sp>
+        <p:nvSpPr>
+          <p:cNvPr id="67" name="Google Shape;67;g80026473fe_0_50:notes"/>
+          <p:cNvSpPr txBox="1">
+            <a:spLocks noGrp="1"/>
+          </p:cNvSpPr>
+          <p:nvPr>
+            <p:ph type="body" idx="1"/>
+          </p:nvPr>
+        </p:nvSpPr>
+        <p:spPr>
+          <a:xfrm>
+            <a:off x="685800" y="4343400"/>
+            <a:ext cx="5486400" cy="4114800"/>
+          </a:xfrm>
+          <a:prstGeom prst="rect">
+            <a:avLst/>
+          </a:prstGeom>
+        </p:spPr>
+        <p:txBody>
+          <a:bodyPr spcFirstLastPara="1" wrap="square" lIns="91425" tIns="91425" rIns="91425" bIns="91425" anchor="t" anchorCtr="0">
+            <a:noAutofit/>
+          </a:bodyPr>
+          <a:lstStyle/>
+          <a:p>
+            <a:pPr marL="0" lvl="0" indent="0" algn="l" rtl="0">
+              <a:spcBef>
+                <a:spcPts val="0"/>
+              </a:spcBef>
+              <a:spcAft>
+                <a:spcPts val="0"/>
+              </a:spcAft>
+              <a:buNone/>
+            </a:pPr>
+            <a:endParaRPr/>
+          </a:p>
+        </p:txBody>
+      </p:sp>
+    </p:spTree>
+    <p:extLst>
+      <p:ext uri="{BB962C8B-B14F-4D97-AF65-F5344CB8AC3E}">
+        <p14:creationId xmlns:p14="http://schemas.microsoft.com/office/powerpoint/2010/main" val="1426791329"/>
+      </p:ext>
+    </p:extLst>
   </p:cSld>
   <p:clrMapOvr>
     <a:masterClrMapping/>
@@ -5990,6 +6760,802 @@
 </p:sld>
 </file>
 
+<file path=ppt/slides/slide10.xml><?xml version="1.0" encoding="utf-8"?>
+<p:sld xmlns:a="http://schemas.openxmlformats.org/drawingml/2006/main" xmlns:r="http://schemas.openxmlformats.org/officeDocument/2006/relationships" xmlns:p="http://schemas.openxmlformats.org/presentationml/2006/main">
+  <p:cSld>
+    <p:spTree>
+      <p:nvGrpSpPr>
+        <p:cNvPr id="1" name="Shape 68"/>
+        <p:cNvGrpSpPr/>
+        <p:nvPr/>
+      </p:nvGrpSpPr>
+      <p:grpSpPr>
+        <a:xfrm>
+          <a:off x="0" y="0"/>
+          <a:ext cx="0" cy="0"/>
+          <a:chOff x="0" y="0"/>
+          <a:chExt cx="0" cy="0"/>
+        </a:xfrm>
+      </p:grpSpPr>
+      <p:sp>
+        <p:nvSpPr>
+          <p:cNvPr id="69" name="Google Shape;69;p15"/>
+          <p:cNvSpPr txBox="1">
+            <a:spLocks noGrp="1"/>
+          </p:cNvSpPr>
+          <p:nvPr>
+            <p:ph type="title"/>
+          </p:nvPr>
+        </p:nvSpPr>
+        <p:spPr>
+          <a:xfrm>
+            <a:off x="311700" y="445025"/>
+            <a:ext cx="8520600" cy="572700"/>
+          </a:xfrm>
+          <a:prstGeom prst="rect">
+            <a:avLst/>
+          </a:prstGeom>
+        </p:spPr>
+        <p:txBody>
+          <a:bodyPr spcFirstLastPara="1" wrap="square" lIns="91425" tIns="91425" rIns="91425" bIns="91425" anchor="t" anchorCtr="0">
+            <a:noAutofit/>
+          </a:bodyPr>
+          <a:lstStyle/>
+          <a:p>
+            <a:pPr marL="0" lvl="0" indent="0" algn="l" rtl="0">
+              <a:spcBef>
+                <a:spcPts val="0"/>
+              </a:spcBef>
+              <a:spcAft>
+                <a:spcPts val="0"/>
+              </a:spcAft>
+              <a:buNone/>
+            </a:pPr>
+            <a:r>
+              <a:rPr lang="en"/>
+              <a:t>ECONOMIC STIMULUS </a:t>
+            </a:r>
+            <a:endParaRPr/>
+          </a:p>
+        </p:txBody>
+      </p:sp>
+      <p:sp>
+        <p:nvSpPr>
+          <p:cNvPr id="70" name="Google Shape;70;p15"/>
+          <p:cNvSpPr txBox="1">
+            <a:spLocks noGrp="1"/>
+          </p:cNvSpPr>
+          <p:nvPr>
+            <p:ph type="body" idx="1"/>
+          </p:nvPr>
+        </p:nvSpPr>
+        <p:spPr>
+          <a:xfrm>
+            <a:off x="311700" y="1152475"/>
+            <a:ext cx="8520600" cy="3416400"/>
+          </a:xfrm>
+          <a:prstGeom prst="rect">
+            <a:avLst/>
+          </a:prstGeom>
+        </p:spPr>
+        <p:txBody>
+          <a:bodyPr spcFirstLastPara="1" wrap="square" lIns="91425" tIns="91425" rIns="91425" bIns="91425" anchor="t" anchorCtr="0">
+            <a:noAutofit/>
+          </a:bodyPr>
+          <a:lstStyle/>
+          <a:p>
+            <a:pPr marL="342900" lvl="0">
+              <a:spcBef>
+                <a:spcPts val="1600"/>
+              </a:spcBef>
+              <a:spcAft>
+                <a:spcPts val="1600"/>
+              </a:spcAft>
+              <a:buFont typeface="+mj-lt"/>
+              <a:buAutoNum type="arabicPeriod"/>
+            </a:pPr>
+            <a:r>
+              <a:rPr lang="en-US" dirty="0"/>
+              <a:t>What are some unintended consequences. How to prevent/minimize the unintended consequence.</a:t>
+            </a:r>
+          </a:p>
+        </p:txBody>
+      </p:sp>
+      <p:graphicFrame>
+        <p:nvGraphicFramePr>
+          <p:cNvPr id="2" name="Table 1">
+            <a:extLst>
+              <a:ext uri="{FF2B5EF4-FFF2-40B4-BE49-F238E27FC236}">
+                <a16:creationId xmlns:a16="http://schemas.microsoft.com/office/drawing/2014/main" id="{80208508-C765-9F4D-A515-E4C1C19E10C3}"/>
+              </a:ext>
+            </a:extLst>
+          </p:cNvPr>
+          <p:cNvGraphicFramePr>
+            <a:graphicFrameLocks noGrp="1"/>
+          </p:cNvGraphicFramePr>
+          <p:nvPr>
+            <p:extLst>
+              <p:ext uri="{D42A27DB-BD31-4B8C-83A1-F6EECF244321}">
+                <p14:modId xmlns:p14="http://schemas.microsoft.com/office/powerpoint/2010/main" val="1165928331"/>
+              </p:ext>
+            </p:extLst>
+          </p:nvPr>
+        </p:nvGraphicFramePr>
+        <p:xfrm>
+          <a:off x="545345" y="2088738"/>
+          <a:ext cx="7540917" cy="2656840"/>
+        </p:xfrm>
+        <a:graphic>
+          <a:graphicData uri="http://schemas.openxmlformats.org/drawingml/2006/table">
+            <a:tbl>
+              <a:tblPr firstRow="1" bandRow="1">
+                <a:tableStyleId>{5C22544A-7EE6-4342-B048-85BDC9FD1C3A}</a:tableStyleId>
+              </a:tblPr>
+              <a:tblGrid>
+                <a:gridCol w="616190">
+                  <a:extLst>
+                    <a:ext uri="{9D8B030D-6E8A-4147-A177-3AD203B41FA5}">
+                      <a16:colId xmlns:a16="http://schemas.microsoft.com/office/drawing/2014/main" val="2763148282"/>
+                    </a:ext>
+                  </a:extLst>
+                </a:gridCol>
+                <a:gridCol w="3447810">
+                  <a:extLst>
+                    <a:ext uri="{9D8B030D-6E8A-4147-A177-3AD203B41FA5}">
+                      <a16:colId xmlns:a16="http://schemas.microsoft.com/office/drawing/2014/main" val="1835291870"/>
+                    </a:ext>
+                  </a:extLst>
+                </a:gridCol>
+                <a:gridCol w="3476917">
+                  <a:extLst>
+                    <a:ext uri="{9D8B030D-6E8A-4147-A177-3AD203B41FA5}">
+                      <a16:colId xmlns:a16="http://schemas.microsoft.com/office/drawing/2014/main" val="2617904064"/>
+                    </a:ext>
+                  </a:extLst>
+                </a:gridCol>
+              </a:tblGrid>
+              <a:tr h="0">
+                <a:tc>
+                  <a:txBody>
+                    <a:bodyPr/>
+                    <a:lstStyle/>
+                    <a:p>
+                      <a:endParaRPr lang="en-US" dirty="0"/>
+                    </a:p>
+                  </a:txBody>
+                  <a:tcPr/>
+                </a:tc>
+                <a:tc>
+                  <a:txBody>
+                    <a:bodyPr/>
+                    <a:lstStyle/>
+                    <a:p>
+                      <a:r>
+                        <a:rPr lang="en-US" dirty="0"/>
+                        <a:t>Unintended Negative Impacts</a:t>
+                      </a:r>
+                    </a:p>
+                  </a:txBody>
+                  <a:tcPr/>
+                </a:tc>
+                <a:tc>
+                  <a:txBody>
+                    <a:bodyPr/>
+                    <a:lstStyle/>
+                    <a:p>
+                      <a:r>
+                        <a:rPr lang="en-US" dirty="0"/>
+                        <a:t>Unintended Positive Impacts</a:t>
+                      </a:r>
+                    </a:p>
+                  </a:txBody>
+                  <a:tcPr/>
+                </a:tc>
+                <a:extLst>
+                  <a:ext uri="{0D108BD9-81ED-4DB2-BD59-A6C34878D82A}">
+                    <a16:rowId xmlns:a16="http://schemas.microsoft.com/office/drawing/2014/main" val="2847543506"/>
+                  </a:ext>
+                </a:extLst>
+              </a:tr>
+              <a:tr h="186690">
+                <a:tc>
+                  <a:txBody>
+                    <a:bodyPr/>
+                    <a:lstStyle/>
+                    <a:p>
+                      <a:endParaRPr lang="en-US" dirty="0">
+                        <a:solidFill>
+                          <a:schemeClr val="bg1"/>
+                        </a:solidFill>
+                      </a:endParaRPr>
+                    </a:p>
+                  </a:txBody>
+                  <a:tcPr/>
+                </a:tc>
+                <a:tc>
+                  <a:txBody>
+                    <a:bodyPr/>
+                    <a:lstStyle/>
+                    <a:p>
+                      <a:pPr marL="0" marR="0" lvl="0" indent="0" algn="l" defTabSz="914400" rtl="0" eaLnBrk="1" fontAlgn="auto" latinLnBrk="0" hangingPunct="1">
+                        <a:lnSpc>
+                          <a:spcPct val="100000"/>
+                        </a:lnSpc>
+                        <a:spcBef>
+                          <a:spcPts val="0"/>
+                        </a:spcBef>
+                        <a:spcAft>
+                          <a:spcPts val="0"/>
+                        </a:spcAft>
+                        <a:buClr>
+                          <a:srgbClr val="000000"/>
+                        </a:buClr>
+                        <a:buSzTx/>
+                        <a:buFont typeface="Arial"/>
+                        <a:buNone/>
+                        <a:tabLst/>
+                        <a:defRPr/>
+                      </a:pPr>
+                      <a:r>
+                        <a:rPr lang="en-US" dirty="0">
+                          <a:solidFill>
+                            <a:schemeClr val="bg1"/>
+                          </a:solidFill>
+                        </a:rPr>
+                        <a:t>People may get used to free money and not wanting to go back to work</a:t>
+                      </a:r>
+                    </a:p>
+                  </a:txBody>
+                  <a:tcPr/>
+                </a:tc>
+                <a:tc>
+                  <a:txBody>
+                    <a:bodyPr/>
+                    <a:lstStyle/>
+                    <a:p>
+                      <a:r>
+                        <a:rPr lang="en-US" dirty="0">
+                          <a:solidFill>
+                            <a:schemeClr val="bg1"/>
+                          </a:solidFill>
+                        </a:rPr>
+                        <a:t>Innovation from individuals, businesses</a:t>
+                      </a:r>
+                    </a:p>
+                  </a:txBody>
+                  <a:tcPr/>
+                </a:tc>
+                <a:extLst>
+                  <a:ext uri="{0D108BD9-81ED-4DB2-BD59-A6C34878D82A}">
+                    <a16:rowId xmlns:a16="http://schemas.microsoft.com/office/drawing/2014/main" val="2455739441"/>
+                  </a:ext>
+                </a:extLst>
+              </a:tr>
+              <a:tr h="370840">
+                <a:tc>
+                  <a:txBody>
+                    <a:bodyPr/>
+                    <a:lstStyle/>
+                    <a:p>
+                      <a:endParaRPr lang="en-US">
+                        <a:solidFill>
+                          <a:schemeClr val="bg1"/>
+                        </a:solidFill>
+                      </a:endParaRPr>
+                    </a:p>
+                  </a:txBody>
+                  <a:tcPr/>
+                </a:tc>
+                <a:tc>
+                  <a:txBody>
+                    <a:bodyPr/>
+                    <a:lstStyle/>
+                    <a:p>
+                      <a:pPr marL="0" marR="0" lvl="0" indent="0" algn="l" defTabSz="914400" rtl="0" eaLnBrk="1" fontAlgn="auto" latinLnBrk="0" hangingPunct="1">
+                        <a:lnSpc>
+                          <a:spcPct val="100000"/>
+                        </a:lnSpc>
+                        <a:spcBef>
+                          <a:spcPts val="0"/>
+                        </a:spcBef>
+                        <a:spcAft>
+                          <a:spcPts val="0"/>
+                        </a:spcAft>
+                        <a:buClr>
+                          <a:srgbClr val="000000"/>
+                        </a:buClr>
+                        <a:buSzTx/>
+                        <a:buFont typeface="Arial"/>
+                        <a:buNone/>
+                        <a:tabLst/>
+                        <a:defRPr/>
+                      </a:pPr>
+                      <a:r>
+                        <a:rPr lang="en-US" dirty="0">
+                          <a:solidFill>
+                            <a:schemeClr val="bg1"/>
+                          </a:solidFill>
+                        </a:rPr>
+                        <a:t>Businesses that don’t need the stimulus will get the money. Businesses that need the money will not get the money</a:t>
+                      </a:r>
+                    </a:p>
+                  </a:txBody>
+                  <a:tcPr/>
+                </a:tc>
+                <a:tc>
+                  <a:txBody>
+                    <a:bodyPr/>
+                    <a:lstStyle/>
+                    <a:p>
+                      <a:r>
+                        <a:rPr lang="en-US" dirty="0">
+                          <a:solidFill>
+                            <a:schemeClr val="bg1"/>
+                          </a:solidFill>
+                        </a:rPr>
+                        <a:t>Efficiency improvements in government and businesses</a:t>
+                      </a:r>
+                    </a:p>
+                  </a:txBody>
+                  <a:tcPr/>
+                </a:tc>
+                <a:extLst>
+                  <a:ext uri="{0D108BD9-81ED-4DB2-BD59-A6C34878D82A}">
+                    <a16:rowId xmlns:a16="http://schemas.microsoft.com/office/drawing/2014/main" val="3075379871"/>
+                  </a:ext>
+                </a:extLst>
+              </a:tr>
+              <a:tr h="370840">
+                <a:tc>
+                  <a:txBody>
+                    <a:bodyPr/>
+                    <a:lstStyle/>
+                    <a:p>
+                      <a:endParaRPr lang="en-US">
+                        <a:solidFill>
+                          <a:schemeClr val="bg1"/>
+                        </a:solidFill>
+                      </a:endParaRPr>
+                    </a:p>
+                  </a:txBody>
+                  <a:tcPr/>
+                </a:tc>
+                <a:tc>
+                  <a:txBody>
+                    <a:bodyPr/>
+                    <a:lstStyle/>
+                    <a:p>
+                      <a:r>
+                        <a:rPr lang="en-US" dirty="0">
+                          <a:solidFill>
+                            <a:schemeClr val="bg1"/>
+                          </a:solidFill>
+                        </a:rPr>
+                        <a:t>Adding to the already growing national debt (</a:t>
+                      </a:r>
+                      <a:r>
+                        <a:rPr lang="en-US">
+                          <a:solidFill>
+                            <a:schemeClr val="bg1"/>
+                          </a:solidFill>
+                        </a:rPr>
+                        <a:t>current debt $24.9T as of April 2020)</a:t>
+                      </a:r>
+                      <a:endParaRPr lang="en-US" dirty="0">
+                        <a:solidFill>
+                          <a:schemeClr val="bg1"/>
+                        </a:solidFill>
+                      </a:endParaRPr>
+                    </a:p>
+                  </a:txBody>
+                  <a:tcPr/>
+                </a:tc>
+                <a:tc>
+                  <a:txBody>
+                    <a:bodyPr/>
+                    <a:lstStyle/>
+                    <a:p>
+                      <a:r>
+                        <a:rPr lang="en-US" dirty="0">
+                          <a:solidFill>
+                            <a:schemeClr val="bg1"/>
+                          </a:solidFill>
+                        </a:rPr>
+                        <a:t>New technology adoptions (ex – telehealth services)</a:t>
+                      </a:r>
+                    </a:p>
+                  </a:txBody>
+                  <a:tcPr/>
+                </a:tc>
+                <a:extLst>
+                  <a:ext uri="{0D108BD9-81ED-4DB2-BD59-A6C34878D82A}">
+                    <a16:rowId xmlns:a16="http://schemas.microsoft.com/office/drawing/2014/main" val="1213987874"/>
+                  </a:ext>
+                </a:extLst>
+              </a:tr>
+              <a:tr h="370840">
+                <a:tc>
+                  <a:txBody>
+                    <a:bodyPr/>
+                    <a:lstStyle/>
+                    <a:p>
+                      <a:endParaRPr lang="en-US">
+                        <a:solidFill>
+                          <a:schemeClr val="bg1"/>
+                        </a:solidFill>
+                      </a:endParaRPr>
+                    </a:p>
+                  </a:txBody>
+                  <a:tcPr/>
+                </a:tc>
+                <a:tc>
+                  <a:txBody>
+                    <a:bodyPr/>
+                    <a:lstStyle/>
+                    <a:p>
+                      <a:endParaRPr lang="en-US">
+                        <a:solidFill>
+                          <a:schemeClr val="bg1"/>
+                        </a:solidFill>
+                      </a:endParaRPr>
+                    </a:p>
+                  </a:txBody>
+                  <a:tcPr/>
+                </a:tc>
+                <a:tc>
+                  <a:txBody>
+                    <a:bodyPr/>
+                    <a:lstStyle/>
+                    <a:p>
+                      <a:r>
+                        <a:rPr lang="en-US" dirty="0">
+                          <a:solidFill>
+                            <a:schemeClr val="bg1"/>
+                          </a:solidFill>
+                        </a:rPr>
+                        <a:t>Goodwill of businesses</a:t>
+                      </a:r>
+                    </a:p>
+                  </a:txBody>
+                  <a:tcPr/>
+                </a:tc>
+                <a:extLst>
+                  <a:ext uri="{0D108BD9-81ED-4DB2-BD59-A6C34878D82A}">
+                    <a16:rowId xmlns:a16="http://schemas.microsoft.com/office/drawing/2014/main" val="2621607493"/>
+                  </a:ext>
+                </a:extLst>
+              </a:tr>
+            </a:tbl>
+          </a:graphicData>
+        </a:graphic>
+      </p:graphicFrame>
+    </p:spTree>
+    <p:extLst>
+      <p:ext uri="{BB962C8B-B14F-4D97-AF65-F5344CB8AC3E}">
+        <p14:creationId xmlns:p14="http://schemas.microsoft.com/office/powerpoint/2010/main" val="539957998"/>
+      </p:ext>
+    </p:extLst>
+  </p:cSld>
+  <p:clrMapOvr>
+    <a:masterClrMapping/>
+  </p:clrMapOvr>
+</p:sld>
+</file>
+
+<file path=ppt/slides/slide11.xml><?xml version="1.0" encoding="utf-8"?>
+<p:sld xmlns:a="http://schemas.openxmlformats.org/drawingml/2006/main" xmlns:r="http://schemas.openxmlformats.org/officeDocument/2006/relationships" xmlns:p="http://schemas.openxmlformats.org/presentationml/2006/main">
+  <p:cSld>
+    <p:spTree>
+      <p:nvGrpSpPr>
+        <p:cNvPr id="1" name=""/>
+        <p:cNvGrpSpPr/>
+        <p:nvPr/>
+      </p:nvGrpSpPr>
+      <p:grpSpPr>
+        <a:xfrm>
+          <a:off x="0" y="0"/>
+          <a:ext cx="0" cy="0"/>
+          <a:chOff x="0" y="0"/>
+          <a:chExt cx="0" cy="0"/>
+        </a:xfrm>
+      </p:grpSpPr>
+      <p:sp>
+        <p:nvSpPr>
+          <p:cNvPr id="2" name="Title 1">
+            <a:extLst>
+              <a:ext uri="{FF2B5EF4-FFF2-40B4-BE49-F238E27FC236}">
+                <a16:creationId xmlns:a16="http://schemas.microsoft.com/office/drawing/2014/main" id="{49AB58A3-5FD7-2342-8030-3082051BE3BB}"/>
+              </a:ext>
+            </a:extLst>
+          </p:cNvPr>
+          <p:cNvSpPr>
+            <a:spLocks noGrp="1"/>
+          </p:cNvSpPr>
+          <p:nvPr>
+            <p:ph type="title"/>
+          </p:nvPr>
+        </p:nvSpPr>
+        <p:spPr/>
+        <p:txBody>
+          <a:bodyPr/>
+          <a:lstStyle/>
+          <a:p>
+            <a:r>
+              <a:rPr lang="en-US" dirty="0"/>
+              <a:t>Current Stimulus</a:t>
+            </a:r>
+          </a:p>
+        </p:txBody>
+      </p:sp>
+      <p:sp>
+        <p:nvSpPr>
+          <p:cNvPr id="3" name="Text Placeholder 2">
+            <a:extLst>
+              <a:ext uri="{FF2B5EF4-FFF2-40B4-BE49-F238E27FC236}">
+                <a16:creationId xmlns:a16="http://schemas.microsoft.com/office/drawing/2014/main" id="{7C5CFD20-1629-3B47-B84F-087736EADDB1}"/>
+              </a:ext>
+            </a:extLst>
+          </p:cNvPr>
+          <p:cNvSpPr>
+            <a:spLocks noGrp="1"/>
+          </p:cNvSpPr>
+          <p:nvPr>
+            <p:ph type="body" idx="1"/>
+          </p:nvPr>
+        </p:nvSpPr>
+        <p:spPr/>
+        <p:txBody>
+          <a:bodyPr/>
+          <a:lstStyle/>
+          <a:p>
+            <a:r>
+              <a:rPr lang="en-US" dirty="0"/>
+              <a:t>2008 stimulus impacts –</a:t>
+            </a:r>
+          </a:p>
+          <a:p>
+            <a:pPr>
+              <a:buFont typeface="Wingdings" pitchFamily="2" charset="2"/>
+              <a:buChar char="Ø"/>
+            </a:pPr>
+            <a:r>
+              <a:rPr lang="en-US" dirty="0"/>
+              <a:t> look at unemployment (FRED)</a:t>
+            </a:r>
+          </a:p>
+          <a:p>
+            <a:pPr>
+              <a:buFont typeface="Wingdings" pitchFamily="2" charset="2"/>
+              <a:buChar char="Ø"/>
+            </a:pPr>
+            <a:r>
+              <a:rPr lang="en-US" dirty="0"/>
+              <a:t> GDP (FRED)</a:t>
+            </a:r>
+          </a:p>
+          <a:p>
+            <a:pPr>
+              <a:buFont typeface="Wingdings" pitchFamily="2" charset="2"/>
+              <a:buChar char="Ø"/>
+            </a:pPr>
+            <a:r>
+              <a:rPr lang="en-US" dirty="0"/>
+              <a:t> Foreclosures (</a:t>
+            </a:r>
+          </a:p>
+          <a:p>
+            <a:pPr>
+              <a:buFont typeface="Wingdings" pitchFamily="2" charset="2"/>
+              <a:buChar char="Ø"/>
+            </a:pPr>
+            <a:r>
+              <a:rPr lang="en-US" dirty="0"/>
+              <a:t>CPI (consumer price index)</a:t>
+            </a:r>
+          </a:p>
+          <a:p>
+            <a:pPr>
+              <a:buFont typeface="Wingdings" pitchFamily="2" charset="2"/>
+              <a:buChar char="Ø"/>
+            </a:pPr>
+            <a:r>
+              <a:rPr lang="en-US" dirty="0"/>
+              <a:t>Inflation</a:t>
+            </a:r>
+          </a:p>
+          <a:p>
+            <a:r>
+              <a:rPr lang="en-US" dirty="0"/>
+              <a:t>2020 stimulus</a:t>
+            </a:r>
+          </a:p>
+          <a:p>
+            <a:pPr>
+              <a:buFont typeface="Wingdings" pitchFamily="2" charset="2"/>
+              <a:buChar char="Ø"/>
+            </a:pPr>
+            <a:r>
+              <a:rPr lang="en-US" dirty="0"/>
+              <a:t> unemployment</a:t>
+            </a:r>
+          </a:p>
+          <a:p>
+            <a:pPr>
+              <a:buFont typeface="Wingdings" pitchFamily="2" charset="2"/>
+              <a:buChar char="Ø"/>
+            </a:pPr>
+            <a:r>
+              <a:rPr lang="en-US" dirty="0"/>
+              <a:t> debt </a:t>
+            </a:r>
+          </a:p>
+          <a:p>
+            <a:pPr>
+              <a:buFont typeface="Wingdings" pitchFamily="2" charset="2"/>
+              <a:buChar char="Ø"/>
+            </a:pPr>
+            <a:r>
+              <a:rPr lang="en-US" dirty="0"/>
+              <a:t> GDP</a:t>
+            </a:r>
+          </a:p>
+          <a:p>
+            <a:pPr>
+              <a:buFont typeface="Wingdings" pitchFamily="2" charset="2"/>
+              <a:buChar char="Ø"/>
+            </a:pPr>
+            <a:r>
+              <a:rPr lang="en-US" dirty="0"/>
+              <a:t> Eviction stats</a:t>
+            </a:r>
+          </a:p>
+          <a:p>
+            <a:pPr>
+              <a:buFont typeface="Wingdings" pitchFamily="2" charset="2"/>
+              <a:buChar char="Ø"/>
+            </a:pPr>
+            <a:r>
+              <a:rPr lang="en-US" dirty="0"/>
+              <a:t>CPI; </a:t>
+            </a:r>
+          </a:p>
+        </p:txBody>
+      </p:sp>
+    </p:spTree>
+    <p:extLst>
+      <p:ext uri="{BB962C8B-B14F-4D97-AF65-F5344CB8AC3E}">
+        <p14:creationId xmlns:p14="http://schemas.microsoft.com/office/powerpoint/2010/main" val="2998978406"/>
+      </p:ext>
+    </p:extLst>
+  </p:cSld>
+  <p:clrMapOvr>
+    <a:masterClrMapping/>
+  </p:clrMapOvr>
+</p:sld>
+</file>
+
+<file path=ppt/slides/slide12.xml><?xml version="1.0" encoding="utf-8"?>
+<p:sld xmlns:a="http://schemas.openxmlformats.org/drawingml/2006/main" xmlns:r="http://schemas.openxmlformats.org/officeDocument/2006/relationships" xmlns:p="http://schemas.openxmlformats.org/presentationml/2006/main">
+  <p:cSld>
+    <p:spTree>
+      <p:nvGrpSpPr>
+        <p:cNvPr id="1" name=""/>
+        <p:cNvGrpSpPr/>
+        <p:nvPr/>
+      </p:nvGrpSpPr>
+      <p:grpSpPr>
+        <a:xfrm>
+          <a:off x="0" y="0"/>
+          <a:ext cx="0" cy="0"/>
+          <a:chOff x="0" y="0"/>
+          <a:chExt cx="0" cy="0"/>
+        </a:xfrm>
+      </p:grpSpPr>
+      <p:sp>
+        <p:nvSpPr>
+          <p:cNvPr id="2" name="Title 1">
+            <a:extLst>
+              <a:ext uri="{FF2B5EF4-FFF2-40B4-BE49-F238E27FC236}">
+                <a16:creationId xmlns:a16="http://schemas.microsoft.com/office/drawing/2014/main" id="{B72028E7-96FC-3E48-B782-200A7C7DC1C1}"/>
+              </a:ext>
+            </a:extLst>
+          </p:cNvPr>
+          <p:cNvSpPr>
+            <a:spLocks noGrp="1"/>
+          </p:cNvSpPr>
+          <p:nvPr>
+            <p:ph type="title"/>
+          </p:nvPr>
+        </p:nvSpPr>
+        <p:spPr/>
+        <p:txBody>
+          <a:bodyPr/>
+          <a:lstStyle/>
+          <a:p>
+            <a:r>
+              <a:rPr lang="en-US" dirty="0"/>
+              <a:t>Next Steps</a:t>
+            </a:r>
+          </a:p>
+        </p:txBody>
+      </p:sp>
+      <p:sp>
+        <p:nvSpPr>
+          <p:cNvPr id="3" name="Text Placeholder 2">
+            <a:extLst>
+              <a:ext uri="{FF2B5EF4-FFF2-40B4-BE49-F238E27FC236}">
+                <a16:creationId xmlns:a16="http://schemas.microsoft.com/office/drawing/2014/main" id="{EFF89044-CCB5-EF41-B076-B5C3B4B3C1D7}"/>
+              </a:ext>
+            </a:extLst>
+          </p:cNvPr>
+          <p:cNvSpPr>
+            <a:spLocks noGrp="1"/>
+          </p:cNvSpPr>
+          <p:nvPr>
+            <p:ph type="body" idx="1"/>
+          </p:nvPr>
+        </p:nvSpPr>
+        <p:spPr/>
+        <p:txBody>
+          <a:bodyPr/>
+          <a:lstStyle/>
+          <a:p>
+            <a:r>
+              <a:rPr lang="en-US" dirty="0"/>
+              <a:t>Projections (assuming no Stimulus – based on historical/recent trend)</a:t>
+            </a:r>
+          </a:p>
+          <a:p>
+            <a:r>
+              <a:rPr lang="en-US" dirty="0"/>
+              <a:t>Get visualizations to work on the web </a:t>
+            </a:r>
+          </a:p>
+          <a:p>
+            <a:r>
+              <a:rPr lang="en-US" dirty="0"/>
+              <a:t>Census data for expense</a:t>
+            </a:r>
+          </a:p>
+          <a:p>
+            <a:pPr marL="114300" indent="0">
+              <a:buNone/>
+            </a:pPr>
+            <a:endParaRPr lang="en-US" dirty="0"/>
+          </a:p>
+          <a:p>
+            <a:endParaRPr lang="en-US" dirty="0"/>
+          </a:p>
+          <a:p>
+            <a:endParaRPr lang="en-US" dirty="0"/>
+          </a:p>
+          <a:p>
+            <a:endParaRPr lang="en-US" dirty="0"/>
+          </a:p>
+          <a:p>
+            <a:endParaRPr lang="en-US" dirty="0"/>
+          </a:p>
+          <a:p>
+            <a:r>
+              <a:rPr lang="en-US" dirty="0"/>
+              <a:t>Stimulus formula (think about what to include/exclude)</a:t>
+            </a:r>
+          </a:p>
+        </p:txBody>
+      </p:sp>
+    </p:spTree>
+    <p:extLst>
+      <p:ext uri="{BB962C8B-B14F-4D97-AF65-F5344CB8AC3E}">
+        <p14:creationId xmlns:p14="http://schemas.microsoft.com/office/powerpoint/2010/main" val="1353224219"/>
+      </p:ext>
+    </p:extLst>
+  </p:cSld>
+  <p:clrMapOvr>
+    <a:masterClrMapping/>
+  </p:clrMapOvr>
+</p:sld>
+</file>
+
 <file path=ppt/slides/slide2.xml><?xml version="1.0" encoding="utf-8"?>
 <p:sld xmlns:a="http://schemas.openxmlformats.org/drawingml/2006/main" xmlns:r="http://schemas.openxmlformats.org/officeDocument/2006/relationships" xmlns:p="http://schemas.openxmlformats.org/presentationml/2006/main">
   <p:cSld>
@@ -6092,10 +7658,10 @@
               <a:buNone/>
             </a:pPr>
             <a:r>
-              <a:rPr lang="en"/>
-              <a:t>GRAPH 1</a:t>
+              <a:rPr lang="en" dirty="0"/>
+              <a:t>Unemployment Rate%</a:t>
             </a:r>
-            <a:endParaRPr/>
+            <a:endParaRPr dirty="0"/>
           </a:p>
         </p:txBody>
       </p:sp>
@@ -6134,10 +7700,10 @@
               <a:buNone/>
             </a:pPr>
             <a:r>
-              <a:rPr lang="en"/>
-              <a:t>GRAPH 2</a:t>
+              <a:rPr lang="en" dirty="0"/>
+              <a:t>GDP</a:t>
             </a:r>
-            <a:endParaRPr/>
+            <a:endParaRPr dirty="0"/>
           </a:p>
         </p:txBody>
       </p:sp>
@@ -6250,6 +7816,319 @@
 </file>
 
 <file path=ppt/slides/slide3.xml><?xml version="1.0" encoding="utf-8"?>
+<p:sld xmlns:a="http://schemas.openxmlformats.org/drawingml/2006/main" xmlns:r="http://schemas.openxmlformats.org/officeDocument/2006/relationships" xmlns:p="http://schemas.openxmlformats.org/presentationml/2006/main">
+  <p:cSld>
+    <p:bg>
+      <p:bgPr>
+        <a:solidFill>
+          <a:srgbClr val="000000"/>
+        </a:solidFill>
+        <a:effectLst/>
+      </p:bgPr>
+    </p:bg>
+    <p:spTree>
+      <p:nvGrpSpPr>
+        <p:cNvPr id="1" name="Shape 59"/>
+        <p:cNvGrpSpPr/>
+        <p:nvPr/>
+      </p:nvGrpSpPr>
+      <p:grpSpPr>
+        <a:xfrm>
+          <a:off x="0" y="0"/>
+          <a:ext cx="0" cy="0"/>
+          <a:chOff x="0" y="0"/>
+          <a:chExt cx="0" cy="0"/>
+        </a:xfrm>
+      </p:grpSpPr>
+      <p:sp>
+        <p:nvSpPr>
+          <p:cNvPr id="60" name="Google Shape;60;p14"/>
+          <p:cNvSpPr txBox="1">
+            <a:spLocks noGrp="1"/>
+          </p:cNvSpPr>
+          <p:nvPr>
+            <p:ph type="title"/>
+          </p:nvPr>
+        </p:nvSpPr>
+        <p:spPr>
+          <a:xfrm>
+            <a:off x="311700" y="445025"/>
+            <a:ext cx="8520600" cy="572700"/>
+          </a:xfrm>
+          <a:prstGeom prst="rect">
+            <a:avLst/>
+          </a:prstGeom>
+        </p:spPr>
+        <p:txBody>
+          <a:bodyPr spcFirstLastPara="1" wrap="square" lIns="91425" tIns="91425" rIns="91425" bIns="91425" anchor="t" anchorCtr="0">
+            <a:noAutofit/>
+          </a:bodyPr>
+          <a:lstStyle/>
+          <a:p>
+            <a:pPr marL="0" lvl="0" indent="0" algn="l" rtl="0">
+              <a:spcBef>
+                <a:spcPts val="0"/>
+              </a:spcBef>
+              <a:spcAft>
+                <a:spcPts val="0"/>
+              </a:spcAft>
+              <a:buNone/>
+            </a:pPr>
+            <a:r>
+              <a:rPr lang="en" dirty="0"/>
+              <a:t>POTENTIAL IMPACT TO UNEMPLOYMENT</a:t>
+            </a:r>
+            <a:endParaRPr dirty="0"/>
+          </a:p>
+        </p:txBody>
+      </p:sp>
+      <p:sp>
+        <p:nvSpPr>
+          <p:cNvPr id="63" name="Google Shape;63;p14"/>
+          <p:cNvSpPr txBox="1"/>
+          <p:nvPr/>
+        </p:nvSpPr>
+        <p:spPr>
+          <a:xfrm>
+            <a:off x="6381605" y="1017724"/>
+            <a:ext cx="2683312" cy="855559"/>
+          </a:xfrm>
+          <a:prstGeom prst="rect">
+            <a:avLst/>
+          </a:prstGeom>
+          <a:noFill/>
+          <a:ln>
+            <a:noFill/>
+          </a:ln>
+        </p:spPr>
+        <p:txBody>
+          <a:bodyPr spcFirstLastPara="1" wrap="square" lIns="91425" tIns="91425" rIns="91425" bIns="91425" anchor="t" anchorCtr="0">
+            <a:noAutofit/>
+          </a:bodyPr>
+          <a:lstStyle/>
+          <a:p>
+            <a:pPr marL="0" lvl="0" indent="0" algn="l" rtl="0">
+              <a:spcBef>
+                <a:spcPts val="0"/>
+              </a:spcBef>
+              <a:spcAft>
+                <a:spcPts val="0"/>
+              </a:spcAft>
+              <a:buNone/>
+            </a:pPr>
+            <a:r>
+              <a:rPr lang="en" dirty="0">
+                <a:solidFill>
+                  <a:srgbClr val="FFFFFF"/>
+                </a:solidFill>
+              </a:rPr>
+              <a:t>DROPDOWN 1</a:t>
+            </a:r>
+          </a:p>
+          <a:p>
+            <a:pPr marL="0" lvl="0" indent="0" algn="l" rtl="0">
+              <a:spcBef>
+                <a:spcPts val="0"/>
+              </a:spcBef>
+              <a:spcAft>
+                <a:spcPts val="0"/>
+              </a:spcAft>
+              <a:buNone/>
+            </a:pPr>
+            <a:r>
+              <a:rPr lang="en" dirty="0">
+                <a:solidFill>
+                  <a:srgbClr val="FFFFFF"/>
+                </a:solidFill>
+              </a:rPr>
+              <a:t> - PRE CRISIS PROJECTION</a:t>
+            </a:r>
+          </a:p>
+          <a:p>
+            <a:pPr marL="0" lvl="0" indent="0" algn="l" rtl="0">
+              <a:spcBef>
+                <a:spcPts val="0"/>
+              </a:spcBef>
+              <a:spcAft>
+                <a:spcPts val="0"/>
+              </a:spcAft>
+              <a:buNone/>
+            </a:pPr>
+            <a:r>
+              <a:rPr lang="en" dirty="0">
+                <a:solidFill>
+                  <a:srgbClr val="FFFFFF"/>
+                </a:solidFill>
+              </a:rPr>
+              <a:t>-  POST CRISIS PROJECTION</a:t>
+            </a:r>
+            <a:endParaRPr dirty="0">
+              <a:solidFill>
+                <a:srgbClr val="FFFFFF"/>
+              </a:solidFill>
+            </a:endParaRPr>
+          </a:p>
+        </p:txBody>
+      </p:sp>
+      <p:pic>
+        <p:nvPicPr>
+          <p:cNvPr id="8" name="Picture 7">
+            <a:extLst>
+              <a:ext uri="{FF2B5EF4-FFF2-40B4-BE49-F238E27FC236}">
+                <a16:creationId xmlns:a16="http://schemas.microsoft.com/office/drawing/2014/main" id="{329BAA26-ADE1-6C46-AEEF-644148BC75EB}"/>
+              </a:ext>
+            </a:extLst>
+          </p:cNvPr>
+          <p:cNvPicPr>
+            <a:picLocks noChangeAspect="1"/>
+          </p:cNvPicPr>
+          <p:nvPr/>
+        </p:nvPicPr>
+        <p:blipFill>
+          <a:blip r:embed="rId3"/>
+          <a:stretch>
+            <a:fillRect/>
+          </a:stretch>
+        </p:blipFill>
+        <p:spPr>
+          <a:xfrm>
+            <a:off x="49427" y="1121420"/>
+            <a:ext cx="6263745" cy="2684462"/>
+          </a:xfrm>
+          <a:prstGeom prst="rect">
+            <a:avLst/>
+          </a:prstGeom>
+        </p:spPr>
+      </p:pic>
+      <p:sp>
+        <p:nvSpPr>
+          <p:cNvPr id="14" name="Google Shape;63;p14">
+            <a:extLst>
+              <a:ext uri="{FF2B5EF4-FFF2-40B4-BE49-F238E27FC236}">
+                <a16:creationId xmlns:a16="http://schemas.microsoft.com/office/drawing/2014/main" id="{39D43FDB-9DDB-2046-8785-8E8C8242E652}"/>
+              </a:ext>
+            </a:extLst>
+          </p:cNvPr>
+          <p:cNvSpPr txBox="1"/>
+          <p:nvPr/>
+        </p:nvSpPr>
+        <p:spPr>
+          <a:xfrm>
+            <a:off x="6381605" y="1954553"/>
+            <a:ext cx="2683312" cy="855559"/>
+          </a:xfrm>
+          <a:prstGeom prst="rect">
+            <a:avLst/>
+          </a:prstGeom>
+          <a:noFill/>
+          <a:ln>
+            <a:noFill/>
+          </a:ln>
+        </p:spPr>
+        <p:txBody>
+          <a:bodyPr spcFirstLastPara="1" wrap="square" lIns="91425" tIns="91425" rIns="91425" bIns="91425" anchor="t" anchorCtr="0">
+            <a:noAutofit/>
+          </a:bodyPr>
+          <a:lstStyle/>
+          <a:p>
+            <a:pPr marL="0" lvl="0" indent="0" algn="l" rtl="0">
+              <a:spcBef>
+                <a:spcPts val="0"/>
+              </a:spcBef>
+              <a:spcAft>
+                <a:spcPts val="0"/>
+              </a:spcAft>
+              <a:buNone/>
+            </a:pPr>
+            <a:r>
+              <a:rPr lang="en" dirty="0">
+                <a:solidFill>
+                  <a:srgbClr val="FFFFFF"/>
+                </a:solidFill>
+              </a:rPr>
+              <a:t>CONFIDENCE LEVELS</a:t>
+            </a:r>
+          </a:p>
+          <a:p>
+            <a:pPr marL="0" lvl="0" indent="0" algn="l" rtl="0">
+              <a:spcBef>
+                <a:spcPts val="0"/>
+              </a:spcBef>
+              <a:spcAft>
+                <a:spcPts val="0"/>
+              </a:spcAft>
+              <a:buNone/>
+            </a:pPr>
+            <a:r>
+              <a:rPr lang="en" dirty="0">
+                <a:solidFill>
+                  <a:srgbClr val="FFFFFF"/>
+                </a:solidFill>
+              </a:rPr>
+              <a:t> - 95%</a:t>
+            </a:r>
+          </a:p>
+          <a:p>
+            <a:pPr marL="285750" lvl="0" indent="-285750" algn="l" rtl="0">
+              <a:spcBef>
+                <a:spcPts val="0"/>
+              </a:spcBef>
+              <a:spcAft>
+                <a:spcPts val="0"/>
+              </a:spcAft>
+              <a:buFontTx/>
+              <a:buChar char="-"/>
+            </a:pPr>
+            <a:r>
+              <a:rPr lang="en" dirty="0">
+                <a:solidFill>
+                  <a:srgbClr val="FFFFFF"/>
+                </a:solidFill>
+              </a:rPr>
+              <a:t>90%</a:t>
+            </a:r>
+          </a:p>
+          <a:p>
+            <a:pPr marL="285750" lvl="0" indent="-285750" algn="l" rtl="0">
+              <a:spcBef>
+                <a:spcPts val="0"/>
+              </a:spcBef>
+              <a:spcAft>
+                <a:spcPts val="0"/>
+              </a:spcAft>
+              <a:buFontTx/>
+              <a:buChar char="-"/>
+            </a:pPr>
+            <a:r>
+              <a:rPr lang="en-US" dirty="0">
+                <a:solidFill>
+                  <a:srgbClr val="FFFFFF"/>
+                </a:solidFill>
+              </a:rPr>
+              <a:t>80%</a:t>
+            </a:r>
+            <a:endParaRPr dirty="0">
+              <a:solidFill>
+                <a:srgbClr val="FFFFFF"/>
+              </a:solidFill>
+            </a:endParaRPr>
+          </a:p>
+        </p:txBody>
+      </p:sp>
+    </p:spTree>
+    <p:extLst>
+      <p:ext uri="{BB962C8B-B14F-4D97-AF65-F5344CB8AC3E}">
+        <p14:creationId xmlns:p14="http://schemas.microsoft.com/office/powerpoint/2010/main" val="3795659887"/>
+      </p:ext>
+    </p:extLst>
+  </p:cSld>
+  <p:clrMapOvr>
+    <a:masterClrMapping/>
+  </p:clrMapOvr>
+</p:sld>
+</file>
+
+<file path=ppt/slides/slide4.xml><?xml version="1.0" encoding="utf-8"?>
 <p:sld xmlns:a="http://schemas.openxmlformats.org/drawingml/2006/main" xmlns:r="http://schemas.openxmlformats.org/officeDocument/2006/relationships" xmlns:p="http://schemas.openxmlformats.org/presentationml/2006/main">
   <p:cSld>
     <p:spTree>
@@ -6333,100 +8212,89 @@
           </a:bodyPr>
           <a:lstStyle/>
           <a:p>
-            <a:pPr marL="0" lvl="0" indent="0" algn="l" rtl="0">
-              <a:spcBef>
-                <a:spcPts val="0"/>
-              </a:spcBef>
-              <a:spcAft>
-                <a:spcPts val="0"/>
-              </a:spcAft>
-              <a:buNone/>
+            <a:pPr marL="342900" lvl="0" algn="l" rtl="0">
+              <a:spcBef>
+                <a:spcPts val="0"/>
+              </a:spcBef>
+              <a:spcAft>
+                <a:spcPts val="0"/>
+              </a:spcAft>
+              <a:buFont typeface="+mj-lt"/>
+              <a:buAutoNum type="arabicPeriod"/>
             </a:pPr>
             <a:r>
-              <a:rPr lang="en"/>
+              <a:rPr lang="en" dirty="0"/>
               <a:t>Why is the Economic Stimulus needed</a:t>
             </a:r>
-            <a:endParaRPr/>
-          </a:p>
-          <a:p>
-            <a:pPr marL="0" lvl="0" indent="0" algn="l" rtl="0">
+            <a:endParaRPr dirty="0"/>
+          </a:p>
+          <a:p>
+            <a:pPr marL="342900" lvl="0" algn="l" rtl="0">
               <a:spcBef>
                 <a:spcPts val="1600"/>
               </a:spcBef>
               <a:spcAft>
                 <a:spcPts val="0"/>
               </a:spcAft>
-              <a:buNone/>
+              <a:buFont typeface="+mj-lt"/>
+              <a:buAutoNum type="arabicPeriod"/>
             </a:pPr>
             <a:r>
-              <a:rPr lang="en"/>
-              <a:t>What was the impact of Stimulus post 2008 financial crisis</a:t>
+              <a:rPr lang="en" dirty="0"/>
+              <a:t>Past Stimulus post 2008 financial crisis &amp; how we measured it</a:t>
             </a:r>
-            <a:endParaRPr/>
-          </a:p>
-          <a:p>
-            <a:pPr marL="0" lvl="0" indent="0" algn="l" rtl="0">
+            <a:endParaRPr dirty="0"/>
+          </a:p>
+          <a:p>
+            <a:pPr marL="342900" lvl="0" algn="l" rtl="0">
               <a:spcBef>
                 <a:spcPts val="1600"/>
               </a:spcBef>
               <a:spcAft>
                 <a:spcPts val="0"/>
               </a:spcAft>
-              <a:buNone/>
+              <a:buFont typeface="+mj-lt"/>
+              <a:buAutoNum type="arabicPeriod"/>
             </a:pPr>
             <a:r>
-              <a:rPr lang="en"/>
+              <a:rPr lang="en" dirty="0"/>
               <a:t>Current criterion for Economic Stimulus</a:t>
             </a:r>
-            <a:endParaRPr/>
-          </a:p>
-          <a:p>
-            <a:pPr marL="0" lvl="0" indent="0" algn="l" rtl="0">
+            <a:endParaRPr dirty="0"/>
+          </a:p>
+          <a:p>
+            <a:pPr marL="342900" lvl="0" algn="l" rtl="0">
               <a:spcBef>
                 <a:spcPts val="1600"/>
               </a:spcBef>
               <a:spcAft>
                 <a:spcPts val="0"/>
               </a:spcAft>
-              <a:buNone/>
+              <a:buFont typeface="+mj-lt"/>
+              <a:buAutoNum type="arabicPeriod"/>
             </a:pPr>
             <a:r>
-              <a:rPr lang="en"/>
+              <a:rPr lang="en" dirty="0"/>
               <a:t>What could happen if there was no Economic Stimulus </a:t>
             </a:r>
-            <a:endParaRPr/>
-          </a:p>
-          <a:p>
-            <a:pPr marL="0" lvl="0" indent="0" algn="l" rtl="0">
+            <a:endParaRPr dirty="0"/>
+          </a:p>
+          <a:p>
+            <a:pPr marL="342900" lvl="0" algn="l" rtl="0">
               <a:spcBef>
                 <a:spcPts val="1600"/>
               </a:spcBef>
               <a:spcAft>
-                <a:spcPts val="0"/>
-              </a:spcAft>
-              <a:buNone/>
+                <a:spcPts val="1600"/>
+              </a:spcAft>
+              <a:buFont typeface="+mj-lt"/>
+              <a:buAutoNum type="arabicPeriod"/>
             </a:pPr>
             <a:r>
-              <a:rPr lang="en"/>
-              <a:t>How do we measure the impact of Economic Stimulus</a:t>
-            </a:r>
-            <a:endParaRPr/>
-          </a:p>
-          <a:p>
-            <a:pPr marL="0" lvl="0" indent="0" algn="l" rtl="0">
-              <a:spcBef>
-                <a:spcPts val="1600"/>
-              </a:spcBef>
-              <a:spcAft>
-                <a:spcPts val="1600"/>
-              </a:spcAft>
-              <a:buNone/>
-            </a:pPr>
-            <a:r>
-              <a:rPr lang="en"/>
+              <a:rPr lang="en" dirty="0"/>
               <a:t>What are some unintended consequences. How to prevent/minimize the unintended consequences</a:t>
             </a:r>
-            <a:endParaRPr/>
+            <a:endParaRPr dirty="0"/>
           </a:p>
         </p:txBody>
       </p:sp>
@@ -6438,12 +8306,12 @@
 </p:sld>
 </file>
 
-<file path=ppt/slides/slide4.xml><?xml version="1.0" encoding="utf-8"?>
+<file path=ppt/slides/slide5.xml><?xml version="1.0" encoding="utf-8"?>
 <p:sld xmlns:a="http://schemas.openxmlformats.org/drawingml/2006/main" xmlns:r="http://schemas.openxmlformats.org/officeDocument/2006/relationships" xmlns:p="http://schemas.openxmlformats.org/presentationml/2006/main">
   <p:cSld>
     <p:spTree>
       <p:nvGrpSpPr>
-        <p:cNvPr id="1" name=""/>
+        <p:cNvPr id="1" name="Shape 68"/>
         <p:cNvGrpSpPr/>
         <p:nvPr/>
       </p:nvGrpSpPr>
@@ -6457,170 +8325,141 @@
       </p:grpSpPr>
       <p:sp>
         <p:nvSpPr>
-          <p:cNvPr id="2" name="Title 1">
-            <a:extLst>
-              <a:ext uri="{FF2B5EF4-FFF2-40B4-BE49-F238E27FC236}">
-                <a16:creationId xmlns:a16="http://schemas.microsoft.com/office/drawing/2014/main" id="{49AB58A3-5FD7-2342-8030-3082051BE3BB}"/>
-              </a:ext>
-            </a:extLst>
-          </p:cNvPr>
-          <p:cNvSpPr>
+          <p:cNvPr id="69" name="Google Shape;69;p15"/>
+          <p:cNvSpPr txBox="1">
             <a:spLocks noGrp="1"/>
           </p:cNvSpPr>
           <p:nvPr>
             <p:ph type="title"/>
           </p:nvPr>
         </p:nvSpPr>
-        <p:spPr/>
+        <p:spPr>
+          <a:xfrm>
+            <a:off x="311700" y="445025"/>
+            <a:ext cx="8520600" cy="572700"/>
+          </a:xfrm>
+          <a:prstGeom prst="rect">
+            <a:avLst/>
+          </a:prstGeom>
+        </p:spPr>
         <p:txBody>
-          <a:bodyPr/>
+          <a:bodyPr spcFirstLastPara="1" wrap="square" lIns="91425" tIns="91425" rIns="91425" bIns="91425" anchor="t" anchorCtr="0">
+            <a:noAutofit/>
+          </a:bodyPr>
           <a:lstStyle/>
           <a:p>
+            <a:pPr marL="0" lvl="0" indent="0" algn="l" rtl="0">
+              <a:spcBef>
+                <a:spcPts val="0"/>
+              </a:spcBef>
+              <a:spcAft>
+                <a:spcPts val="0"/>
+              </a:spcAft>
+              <a:buNone/>
+            </a:pPr>
             <a:r>
-              <a:rPr lang="en-US" dirty="0"/>
-              <a:t>Current Stimulus</a:t>
+              <a:rPr lang="en"/>
+              <a:t>ECONOMIC STIMULUS </a:t>
             </a:r>
+            <a:endParaRPr/>
           </a:p>
         </p:txBody>
       </p:sp>
       <p:sp>
         <p:nvSpPr>
-          <p:cNvPr id="3" name="Text Placeholder 2">
-            <a:extLst>
-              <a:ext uri="{FF2B5EF4-FFF2-40B4-BE49-F238E27FC236}">
-                <a16:creationId xmlns:a16="http://schemas.microsoft.com/office/drawing/2014/main" id="{7C5CFD20-1629-3B47-B84F-087736EADDB1}"/>
-              </a:ext>
-            </a:extLst>
-          </p:cNvPr>
-          <p:cNvSpPr>
+          <p:cNvPr id="70" name="Google Shape;70;p15"/>
+          <p:cNvSpPr txBox="1">
             <a:spLocks noGrp="1"/>
           </p:cNvSpPr>
           <p:nvPr>
             <p:ph type="body" idx="1"/>
           </p:nvPr>
         </p:nvSpPr>
-        <p:spPr/>
+        <p:spPr>
+          <a:xfrm>
+            <a:off x="311700" y="1152475"/>
+            <a:ext cx="8520600" cy="3416400"/>
+          </a:xfrm>
+          <a:prstGeom prst="rect">
+            <a:avLst/>
+          </a:prstGeom>
+        </p:spPr>
         <p:txBody>
-          <a:bodyPr/>
+          <a:bodyPr spcFirstLastPara="1" wrap="square" lIns="91425" tIns="91425" rIns="91425" bIns="91425" anchor="t" anchorCtr="0">
+            <a:noAutofit/>
+          </a:bodyPr>
           <a:lstStyle/>
           <a:p>
+            <a:pPr marL="342900" lvl="0" algn="l" rtl="0">
+              <a:spcBef>
+                <a:spcPts val="0"/>
+              </a:spcBef>
+              <a:spcAft>
+                <a:spcPts val="0"/>
+              </a:spcAft>
+              <a:buFont typeface="+mj-lt"/>
+              <a:buAutoNum type="arabicPeriod"/>
+            </a:pPr>
             <a:r>
-              <a:rPr lang="en-US" dirty="0"/>
-              <a:t>2008 stimulus impacts –</a:t>
+              <a:rPr lang="en" dirty="0"/>
+              <a:t>Why is the 2020 Economic Stimulus needed</a:t>
             </a:r>
           </a:p>
           <a:p>
-            <a:pPr>
-              <a:buFont typeface="Wingdings" pitchFamily="2" charset="2"/>
-              <a:buChar char="Ø"/>
+            <a:pPr marL="800100" lvl="1">
+              <a:spcBef>
+                <a:spcPts val="0"/>
+              </a:spcBef>
+              <a:buFont typeface="+mj-lt"/>
+              <a:buAutoNum type="arabicPeriod"/>
             </a:pPr>
             <a:r>
               <a:rPr lang="en-US" dirty="0"/>
-              <a:t> look at unemployment (FRED)</a:t>
+              <a:t>Stabilization of the Economy</a:t>
             </a:r>
           </a:p>
           <a:p>
-            <a:pPr>
-              <a:buFont typeface="Wingdings" pitchFamily="2" charset="2"/>
-              <a:buChar char="Ø"/>
+            <a:pPr marL="800100" lvl="1">
+              <a:spcBef>
+                <a:spcPts val="0"/>
+              </a:spcBef>
+              <a:buFont typeface="+mj-lt"/>
+              <a:buAutoNum type="arabicPeriod"/>
             </a:pPr>
             <a:r>
               <a:rPr lang="en-US" dirty="0"/>
-              <a:t> GDP (FRED)</a:t>
+              <a:t>Protect Public Health that was impacted due to the coronavirus (COVID-19)</a:t>
             </a:r>
           </a:p>
           <a:p>
-            <a:pPr>
-              <a:buFont typeface="Wingdings" pitchFamily="2" charset="2"/>
-              <a:buChar char="Ø"/>
+            <a:pPr marL="800100" lvl="1">
+              <a:spcBef>
+                <a:spcPts val="0"/>
+              </a:spcBef>
+              <a:buFont typeface="+mj-lt"/>
+              <a:buAutoNum type="arabicPeriod"/>
             </a:pPr>
             <a:r>
               <a:rPr lang="en-US" dirty="0"/>
-              <a:t> Foreclosures (</a:t>
+              <a:t>Insurance for U.S households and businesses</a:t>
             </a:r>
           </a:p>
           <a:p>
-            <a:pPr>
-              <a:buFont typeface="Wingdings" pitchFamily="2" charset="2"/>
-              <a:buChar char="Ø"/>
+            <a:pPr marL="800100" lvl="1">
+              <a:spcBef>
+                <a:spcPts val="0"/>
+              </a:spcBef>
+              <a:buFont typeface="+mj-lt"/>
+              <a:buAutoNum type="arabicPeriod"/>
             </a:pPr>
-            <a:r>
-              <a:rPr lang="en-US" dirty="0"/>
-              <a:t>CPI (consumer price index)</a:t>
-            </a:r>
-          </a:p>
-          <a:p>
-            <a:pPr>
-              <a:buFont typeface="Wingdings" pitchFamily="2" charset="2"/>
-              <a:buChar char="Ø"/>
-            </a:pPr>
-            <a:r>
-              <a:rPr lang="en-US" dirty="0"/>
-              <a:t>Inflation</a:t>
-            </a:r>
-          </a:p>
-          <a:p>
-            <a:r>
-              <a:rPr lang="en-US" dirty="0"/>
-              <a:t>2020 stimulus</a:t>
-            </a:r>
-          </a:p>
-          <a:p>
-            <a:pPr>
-              <a:buFont typeface="Wingdings" pitchFamily="2" charset="2"/>
-              <a:buChar char="Ø"/>
-            </a:pPr>
-            <a:r>
-              <a:rPr lang="en-US" dirty="0"/>
-              <a:t> unemployment</a:t>
-            </a:r>
-          </a:p>
-          <a:p>
-            <a:pPr>
-              <a:buFont typeface="Wingdings" pitchFamily="2" charset="2"/>
-              <a:buChar char="Ø"/>
-            </a:pPr>
-            <a:r>
-              <a:rPr lang="en-US" dirty="0"/>
-              <a:t> debt </a:t>
-            </a:r>
-          </a:p>
-          <a:p>
-            <a:pPr>
-              <a:buFont typeface="Wingdings" pitchFamily="2" charset="2"/>
-              <a:buChar char="Ø"/>
-            </a:pPr>
-            <a:r>
-              <a:rPr lang="en-US" dirty="0"/>
-              <a:t> GDP</a:t>
-            </a:r>
-          </a:p>
-          <a:p>
-            <a:pPr>
-              <a:buFont typeface="Wingdings" pitchFamily="2" charset="2"/>
-              <a:buChar char="Ø"/>
-            </a:pPr>
-            <a:r>
-              <a:rPr lang="en-US" dirty="0"/>
-              <a:t> Eviction stats</a:t>
-            </a:r>
-          </a:p>
-          <a:p>
-            <a:pPr>
-              <a:buFont typeface="Wingdings" pitchFamily="2" charset="2"/>
-              <a:buChar char="Ø"/>
-            </a:pPr>
-            <a:r>
-              <a:rPr lang="en-US" dirty="0"/>
-              <a:t>CPI; </a:t>
-            </a:r>
+            <a:endParaRPr dirty="0"/>
           </a:p>
         </p:txBody>
       </p:sp>
     </p:spTree>
     <p:extLst>
       <p:ext uri="{BB962C8B-B14F-4D97-AF65-F5344CB8AC3E}">
-        <p14:creationId xmlns:p14="http://schemas.microsoft.com/office/powerpoint/2010/main" val="2998978406"/>
+        <p14:creationId xmlns:p14="http://schemas.microsoft.com/office/powerpoint/2010/main" val="862581252"/>
       </p:ext>
     </p:extLst>
   </p:cSld>
@@ -6630,12 +8469,12 @@
 </p:sld>
 </file>
 
-<file path=ppt/slides/slide5.xml><?xml version="1.0" encoding="utf-8"?>
+<file path=ppt/slides/slide6.xml><?xml version="1.0" encoding="utf-8"?>
 <p:sld xmlns:a="http://schemas.openxmlformats.org/drawingml/2006/main" xmlns:r="http://schemas.openxmlformats.org/officeDocument/2006/relationships" xmlns:p="http://schemas.openxmlformats.org/presentationml/2006/main">
   <p:cSld>
     <p:spTree>
       <p:nvGrpSpPr>
-        <p:cNvPr id="1" name=""/>
+        <p:cNvPr id="1" name="Shape 68"/>
         <p:cNvGrpSpPr/>
         <p:nvPr/>
       </p:nvGrpSpPr>
@@ -6649,100 +8488,989 @@
       </p:grpSpPr>
       <p:sp>
         <p:nvSpPr>
-          <p:cNvPr id="2" name="Title 1">
-            <a:extLst>
-              <a:ext uri="{FF2B5EF4-FFF2-40B4-BE49-F238E27FC236}">
-                <a16:creationId xmlns:a16="http://schemas.microsoft.com/office/drawing/2014/main" id="{B72028E7-96FC-3E48-B782-200A7C7DC1C1}"/>
-              </a:ext>
-            </a:extLst>
-          </p:cNvPr>
-          <p:cNvSpPr>
+          <p:cNvPr id="69" name="Google Shape;69;p15"/>
+          <p:cNvSpPr txBox="1">
             <a:spLocks noGrp="1"/>
           </p:cNvSpPr>
           <p:nvPr>
             <p:ph type="title"/>
           </p:nvPr>
         </p:nvSpPr>
-        <p:spPr/>
+        <p:spPr>
+          <a:xfrm>
+            <a:off x="311700" y="445025"/>
+            <a:ext cx="8520600" cy="572700"/>
+          </a:xfrm>
+          <a:prstGeom prst="rect">
+            <a:avLst/>
+          </a:prstGeom>
+        </p:spPr>
         <p:txBody>
-          <a:bodyPr/>
+          <a:bodyPr spcFirstLastPara="1" wrap="square" lIns="91425" tIns="91425" rIns="91425" bIns="91425" anchor="t" anchorCtr="0">
+            <a:noAutofit/>
+          </a:bodyPr>
           <a:lstStyle/>
           <a:p>
+            <a:pPr marL="0" lvl="0" indent="0" algn="l" rtl="0">
+              <a:spcBef>
+                <a:spcPts val="0"/>
+              </a:spcBef>
+              <a:spcAft>
+                <a:spcPts val="0"/>
+              </a:spcAft>
+              <a:buNone/>
+            </a:pPr>
             <a:r>
-              <a:rPr lang="en-US" dirty="0"/>
-              <a:t>Next Steps</a:t>
+              <a:rPr lang="en"/>
+              <a:t>ECONOMIC STIMULUS </a:t>
             </a:r>
+            <a:endParaRPr/>
           </a:p>
         </p:txBody>
       </p:sp>
       <p:sp>
         <p:nvSpPr>
-          <p:cNvPr id="3" name="Text Placeholder 2">
-            <a:extLst>
-              <a:ext uri="{FF2B5EF4-FFF2-40B4-BE49-F238E27FC236}">
-                <a16:creationId xmlns:a16="http://schemas.microsoft.com/office/drawing/2014/main" id="{EFF89044-CCB5-EF41-B076-B5C3B4B3C1D7}"/>
-              </a:ext>
-            </a:extLst>
-          </p:cNvPr>
-          <p:cNvSpPr>
+          <p:cNvPr id="70" name="Google Shape;70;p15"/>
+          <p:cNvSpPr txBox="1">
             <a:spLocks noGrp="1"/>
           </p:cNvSpPr>
           <p:nvPr>
             <p:ph type="body" idx="1"/>
           </p:nvPr>
         </p:nvSpPr>
-        <p:spPr/>
+        <p:spPr>
+          <a:xfrm>
+            <a:off x="311700" y="1152475"/>
+            <a:ext cx="8520600" cy="3416400"/>
+          </a:xfrm>
+          <a:prstGeom prst="rect">
+            <a:avLst/>
+          </a:prstGeom>
+        </p:spPr>
         <p:txBody>
-          <a:bodyPr/>
+          <a:bodyPr spcFirstLastPara="1" wrap="square" lIns="91425" tIns="91425" rIns="91425" bIns="91425" anchor="t" anchorCtr="0">
+            <a:noAutofit/>
+          </a:bodyPr>
           <a:lstStyle/>
           <a:p>
+            <a:pPr marL="342900" lvl="0">
+              <a:spcBef>
+                <a:spcPts val="1600"/>
+              </a:spcBef>
+              <a:buFont typeface="+mj-lt"/>
+              <a:buAutoNum type="arabicPeriod"/>
+            </a:pPr>
             <a:r>
               <a:rPr lang="en-US" dirty="0"/>
-              <a:t>Projections (assuming no Stimulus – based on historical/recent trend)</a:t>
+              <a:t>Past Stimulus post 2008 financial crisis &amp; how we measured it</a:t>
             </a:r>
           </a:p>
           <a:p>
+            <a:pPr marL="800100" lvl="1">
+              <a:spcBef>
+                <a:spcPts val="0"/>
+              </a:spcBef>
+              <a:buFont typeface="+mj-lt"/>
+              <a:buAutoNum type="arabicPeriod"/>
+            </a:pPr>
             <a:r>
               <a:rPr lang="en-US" dirty="0"/>
-              <a:t>Get visualizations to work on the web </a:t>
+              <a:t>Unemployment was brought under control</a:t>
             </a:r>
           </a:p>
           <a:p>
+            <a:pPr marL="800100" lvl="1">
+              <a:spcBef>
+                <a:spcPts val="0"/>
+              </a:spcBef>
+              <a:buFont typeface="+mj-lt"/>
+              <a:buAutoNum type="arabicPeriod"/>
+            </a:pPr>
             <a:r>
               <a:rPr lang="en-US" dirty="0"/>
-              <a:t>Census data for expense</a:t>
+              <a:t>Reduced the foreclosure rates</a:t>
             </a:r>
           </a:p>
           <a:p>
-            <a:pPr marL="114300" indent="0">
-              <a:buNone/>
+            <a:pPr marL="800100" lvl="1">
+              <a:spcBef>
+                <a:spcPts val="0"/>
+              </a:spcBef>
+              <a:buFont typeface="+mj-lt"/>
+              <a:buAutoNum type="arabicPeriod"/>
             </a:pPr>
-            <a:endParaRPr lang="en-US" dirty="0"/>
-          </a:p>
-          <a:p>
-            <a:endParaRPr lang="en-US" dirty="0"/>
-          </a:p>
-          <a:p>
-            <a:endParaRPr lang="en-US" dirty="0"/>
-          </a:p>
-          <a:p>
-            <a:endParaRPr lang="en-US" dirty="0"/>
-          </a:p>
-          <a:p>
-            <a:endParaRPr lang="en-US" dirty="0"/>
-          </a:p>
-          <a:p>
             <a:r>
               <a:rPr lang="en-US" dirty="0"/>
-              <a:t>Stimulus formula (think about what to include/exclude)</a:t>
+              <a:t>Provided liquidity to markets (ensure banks could continue to lend)</a:t>
             </a:r>
+          </a:p>
+          <a:p>
+            <a:pPr marL="800100" lvl="1">
+              <a:spcBef>
+                <a:spcPts val="0"/>
+              </a:spcBef>
+              <a:buFont typeface="+mj-lt"/>
+              <a:buAutoNum type="arabicPeriod"/>
+            </a:pPr>
+            <a:r>
+              <a:rPr lang="en-US" dirty="0"/>
+              <a:t>Bailed out several major institutions (banks, auto industry….)</a:t>
+            </a:r>
+          </a:p>
+          <a:p>
+            <a:pPr marL="800100" lvl="1">
+              <a:spcBef>
+                <a:spcPts val="0"/>
+              </a:spcBef>
+              <a:buFont typeface="+mj-lt"/>
+              <a:buAutoNum type="arabicPeriod"/>
+            </a:pPr>
+            <a:r>
+              <a:rPr lang="en-US" dirty="0"/>
+              <a:t>Ensured GDP maintained and did not shrink</a:t>
+            </a:r>
+          </a:p>
+          <a:p>
+            <a:pPr marL="800100" lvl="1">
+              <a:spcBef>
+                <a:spcPts val="0"/>
+              </a:spcBef>
+              <a:buFont typeface="+mj-lt"/>
+              <a:buAutoNum type="arabicPeriod"/>
+            </a:pPr>
+            <a:r>
+              <a:rPr lang="en-US" dirty="0"/>
+              <a:t>Measures/metrics</a:t>
+            </a:r>
+          </a:p>
+          <a:p>
+            <a:pPr marL="1257300" lvl="2">
+              <a:spcBef>
+                <a:spcPts val="0"/>
+              </a:spcBef>
+              <a:buFont typeface="+mj-lt"/>
+              <a:buAutoNum type="arabicPeriod"/>
+            </a:pPr>
+            <a:r>
+              <a:rPr lang="en-US" dirty="0"/>
+              <a:t>Foreclosure rates% (reduction)</a:t>
+            </a:r>
+          </a:p>
+          <a:p>
+            <a:pPr marL="1257300" lvl="2">
+              <a:spcBef>
+                <a:spcPts val="0"/>
+              </a:spcBef>
+              <a:buFont typeface="+mj-lt"/>
+              <a:buAutoNum type="arabicPeriod"/>
+            </a:pPr>
+            <a:r>
+              <a:rPr lang="en-US" dirty="0"/>
+              <a:t>Jobs created (increases)</a:t>
+            </a:r>
+          </a:p>
+          <a:p>
+            <a:pPr marL="1257300" lvl="2">
+              <a:spcBef>
+                <a:spcPts val="0"/>
+              </a:spcBef>
+              <a:buFont typeface="+mj-lt"/>
+              <a:buAutoNum type="arabicPeriod"/>
+            </a:pPr>
+            <a:r>
+              <a:rPr lang="en-US" dirty="0"/>
+              <a:t>Unemployment rate (reduction)</a:t>
+            </a:r>
+          </a:p>
+          <a:p>
+            <a:pPr marL="1257300" lvl="2">
+              <a:spcBef>
+                <a:spcPts val="0"/>
+              </a:spcBef>
+              <a:buFont typeface="+mj-lt"/>
+              <a:buAutoNum type="arabicPeriod"/>
+            </a:pPr>
+            <a:r>
+              <a:rPr lang="en-US" dirty="0"/>
+              <a:t>Stock market stabilization (enabled by QEs)</a:t>
+            </a:r>
+            <a:endParaRPr dirty="0"/>
           </a:p>
         </p:txBody>
       </p:sp>
     </p:spTree>
     <p:extLst>
       <p:ext uri="{BB962C8B-B14F-4D97-AF65-F5344CB8AC3E}">
-        <p14:creationId xmlns:p14="http://schemas.microsoft.com/office/powerpoint/2010/main" val="1353224219"/>
+        <p14:creationId xmlns:p14="http://schemas.microsoft.com/office/powerpoint/2010/main" val="626084233"/>
+      </p:ext>
+    </p:extLst>
+  </p:cSld>
+  <p:clrMapOvr>
+    <a:masterClrMapping/>
+  </p:clrMapOvr>
+</p:sld>
+</file>
+
+<file path=ppt/slides/slide7.xml><?xml version="1.0" encoding="utf-8"?>
+<p:sld xmlns:a="http://schemas.openxmlformats.org/drawingml/2006/main" xmlns:r="http://schemas.openxmlformats.org/officeDocument/2006/relationships" xmlns:p="http://schemas.openxmlformats.org/presentationml/2006/main">
+  <p:cSld>
+    <p:spTree>
+      <p:nvGrpSpPr>
+        <p:cNvPr id="1" name="Shape 68"/>
+        <p:cNvGrpSpPr/>
+        <p:nvPr/>
+      </p:nvGrpSpPr>
+      <p:grpSpPr>
+        <a:xfrm>
+          <a:off x="0" y="0"/>
+          <a:ext cx="0" cy="0"/>
+          <a:chOff x="0" y="0"/>
+          <a:chExt cx="0" cy="0"/>
+        </a:xfrm>
+      </p:grpSpPr>
+      <p:sp>
+        <p:nvSpPr>
+          <p:cNvPr id="69" name="Google Shape;69;p15"/>
+          <p:cNvSpPr txBox="1">
+            <a:spLocks noGrp="1"/>
+          </p:cNvSpPr>
+          <p:nvPr>
+            <p:ph type="title"/>
+          </p:nvPr>
+        </p:nvSpPr>
+        <p:spPr>
+          <a:xfrm>
+            <a:off x="311700" y="445025"/>
+            <a:ext cx="8520600" cy="572700"/>
+          </a:xfrm>
+          <a:prstGeom prst="rect">
+            <a:avLst/>
+          </a:prstGeom>
+        </p:spPr>
+        <p:txBody>
+          <a:bodyPr spcFirstLastPara="1" wrap="square" lIns="91425" tIns="91425" rIns="91425" bIns="91425" anchor="t" anchorCtr="0">
+            <a:noAutofit/>
+          </a:bodyPr>
+          <a:lstStyle/>
+          <a:p>
+            <a:pPr marL="0" lvl="0" indent="0" algn="l" rtl="0">
+              <a:spcBef>
+                <a:spcPts val="0"/>
+              </a:spcBef>
+              <a:spcAft>
+                <a:spcPts val="0"/>
+              </a:spcAft>
+              <a:buNone/>
+            </a:pPr>
+            <a:r>
+              <a:rPr lang="en"/>
+              <a:t>ECONOMIC STIMULUS </a:t>
+            </a:r>
+            <a:endParaRPr/>
+          </a:p>
+        </p:txBody>
+      </p:sp>
+      <p:sp>
+        <p:nvSpPr>
+          <p:cNvPr id="70" name="Google Shape;70;p15"/>
+          <p:cNvSpPr txBox="1">
+            <a:spLocks noGrp="1"/>
+          </p:cNvSpPr>
+          <p:nvPr>
+            <p:ph type="body" idx="1"/>
+          </p:nvPr>
+        </p:nvSpPr>
+        <p:spPr>
+          <a:xfrm>
+            <a:off x="311700" y="1152475"/>
+            <a:ext cx="8520600" cy="3416400"/>
+          </a:xfrm>
+          <a:prstGeom prst="rect">
+            <a:avLst/>
+          </a:prstGeom>
+        </p:spPr>
+        <p:txBody>
+          <a:bodyPr spcFirstLastPara="1" wrap="square" lIns="91425" tIns="91425" rIns="91425" bIns="91425" anchor="t" anchorCtr="0">
+            <a:noAutofit/>
+          </a:bodyPr>
+          <a:lstStyle/>
+          <a:p>
+            <a:pPr marL="342900" lvl="0">
+              <a:spcBef>
+                <a:spcPts val="1600"/>
+              </a:spcBef>
+              <a:buFont typeface="+mj-lt"/>
+              <a:buAutoNum type="arabicPeriod"/>
+            </a:pPr>
+            <a:r>
+              <a:rPr lang="en-US" dirty="0"/>
+              <a:t>Criterion for Economic Stimulus</a:t>
+            </a:r>
+          </a:p>
+          <a:p>
+            <a:pPr marL="800100" lvl="1">
+              <a:buFont typeface="+mj-lt"/>
+              <a:buAutoNum type="arabicPeriod"/>
+            </a:pPr>
+            <a:r>
+              <a:rPr lang="en-US" i="1" dirty="0"/>
+              <a:t>A stimulus package should generate growth and jobs to offset rising unemployment</a:t>
+            </a:r>
+          </a:p>
+          <a:p>
+            <a:pPr marL="800100" lvl="1">
+              <a:buFont typeface="+mj-lt"/>
+              <a:buAutoNum type="arabicPeriod"/>
+            </a:pPr>
+            <a:r>
+              <a:rPr lang="en-US" i="1" dirty="0"/>
+              <a:t>A stimulus package should take effect quickly</a:t>
+            </a:r>
+          </a:p>
+          <a:p>
+            <a:pPr marL="800100" lvl="1">
+              <a:buFont typeface="+mj-lt"/>
+              <a:buAutoNum type="arabicPeriod"/>
+            </a:pPr>
+            <a:r>
+              <a:rPr lang="en-US" i="1" dirty="0"/>
+              <a:t>A stimulus package should raise current deficits but not affect the long-term budget outlook</a:t>
+            </a:r>
+          </a:p>
+          <a:p>
+            <a:pPr marL="800100" lvl="1">
+              <a:buFont typeface="+mj-lt"/>
+              <a:buAutoNum type="arabicPeriod"/>
+            </a:pPr>
+            <a:r>
+              <a:rPr lang="en-US" i="1" dirty="0"/>
+              <a:t>A stimulus package should target unmet needs.</a:t>
+            </a:r>
+            <a:r>
+              <a:rPr lang="en-US" dirty="0"/>
+              <a:t> </a:t>
+            </a:r>
+          </a:p>
+          <a:p>
+            <a:pPr marL="800100" lvl="1">
+              <a:buFont typeface="+mj-lt"/>
+              <a:buAutoNum type="arabicPeriod"/>
+            </a:pPr>
+            <a:r>
+              <a:rPr lang="en-US" i="1" dirty="0"/>
+              <a:t>A stimulus package should be fair.</a:t>
+            </a:r>
+            <a:endParaRPr lang="en-US" dirty="0"/>
+          </a:p>
+          <a:p>
+            <a:pPr marL="800100" lvl="1">
+              <a:buFont typeface="+mj-lt"/>
+              <a:buAutoNum type="arabicPeriod"/>
+            </a:pPr>
+            <a:endParaRPr lang="en-US" dirty="0"/>
+          </a:p>
+        </p:txBody>
+      </p:sp>
+    </p:spTree>
+    <p:extLst>
+      <p:ext uri="{BB962C8B-B14F-4D97-AF65-F5344CB8AC3E}">
+        <p14:creationId xmlns:p14="http://schemas.microsoft.com/office/powerpoint/2010/main" val="3027230051"/>
+      </p:ext>
+    </p:extLst>
+  </p:cSld>
+  <p:clrMapOvr>
+    <a:masterClrMapping/>
+  </p:clrMapOvr>
+</p:sld>
+</file>
+
+<file path=ppt/slides/slide8.xml><?xml version="1.0" encoding="utf-8"?>
+<p:sld xmlns:a="http://schemas.openxmlformats.org/drawingml/2006/main" xmlns:r="http://schemas.openxmlformats.org/officeDocument/2006/relationships" xmlns:p="http://schemas.openxmlformats.org/presentationml/2006/main">
+  <p:cSld>
+    <p:spTree>
+      <p:nvGrpSpPr>
+        <p:cNvPr id="1" name="Shape 68"/>
+        <p:cNvGrpSpPr/>
+        <p:nvPr/>
+      </p:nvGrpSpPr>
+      <p:grpSpPr>
+        <a:xfrm>
+          <a:off x="0" y="0"/>
+          <a:ext cx="0" cy="0"/>
+          <a:chOff x="0" y="0"/>
+          <a:chExt cx="0" cy="0"/>
+        </a:xfrm>
+      </p:grpSpPr>
+      <p:sp>
+        <p:nvSpPr>
+          <p:cNvPr id="69" name="Google Shape;69;p15"/>
+          <p:cNvSpPr txBox="1">
+            <a:spLocks noGrp="1"/>
+          </p:cNvSpPr>
+          <p:nvPr>
+            <p:ph type="title"/>
+          </p:nvPr>
+        </p:nvSpPr>
+        <p:spPr>
+          <a:xfrm>
+            <a:off x="311700" y="445025"/>
+            <a:ext cx="8520600" cy="572700"/>
+          </a:xfrm>
+          <a:prstGeom prst="rect">
+            <a:avLst/>
+          </a:prstGeom>
+        </p:spPr>
+        <p:txBody>
+          <a:bodyPr spcFirstLastPara="1" wrap="square" lIns="91425" tIns="91425" rIns="91425" bIns="91425" anchor="t" anchorCtr="0">
+            <a:noAutofit/>
+          </a:bodyPr>
+          <a:lstStyle/>
+          <a:p>
+            <a:pPr marL="0" lvl="0" indent="0" algn="l" rtl="0">
+              <a:spcBef>
+                <a:spcPts val="0"/>
+              </a:spcBef>
+              <a:spcAft>
+                <a:spcPts val="0"/>
+              </a:spcAft>
+              <a:buNone/>
+            </a:pPr>
+            <a:r>
+              <a:rPr lang="en"/>
+              <a:t>ECONOMIC STIMULUS </a:t>
+            </a:r>
+            <a:endParaRPr/>
+          </a:p>
+        </p:txBody>
+      </p:sp>
+      <p:sp>
+        <p:nvSpPr>
+          <p:cNvPr id="70" name="Google Shape;70;p15"/>
+          <p:cNvSpPr txBox="1">
+            <a:spLocks noGrp="1"/>
+          </p:cNvSpPr>
+          <p:nvPr>
+            <p:ph type="body" idx="1"/>
+          </p:nvPr>
+        </p:nvSpPr>
+        <p:spPr>
+          <a:xfrm>
+            <a:off x="311700" y="1152475"/>
+            <a:ext cx="8520600" cy="3416400"/>
+          </a:xfrm>
+          <a:prstGeom prst="rect">
+            <a:avLst/>
+          </a:prstGeom>
+        </p:spPr>
+        <p:txBody>
+          <a:bodyPr spcFirstLastPara="1" wrap="square" lIns="91425" tIns="91425" rIns="91425" bIns="91425" anchor="t" anchorCtr="0">
+            <a:noAutofit/>
+          </a:bodyPr>
+          <a:lstStyle/>
+          <a:p>
+            <a:pPr marL="342900" lvl="0">
+              <a:spcBef>
+                <a:spcPts val="1600"/>
+              </a:spcBef>
+              <a:buFont typeface="+mj-lt"/>
+              <a:buAutoNum type="arabicPeriod"/>
+            </a:pPr>
+            <a:r>
+              <a:rPr lang="en-US" dirty="0"/>
+              <a:t>Current criterion for Economic Stimulus (current total target - $2T)</a:t>
+            </a:r>
+          </a:p>
+          <a:p>
+            <a:pPr marL="800100" lvl="1">
+              <a:buFont typeface="+mj-lt"/>
+              <a:buAutoNum type="arabicPeriod"/>
+            </a:pPr>
+            <a:r>
+              <a:rPr lang="en-US" dirty="0"/>
+              <a:t>U.S. Households (Consumers) – how much of the $2T</a:t>
+            </a:r>
+          </a:p>
+          <a:p>
+            <a:pPr marL="1257300" lvl="2">
+              <a:buFont typeface="+mj-lt"/>
+              <a:buAutoNum type="arabicPeriod"/>
+            </a:pPr>
+            <a:r>
+              <a:rPr lang="en-US" dirty="0"/>
+              <a:t>AGI (Adjusted gross income)</a:t>
+            </a:r>
+          </a:p>
+          <a:p>
+            <a:pPr marL="939800" lvl="2" indent="0">
+              <a:buNone/>
+            </a:pPr>
+            <a:endParaRPr lang="en-US" dirty="0"/>
+          </a:p>
+          <a:p>
+            <a:pPr marL="939800" lvl="2" indent="0">
+              <a:buNone/>
+            </a:pPr>
+            <a:endParaRPr lang="en-US" dirty="0"/>
+          </a:p>
+          <a:p>
+            <a:pPr marL="939800" lvl="2" indent="0">
+              <a:buNone/>
+            </a:pPr>
+            <a:endParaRPr lang="en-US" dirty="0"/>
+          </a:p>
+          <a:p>
+            <a:pPr marL="800100" lvl="1">
+              <a:buFont typeface="+mj-lt"/>
+              <a:buAutoNum type="arabicPeriod"/>
+            </a:pPr>
+            <a:r>
+              <a:rPr lang="en-US" dirty="0"/>
+              <a:t>Small Businesses – how much of the $2T</a:t>
+            </a:r>
+          </a:p>
+          <a:p>
+            <a:pPr marL="1257300" lvl="2">
+              <a:buFont typeface="+mj-lt"/>
+              <a:buAutoNum type="arabicPeriod"/>
+            </a:pPr>
+            <a:r>
+              <a:rPr lang="en-US" dirty="0"/>
+              <a:t>List criterion</a:t>
+            </a:r>
+          </a:p>
+        </p:txBody>
+      </p:sp>
+      <p:graphicFrame>
+        <p:nvGraphicFramePr>
+          <p:cNvPr id="2" name="Table 1">
+            <a:extLst>
+              <a:ext uri="{FF2B5EF4-FFF2-40B4-BE49-F238E27FC236}">
+                <a16:creationId xmlns:a16="http://schemas.microsoft.com/office/drawing/2014/main" id="{FEA6EE07-D832-DC4F-9E79-8047FA677C9E}"/>
+              </a:ext>
+            </a:extLst>
+          </p:cNvPr>
+          <p:cNvGraphicFramePr>
+            <a:graphicFrameLocks noGrp="1"/>
+          </p:cNvGraphicFramePr>
+          <p:nvPr>
+            <p:extLst>
+              <p:ext uri="{D42A27DB-BD31-4B8C-83A1-F6EECF244321}">
+                <p14:modId xmlns:p14="http://schemas.microsoft.com/office/powerpoint/2010/main" val="3844859304"/>
+              </p:ext>
+            </p:extLst>
+          </p:nvPr>
+        </p:nvGraphicFramePr>
+        <p:xfrm>
+          <a:off x="4095295" y="2382352"/>
+          <a:ext cx="2969526" cy="1803400"/>
+        </p:xfrm>
+        <a:graphic>
+          <a:graphicData uri="http://schemas.openxmlformats.org/drawingml/2006/table">
+            <a:tbl>
+              <a:tblPr firstRow="1" bandRow="1">
+                <a:tableStyleId>{5C22544A-7EE6-4342-B048-85BDC9FD1C3A}</a:tableStyleId>
+              </a:tblPr>
+              <a:tblGrid>
+                <a:gridCol w="1542123">
+                  <a:extLst>
+                    <a:ext uri="{9D8B030D-6E8A-4147-A177-3AD203B41FA5}">
+                      <a16:colId xmlns:a16="http://schemas.microsoft.com/office/drawing/2014/main" val="864049195"/>
+                    </a:ext>
+                  </a:extLst>
+                </a:gridCol>
+                <a:gridCol w="1427403">
+                  <a:extLst>
+                    <a:ext uri="{9D8B030D-6E8A-4147-A177-3AD203B41FA5}">
+                      <a16:colId xmlns:a16="http://schemas.microsoft.com/office/drawing/2014/main" val="567279673"/>
+                    </a:ext>
+                  </a:extLst>
+                </a:gridCol>
+              </a:tblGrid>
+              <a:tr h="0">
+                <a:tc>
+                  <a:txBody>
+                    <a:bodyPr/>
+                    <a:lstStyle/>
+                    <a:p>
+                      <a:r>
+                        <a:rPr lang="en-US" sz="1000" dirty="0"/>
+                        <a:t>Individuals</a:t>
+                      </a:r>
+                    </a:p>
+                  </a:txBody>
+                  <a:tcPr/>
+                </a:tc>
+                <a:tc>
+                  <a:txBody>
+                    <a:bodyPr/>
+                    <a:lstStyle/>
+                    <a:p>
+                      <a:r>
+                        <a:rPr lang="en-US" sz="1000" dirty="0"/>
+                        <a:t>Married Couples</a:t>
+                      </a:r>
+                    </a:p>
+                  </a:txBody>
+                  <a:tcPr/>
+                </a:tc>
+                <a:extLst>
+                  <a:ext uri="{0D108BD9-81ED-4DB2-BD59-A6C34878D82A}">
+                    <a16:rowId xmlns:a16="http://schemas.microsoft.com/office/drawing/2014/main" val="1939451436"/>
+                  </a:ext>
+                </a:extLst>
+              </a:tr>
+              <a:tr h="370840">
+                <a:tc>
+                  <a:txBody>
+                    <a:bodyPr/>
+                    <a:lstStyle/>
+                    <a:p>
+                      <a:r>
+                        <a:rPr lang="en-US" sz="1000" dirty="0">
+                          <a:solidFill>
+                            <a:schemeClr val="bg1"/>
+                          </a:solidFill>
+                        </a:rPr>
+                        <a:t>&lt;= $ 75k: $1,200</a:t>
+                      </a:r>
+                    </a:p>
+                  </a:txBody>
+                  <a:tcPr/>
+                </a:tc>
+                <a:tc>
+                  <a:txBody>
+                    <a:bodyPr/>
+                    <a:lstStyle/>
+                    <a:p>
+                      <a:r>
+                        <a:rPr lang="en-US" sz="1000" dirty="0">
+                          <a:solidFill>
+                            <a:schemeClr val="bg1"/>
+                          </a:solidFill>
+                        </a:rPr>
+                        <a:t>&lt;= $ 150k: $2,400</a:t>
+                      </a:r>
+                    </a:p>
+                  </a:txBody>
+                  <a:tcPr/>
+                </a:tc>
+                <a:extLst>
+                  <a:ext uri="{0D108BD9-81ED-4DB2-BD59-A6C34878D82A}">
+                    <a16:rowId xmlns:a16="http://schemas.microsoft.com/office/drawing/2014/main" val="2629444012"/>
+                  </a:ext>
+                </a:extLst>
+              </a:tr>
+              <a:tr h="370840">
+                <a:tc>
+                  <a:txBody>
+                    <a:bodyPr/>
+                    <a:lstStyle/>
+                    <a:p>
+                      <a:r>
+                        <a:rPr lang="en-US" sz="1000" dirty="0">
+                          <a:solidFill>
+                            <a:schemeClr val="bg1"/>
+                          </a:solidFill>
+                        </a:rPr>
+                        <a:t>&gt; $75k &lt;= $99k: prorated</a:t>
+                      </a:r>
+                    </a:p>
+                  </a:txBody>
+                  <a:tcPr/>
+                </a:tc>
+                <a:tc>
+                  <a:txBody>
+                    <a:bodyPr/>
+                    <a:lstStyle/>
+                    <a:p>
+                      <a:r>
+                        <a:rPr lang="en-US" sz="1000" dirty="0">
+                          <a:solidFill>
+                            <a:schemeClr val="bg1"/>
+                          </a:solidFill>
+                        </a:rPr>
+                        <a:t>&gt; $150k &lt;= $198k: prorated</a:t>
+                      </a:r>
+                    </a:p>
+                  </a:txBody>
+                  <a:tcPr/>
+                </a:tc>
+                <a:extLst>
+                  <a:ext uri="{0D108BD9-81ED-4DB2-BD59-A6C34878D82A}">
+                    <a16:rowId xmlns:a16="http://schemas.microsoft.com/office/drawing/2014/main" val="1632102919"/>
+                  </a:ext>
+                </a:extLst>
+              </a:tr>
+              <a:tr h="370840">
+                <a:tc>
+                  <a:txBody>
+                    <a:bodyPr/>
+                    <a:lstStyle/>
+                    <a:p>
+                      <a:r>
+                        <a:rPr lang="en-US" sz="1000" dirty="0">
+                          <a:solidFill>
+                            <a:schemeClr val="bg1"/>
+                          </a:solidFill>
+                        </a:rPr>
+                        <a:t>&gt; $99k: no economic stimulus</a:t>
+                      </a:r>
+                    </a:p>
+                  </a:txBody>
+                  <a:tcPr/>
+                </a:tc>
+                <a:tc>
+                  <a:txBody>
+                    <a:bodyPr/>
+                    <a:lstStyle/>
+                    <a:p>
+                      <a:r>
+                        <a:rPr lang="en-US" sz="1000" dirty="0">
+                          <a:solidFill>
+                            <a:schemeClr val="bg1"/>
+                          </a:solidFill>
+                        </a:rPr>
+                        <a:t>&gt; $198k: no economic stimulus</a:t>
+                      </a:r>
+                    </a:p>
+                  </a:txBody>
+                  <a:tcPr/>
+                </a:tc>
+                <a:extLst>
+                  <a:ext uri="{0D108BD9-81ED-4DB2-BD59-A6C34878D82A}">
+                    <a16:rowId xmlns:a16="http://schemas.microsoft.com/office/drawing/2014/main" val="2763898487"/>
+                  </a:ext>
+                </a:extLst>
+              </a:tr>
+              <a:tr h="370840">
+                <a:tc>
+                  <a:txBody>
+                    <a:bodyPr/>
+                    <a:lstStyle/>
+                    <a:p>
+                      <a:r>
+                        <a:rPr lang="en-US" sz="1000" dirty="0">
+                          <a:solidFill>
+                            <a:schemeClr val="bg1"/>
+                          </a:solidFill>
+                        </a:rPr>
+                        <a:t>$500 per child?</a:t>
+                      </a:r>
+                    </a:p>
+                  </a:txBody>
+                  <a:tcPr/>
+                </a:tc>
+                <a:tc>
+                  <a:txBody>
+                    <a:bodyPr/>
+                    <a:lstStyle/>
+                    <a:p>
+                      <a:pPr marL="0" marR="0" lvl="0" indent="0" algn="l" defTabSz="914400" rtl="0" eaLnBrk="1" fontAlgn="auto" latinLnBrk="0" hangingPunct="1">
+                        <a:lnSpc>
+                          <a:spcPct val="100000"/>
+                        </a:lnSpc>
+                        <a:spcBef>
+                          <a:spcPts val="0"/>
+                        </a:spcBef>
+                        <a:spcAft>
+                          <a:spcPts val="0"/>
+                        </a:spcAft>
+                        <a:buClr>
+                          <a:srgbClr val="000000"/>
+                        </a:buClr>
+                        <a:buSzTx/>
+                        <a:buFont typeface="Arial"/>
+                        <a:buNone/>
+                        <a:tabLst/>
+                        <a:defRPr/>
+                      </a:pPr>
+                      <a:r>
+                        <a:rPr lang="en-US" sz="1000" dirty="0">
+                          <a:solidFill>
+                            <a:schemeClr val="bg1"/>
+                          </a:solidFill>
+                        </a:rPr>
+                        <a:t>$500 per child?</a:t>
+                      </a:r>
+                    </a:p>
+                    <a:p>
+                      <a:endParaRPr lang="en-US" sz="1000" dirty="0">
+                        <a:solidFill>
+                          <a:schemeClr val="bg1"/>
+                        </a:solidFill>
+                      </a:endParaRPr>
+                    </a:p>
+                  </a:txBody>
+                  <a:tcPr/>
+                </a:tc>
+                <a:extLst>
+                  <a:ext uri="{0D108BD9-81ED-4DB2-BD59-A6C34878D82A}">
+                    <a16:rowId xmlns:a16="http://schemas.microsoft.com/office/drawing/2014/main" val="2894074734"/>
+                  </a:ext>
+                </a:extLst>
+              </a:tr>
+            </a:tbl>
+          </a:graphicData>
+        </a:graphic>
+      </p:graphicFrame>
+    </p:spTree>
+    <p:extLst>
+      <p:ext uri="{BB962C8B-B14F-4D97-AF65-F5344CB8AC3E}">
+        <p14:creationId xmlns:p14="http://schemas.microsoft.com/office/powerpoint/2010/main" val="2731824185"/>
+      </p:ext>
+    </p:extLst>
+  </p:cSld>
+  <p:clrMapOvr>
+    <a:masterClrMapping/>
+  </p:clrMapOvr>
+</p:sld>
+</file>
+
+<file path=ppt/slides/slide9.xml><?xml version="1.0" encoding="utf-8"?>
+<p:sld xmlns:a="http://schemas.openxmlformats.org/drawingml/2006/main" xmlns:r="http://schemas.openxmlformats.org/officeDocument/2006/relationships" xmlns:p="http://schemas.openxmlformats.org/presentationml/2006/main">
+  <p:cSld>
+    <p:spTree>
+      <p:nvGrpSpPr>
+        <p:cNvPr id="1" name="Shape 68"/>
+        <p:cNvGrpSpPr/>
+        <p:nvPr/>
+      </p:nvGrpSpPr>
+      <p:grpSpPr>
+        <a:xfrm>
+          <a:off x="0" y="0"/>
+          <a:ext cx="0" cy="0"/>
+          <a:chOff x="0" y="0"/>
+          <a:chExt cx="0" cy="0"/>
+        </a:xfrm>
+      </p:grpSpPr>
+      <p:sp>
+        <p:nvSpPr>
+          <p:cNvPr id="69" name="Google Shape;69;p15"/>
+          <p:cNvSpPr txBox="1">
+            <a:spLocks noGrp="1"/>
+          </p:cNvSpPr>
+          <p:nvPr>
+            <p:ph type="title"/>
+          </p:nvPr>
+        </p:nvSpPr>
+        <p:spPr>
+          <a:xfrm>
+            <a:off x="311700" y="445025"/>
+            <a:ext cx="8520600" cy="572700"/>
+          </a:xfrm>
+          <a:prstGeom prst="rect">
+            <a:avLst/>
+          </a:prstGeom>
+        </p:spPr>
+        <p:txBody>
+          <a:bodyPr spcFirstLastPara="1" wrap="square" lIns="91425" tIns="91425" rIns="91425" bIns="91425" anchor="t" anchorCtr="0">
+            <a:noAutofit/>
+          </a:bodyPr>
+          <a:lstStyle/>
+          <a:p>
+            <a:pPr marL="0" lvl="0" indent="0" algn="l" rtl="0">
+              <a:spcBef>
+                <a:spcPts val="0"/>
+              </a:spcBef>
+              <a:spcAft>
+                <a:spcPts val="0"/>
+              </a:spcAft>
+              <a:buNone/>
+            </a:pPr>
+            <a:r>
+              <a:rPr lang="en"/>
+              <a:t>ECONOMIC STIMULUS </a:t>
+            </a:r>
+            <a:endParaRPr/>
+          </a:p>
+        </p:txBody>
+      </p:sp>
+      <p:sp>
+        <p:nvSpPr>
+          <p:cNvPr id="70" name="Google Shape;70;p15"/>
+          <p:cNvSpPr txBox="1">
+            <a:spLocks noGrp="1"/>
+          </p:cNvSpPr>
+          <p:nvPr>
+            <p:ph type="body" idx="1"/>
+          </p:nvPr>
+        </p:nvSpPr>
+        <p:spPr>
+          <a:xfrm>
+            <a:off x="311700" y="1152475"/>
+            <a:ext cx="8520600" cy="3416400"/>
+          </a:xfrm>
+          <a:prstGeom prst="rect">
+            <a:avLst/>
+          </a:prstGeom>
+        </p:spPr>
+        <p:txBody>
+          <a:bodyPr spcFirstLastPara="1" wrap="square" lIns="91425" tIns="91425" rIns="91425" bIns="91425" anchor="t" anchorCtr="0">
+            <a:noAutofit/>
+          </a:bodyPr>
+          <a:lstStyle/>
+          <a:p>
+            <a:pPr marL="342900" lvl="0">
+              <a:spcBef>
+                <a:spcPts val="1600"/>
+              </a:spcBef>
+              <a:buFont typeface="+mj-lt"/>
+              <a:buAutoNum type="arabicPeriod"/>
+            </a:pPr>
+            <a:r>
+              <a:rPr lang="en-US" dirty="0"/>
+              <a:t>What could happen if there was no Economic Stimulus </a:t>
+            </a:r>
+          </a:p>
+          <a:p>
+            <a:pPr marL="800100" lvl="1">
+              <a:spcBef>
+                <a:spcPts val="0"/>
+              </a:spcBef>
+              <a:buFont typeface="+mj-lt"/>
+              <a:buAutoNum type="arabicPeriod"/>
+            </a:pPr>
+            <a:r>
+              <a:rPr lang="en-US" dirty="0"/>
+              <a:t>Economy will be de-stabilized</a:t>
+            </a:r>
+          </a:p>
+          <a:p>
+            <a:pPr marL="800100" lvl="1">
+              <a:spcBef>
+                <a:spcPts val="0"/>
+              </a:spcBef>
+              <a:buFont typeface="+mj-lt"/>
+              <a:buAutoNum type="arabicPeriod"/>
+            </a:pPr>
+            <a:r>
+              <a:rPr lang="en-US" dirty="0" err="1"/>
+              <a:t>Coronovirus</a:t>
+            </a:r>
+            <a:r>
+              <a:rPr lang="en-US" dirty="0"/>
+              <a:t> rates and deaths would spike up</a:t>
+            </a:r>
+          </a:p>
+          <a:p>
+            <a:pPr marL="800100" lvl="1">
+              <a:spcBef>
+                <a:spcPts val="0"/>
+              </a:spcBef>
+              <a:buFont typeface="+mj-lt"/>
+              <a:buAutoNum type="arabicPeriod"/>
+            </a:pPr>
+            <a:r>
+              <a:rPr lang="en-US" dirty="0"/>
+              <a:t>U.S households, states and businesses will collapse. Default on loans, mortgage payments, unable to take care of health. Unemployment, crime, fraud, overdoses would sky rocket. </a:t>
+            </a:r>
+          </a:p>
+        </p:txBody>
+      </p:sp>
+    </p:spTree>
+    <p:extLst>
+      <p:ext uri="{BB962C8B-B14F-4D97-AF65-F5344CB8AC3E}">
+        <p14:creationId xmlns:p14="http://schemas.microsoft.com/office/powerpoint/2010/main" val="3603028900"/>
       </p:ext>
     </p:extLst>
   </p:cSld>

</xml_diff>